<commit_message>
almost finalise tech report; add lay report
</commit_message>
<xml_diff>
--- a/Report/Figure/Figure.pptx
+++ b/Report/Figure/Figure.pptx
@@ -7,6 +7,7 @@
   <p:sldIdLst>
     <p:sldId id="256" r:id="rId2"/>
     <p:sldId id="257" r:id="rId3"/>
+    <p:sldId id="258" r:id="rId4"/>
   </p:sldIdLst>
   <p:sldSz cx="12192000" cy="6858000"/>
   <p:notesSz cx="6858000" cy="9144000"/>
@@ -255,7 +256,7 @@
           <a:p>
             <a:fld id="{A8DE2402-11CB-48E9-B2A8-3DD8F13E9CB1}" type="datetimeFigureOut">
               <a:rPr lang="en-US" smtClean="0"/>
-              <a:t>6/14/2018</a:t>
+              <a:t>6/19/2018</a:t>
             </a:fld>
             <a:endParaRPr lang="en-US"/>
           </a:p>
@@ -425,7 +426,7 @@
           <a:p>
             <a:fld id="{A8DE2402-11CB-48E9-B2A8-3DD8F13E9CB1}" type="datetimeFigureOut">
               <a:rPr lang="en-US" smtClean="0"/>
-              <a:t>6/14/2018</a:t>
+              <a:t>6/19/2018</a:t>
             </a:fld>
             <a:endParaRPr lang="en-US"/>
           </a:p>
@@ -605,7 +606,7 @@
           <a:p>
             <a:fld id="{A8DE2402-11CB-48E9-B2A8-3DD8F13E9CB1}" type="datetimeFigureOut">
               <a:rPr lang="en-US" smtClean="0"/>
-              <a:t>6/14/2018</a:t>
+              <a:t>6/19/2018</a:t>
             </a:fld>
             <a:endParaRPr lang="en-US"/>
           </a:p>
@@ -775,7 +776,7 @@
           <a:p>
             <a:fld id="{A8DE2402-11CB-48E9-B2A8-3DD8F13E9CB1}" type="datetimeFigureOut">
               <a:rPr lang="en-US" smtClean="0"/>
-              <a:t>6/14/2018</a:t>
+              <a:t>6/19/2018</a:t>
             </a:fld>
             <a:endParaRPr lang="en-US"/>
           </a:p>
@@ -1021,7 +1022,7 @@
           <a:p>
             <a:fld id="{A8DE2402-11CB-48E9-B2A8-3DD8F13E9CB1}" type="datetimeFigureOut">
               <a:rPr lang="en-US" smtClean="0"/>
-              <a:t>6/14/2018</a:t>
+              <a:t>6/19/2018</a:t>
             </a:fld>
             <a:endParaRPr lang="en-US"/>
           </a:p>
@@ -1253,7 +1254,7 @@
           <a:p>
             <a:fld id="{A8DE2402-11CB-48E9-B2A8-3DD8F13E9CB1}" type="datetimeFigureOut">
               <a:rPr lang="en-US" smtClean="0"/>
-              <a:t>6/14/2018</a:t>
+              <a:t>6/19/2018</a:t>
             </a:fld>
             <a:endParaRPr lang="en-US"/>
           </a:p>
@@ -1620,7 +1621,7 @@
           <a:p>
             <a:fld id="{A8DE2402-11CB-48E9-B2A8-3DD8F13E9CB1}" type="datetimeFigureOut">
               <a:rPr lang="en-US" smtClean="0"/>
-              <a:t>6/14/2018</a:t>
+              <a:t>6/19/2018</a:t>
             </a:fld>
             <a:endParaRPr lang="en-US"/>
           </a:p>
@@ -1738,7 +1739,7 @@
           <a:p>
             <a:fld id="{A8DE2402-11CB-48E9-B2A8-3DD8F13E9CB1}" type="datetimeFigureOut">
               <a:rPr lang="en-US" smtClean="0"/>
-              <a:t>6/14/2018</a:t>
+              <a:t>6/19/2018</a:t>
             </a:fld>
             <a:endParaRPr lang="en-US"/>
           </a:p>
@@ -1833,7 +1834,7 @@
           <a:p>
             <a:fld id="{A8DE2402-11CB-48E9-B2A8-3DD8F13E9CB1}" type="datetimeFigureOut">
               <a:rPr lang="en-US" smtClean="0"/>
-              <a:t>6/14/2018</a:t>
+              <a:t>6/19/2018</a:t>
             </a:fld>
             <a:endParaRPr lang="en-US"/>
           </a:p>
@@ -2110,7 +2111,7 @@
           <a:p>
             <a:fld id="{A8DE2402-11CB-48E9-B2A8-3DD8F13E9CB1}" type="datetimeFigureOut">
               <a:rPr lang="en-US" smtClean="0"/>
-              <a:t>6/14/2018</a:t>
+              <a:t>6/19/2018</a:t>
             </a:fld>
             <a:endParaRPr lang="en-US"/>
           </a:p>
@@ -2363,7 +2364,7 @@
           <a:p>
             <a:fld id="{A8DE2402-11CB-48E9-B2A8-3DD8F13E9CB1}" type="datetimeFigureOut">
               <a:rPr lang="en-US" smtClean="0"/>
-              <a:t>6/14/2018</a:t>
+              <a:t>6/19/2018</a:t>
             </a:fld>
             <a:endParaRPr lang="en-US"/>
           </a:p>
@@ -2576,7 +2577,7 @@
           <a:p>
             <a:fld id="{A8DE2402-11CB-48E9-B2A8-3DD8F13E9CB1}" type="datetimeFigureOut">
               <a:rPr lang="en-US" smtClean="0"/>
-              <a:t>6/14/2018</a:t>
+              <a:t>6/19/2018</a:t>
             </a:fld>
             <a:endParaRPr lang="en-US"/>
           </a:p>
@@ -10294,8 +10295,8 @@
             <a:chExt cx="4271766" cy="1931076"/>
           </a:xfrm>
         </p:grpSpPr>
-        <mc:AlternateContent xmlns:mc="http://schemas.openxmlformats.org/markup-compatibility/2006">
-          <mc:Choice xmlns:a14="http://schemas.microsoft.com/office/drawing/2010/main" Requires="a14">
+        <mc:AlternateContent xmlns:mc="http://schemas.openxmlformats.org/markup-compatibility/2006" xmlns:a14="http://schemas.microsoft.com/office/drawing/2010/main">
+          <mc:Choice Requires="a14">
             <p:sp>
               <p:nvSpPr>
                 <p:cNvPr id="4" name="Oval 3"/>
@@ -10395,7 +10396,7 @@
               </p:txBody>
             </p:sp>
           </mc:Choice>
-          <mc:Fallback>
+          <mc:Fallback xmlns="">
             <p:sp>
               <p:nvSpPr>
                 <p:cNvPr id="4" name="Oval 3"/>
@@ -10439,8 +10440,8 @@
             </p:sp>
           </mc:Fallback>
         </mc:AlternateContent>
-        <mc:AlternateContent xmlns:mc="http://schemas.openxmlformats.org/markup-compatibility/2006">
-          <mc:Choice xmlns:a14="http://schemas.microsoft.com/office/drawing/2010/main" Requires="a14">
+        <mc:AlternateContent xmlns:mc="http://schemas.openxmlformats.org/markup-compatibility/2006" xmlns:a14="http://schemas.microsoft.com/office/drawing/2010/main">
+          <mc:Choice Requires="a14">
             <p:sp>
               <p:nvSpPr>
                 <p:cNvPr id="9" name="Oval 8"/>
@@ -10540,7 +10541,7 @@
               </p:txBody>
             </p:sp>
           </mc:Choice>
-          <mc:Fallback>
+          <mc:Fallback xmlns="">
             <p:sp>
               <p:nvSpPr>
                 <p:cNvPr id="9" name="Oval 8"/>
@@ -10621,8 +10622,8 @@
             </a:fontRef>
           </p:style>
         </p:cxnSp>
-        <mc:AlternateContent xmlns:mc="http://schemas.openxmlformats.org/markup-compatibility/2006">
-          <mc:Choice xmlns:a14="http://schemas.microsoft.com/office/drawing/2010/main" Requires="a14">
+        <mc:AlternateContent xmlns:mc="http://schemas.openxmlformats.org/markup-compatibility/2006" xmlns:a14="http://schemas.microsoft.com/office/drawing/2010/main">
+          <mc:Choice Requires="a14">
             <p:sp>
               <p:nvSpPr>
                 <p:cNvPr id="22" name="Oval 21"/>
@@ -10722,7 +10723,7 @@
               </p:txBody>
             </p:sp>
           </mc:Choice>
-          <mc:Fallback>
+          <mc:Fallback xmlns="">
             <p:sp>
               <p:nvSpPr>
                 <p:cNvPr id="22" name="Oval 21"/>
@@ -10767,8 +10768,8 @@
             </p:sp>
           </mc:Fallback>
         </mc:AlternateContent>
-        <mc:AlternateContent xmlns:mc="http://schemas.openxmlformats.org/markup-compatibility/2006">
-          <mc:Choice xmlns:a14="http://schemas.microsoft.com/office/drawing/2010/main" Requires="a14">
+        <mc:AlternateContent xmlns:mc="http://schemas.openxmlformats.org/markup-compatibility/2006" xmlns:a14="http://schemas.microsoft.com/office/drawing/2010/main">
+          <mc:Choice Requires="a14">
             <p:sp>
               <p:nvSpPr>
                 <p:cNvPr id="23" name="Oval 22"/>
@@ -10868,7 +10869,7 @@
               </p:txBody>
             </p:sp>
           </mc:Choice>
-          <mc:Fallback>
+          <mc:Fallback xmlns="">
             <p:sp>
               <p:nvSpPr>
                 <p:cNvPr id="23" name="Oval 22"/>
@@ -11305,8 +11306,8 @@
             </a:fontRef>
           </p:style>
         </p:cxnSp>
-        <mc:AlternateContent xmlns:mc="http://schemas.openxmlformats.org/markup-compatibility/2006">
-          <mc:Choice xmlns:a14="http://schemas.microsoft.com/office/drawing/2010/main" Requires="a14">
+        <mc:AlternateContent xmlns:mc="http://schemas.openxmlformats.org/markup-compatibility/2006" xmlns:a14="http://schemas.microsoft.com/office/drawing/2010/main">
+          <mc:Choice Requires="a14">
             <p:sp>
               <p:nvSpPr>
                 <p:cNvPr id="28" name="Oval 27"/>
@@ -11406,7 +11407,7 @@
               </p:txBody>
             </p:sp>
           </mc:Choice>
-          <mc:Fallback>
+          <mc:Fallback xmlns="">
             <p:sp>
               <p:nvSpPr>
                 <p:cNvPr id="28" name="Oval 27"/>
@@ -11450,8 +11451,8 @@
             </p:sp>
           </mc:Fallback>
         </mc:AlternateContent>
-        <mc:AlternateContent xmlns:mc="http://schemas.openxmlformats.org/markup-compatibility/2006">
-          <mc:Choice xmlns:a14="http://schemas.microsoft.com/office/drawing/2010/main" Requires="a14">
+        <mc:AlternateContent xmlns:mc="http://schemas.openxmlformats.org/markup-compatibility/2006" xmlns:a14="http://schemas.microsoft.com/office/drawing/2010/main">
+          <mc:Choice Requires="a14">
             <p:sp>
               <p:nvSpPr>
                 <p:cNvPr id="29" name="Oval 28"/>
@@ -11551,7 +11552,7 @@
               </p:txBody>
             </p:sp>
           </mc:Choice>
-          <mc:Fallback>
+          <mc:Fallback xmlns="">
             <p:sp>
               <p:nvSpPr>
                 <p:cNvPr id="29" name="Oval 28"/>
@@ -11595,8 +11596,8 @@
             </p:sp>
           </mc:Fallback>
         </mc:AlternateContent>
-        <mc:AlternateContent xmlns:mc="http://schemas.openxmlformats.org/markup-compatibility/2006">
-          <mc:Choice xmlns:a14="http://schemas.microsoft.com/office/drawing/2010/main" Requires="a14">
+        <mc:AlternateContent xmlns:mc="http://schemas.openxmlformats.org/markup-compatibility/2006" xmlns:a14="http://schemas.microsoft.com/office/drawing/2010/main">
+          <mc:Choice Requires="a14">
             <p:sp>
               <p:nvSpPr>
                 <p:cNvPr id="30" name="Oval 29"/>
@@ -11696,7 +11697,7 @@
               </p:txBody>
             </p:sp>
           </mc:Choice>
-          <mc:Fallback>
+          <mc:Fallback xmlns="">
             <p:sp>
               <p:nvSpPr>
                 <p:cNvPr id="30" name="Oval 29"/>
@@ -12840,6 +12841,3018 @@
 </p:sld>
 </file>
 
+<file path=ppt/slides/slide3.xml><?xml version="1.0" encoding="utf-8"?>
+<p:sld xmlns:a="http://schemas.openxmlformats.org/drawingml/2006/main" xmlns:r="http://schemas.openxmlformats.org/officeDocument/2006/relationships" xmlns:p="http://schemas.openxmlformats.org/presentationml/2006/main">
+  <p:cSld>
+    <p:spTree>
+      <p:nvGrpSpPr>
+        <p:cNvPr id="1" name=""/>
+        <p:cNvGrpSpPr/>
+        <p:nvPr/>
+      </p:nvGrpSpPr>
+      <p:grpSpPr>
+        <a:xfrm>
+          <a:off x="0" y="0"/>
+          <a:ext cx="0" cy="0"/>
+          <a:chOff x="0" y="0"/>
+          <a:chExt cx="0" cy="0"/>
+        </a:xfrm>
+      </p:grpSpPr>
+      <p:grpSp>
+        <p:nvGrpSpPr>
+          <p:cNvPr id="46" name="Group 45"/>
+          <p:cNvGrpSpPr/>
+          <p:nvPr/>
+        </p:nvGrpSpPr>
+        <p:grpSpPr>
+          <a:xfrm>
+            <a:off x="1694106" y="1163062"/>
+            <a:ext cx="7550233" cy="3503808"/>
+            <a:chOff x="1694106" y="1163062"/>
+            <a:chExt cx="7550233" cy="3503808"/>
+          </a:xfrm>
+        </p:grpSpPr>
+        <p:grpSp>
+          <p:nvGrpSpPr>
+            <p:cNvPr id="4" name="Group 3"/>
+            <p:cNvGrpSpPr/>
+            <p:nvPr/>
+          </p:nvGrpSpPr>
+          <p:grpSpPr>
+            <a:xfrm>
+              <a:off x="1694106" y="1163062"/>
+              <a:ext cx="4820387" cy="1522669"/>
+              <a:chOff x="426027" y="2293123"/>
+              <a:chExt cx="4820387" cy="1522669"/>
+            </a:xfrm>
+          </p:grpSpPr>
+          <p:sp>
+            <p:nvSpPr>
+              <p:cNvPr id="5" name="Right Arrow 4"/>
+              <p:cNvSpPr/>
+              <p:nvPr/>
+            </p:nvSpPr>
+            <p:spPr>
+              <a:xfrm>
+                <a:off x="2332609" y="2877559"/>
+                <a:ext cx="1859829" cy="360040"/>
+              </a:xfrm>
+              <a:prstGeom prst="rightArrow">
+                <a:avLst/>
+              </a:prstGeom>
+              <a:solidFill>
+                <a:schemeClr val="accent1">
+                  <a:lumMod val="20000"/>
+                  <a:lumOff val="80000"/>
+                </a:schemeClr>
+              </a:solidFill>
+              <a:ln>
+                <a:noFill/>
+              </a:ln>
+            </p:spPr>
+            <p:style>
+              <a:lnRef idx="2">
+                <a:schemeClr val="accent1">
+                  <a:shade val="50000"/>
+                </a:schemeClr>
+              </a:lnRef>
+              <a:fillRef idx="1">
+                <a:schemeClr val="accent1"/>
+              </a:fillRef>
+              <a:effectRef idx="0">
+                <a:schemeClr val="accent1"/>
+              </a:effectRef>
+              <a:fontRef idx="minor">
+                <a:schemeClr val="lt1"/>
+              </a:fontRef>
+            </p:style>
+            <p:txBody>
+              <a:bodyPr rtlCol="0" anchor="ctr"/>
+              <a:lstStyle/>
+              <a:p>
+                <a:pPr algn="ctr"/>
+                <a:endParaRPr lang="en-US" sz="1100">
+                  <a:latin typeface="Airal"/>
+                </a:endParaRPr>
+              </a:p>
+            </p:txBody>
+          </p:sp>
+          <p:grpSp>
+            <p:nvGrpSpPr>
+              <p:cNvPr id="6" name="Group 5"/>
+              <p:cNvGrpSpPr/>
+              <p:nvPr/>
+            </p:nvGrpSpPr>
+            <p:grpSpPr>
+              <a:xfrm>
+                <a:off x="1233429" y="2490074"/>
+                <a:ext cx="1135013" cy="1135013"/>
+                <a:chOff x="-392790" y="2035195"/>
+                <a:chExt cx="1135013" cy="1135013"/>
+              </a:xfrm>
+            </p:grpSpPr>
+            <p:pic>
+              <p:nvPicPr>
+                <p:cNvPr id="12" name="Picture 11"/>
+                <p:cNvPicPr>
+                  <a:picLocks noChangeAspect="1"/>
+                </p:cNvPicPr>
+                <p:nvPr/>
+              </p:nvPicPr>
+              <p:blipFill>
+                <a:blip r:embed="rId2">
+                  <a:extLst>
+                    <a:ext uri="{28A0092B-C50C-407E-A947-70E740481C1C}">
+                      <a14:useLocalDpi xmlns:a14="http://schemas.microsoft.com/office/drawing/2010/main" val="0"/>
+                    </a:ext>
+                  </a:extLst>
+                </a:blip>
+                <a:stretch>
+                  <a:fillRect/>
+                </a:stretch>
+              </p:blipFill>
+              <p:spPr>
+                <a:xfrm>
+                  <a:off x="-392790" y="2035195"/>
+                  <a:ext cx="1135013" cy="1135013"/>
+                </a:xfrm>
+                <a:prstGeom prst="rect">
+                  <a:avLst/>
+                </a:prstGeom>
+              </p:spPr>
+            </p:pic>
+            <p:sp>
+              <p:nvSpPr>
+                <p:cNvPr id="13" name="Content Placeholder 2"/>
+                <p:cNvSpPr txBox="1">
+                  <a:spLocks/>
+                </p:cNvSpPr>
+                <p:nvPr/>
+              </p:nvSpPr>
+              <p:spPr>
+                <a:xfrm>
+                  <a:off x="-392790" y="2047812"/>
+                  <a:ext cx="1099178" cy="366973"/>
+                </a:xfrm>
+                <a:prstGeom prst="rect">
+                  <a:avLst/>
+                </a:prstGeom>
+                <a:noFill/>
+              </p:spPr>
+              <p:txBody>
+                <a:bodyPr anchor="ctr"/>
+                <a:lstStyle>
+                  <a:lvl1pPr marL="342900" indent="-342900" algn="l" defTabSz="914400" rtl="0" eaLnBrk="1" latinLnBrk="0" hangingPunct="1">
+                    <a:spcBef>
+                      <a:spcPct val="20000"/>
+                    </a:spcBef>
+                    <a:buFont typeface="Arial" pitchFamily="34" charset="0"/>
+                    <a:buChar char="•"/>
+                    <a:defRPr sz="3200" kern="1200">
+                      <a:solidFill>
+                        <a:schemeClr val="tx1"/>
+                      </a:solidFill>
+                      <a:latin typeface="+mn-lt"/>
+                      <a:ea typeface="+mn-ea"/>
+                      <a:cs typeface="+mn-cs"/>
+                    </a:defRPr>
+                  </a:lvl1pPr>
+                  <a:lvl2pPr marL="742950" indent="-285750" algn="l" defTabSz="914400" rtl="0" eaLnBrk="1" latinLnBrk="0" hangingPunct="1">
+                    <a:spcBef>
+                      <a:spcPct val="20000"/>
+                    </a:spcBef>
+                    <a:buFont typeface="Arial" pitchFamily="34" charset="0"/>
+                    <a:buChar char="–"/>
+                    <a:defRPr sz="2800" kern="1200">
+                      <a:solidFill>
+                        <a:schemeClr val="tx1"/>
+                      </a:solidFill>
+                      <a:latin typeface="+mn-lt"/>
+                      <a:ea typeface="+mn-ea"/>
+                      <a:cs typeface="+mn-cs"/>
+                    </a:defRPr>
+                  </a:lvl2pPr>
+                  <a:lvl3pPr marL="1143000" indent="-228600" algn="l" defTabSz="914400" rtl="0" eaLnBrk="1" latinLnBrk="0" hangingPunct="1">
+                    <a:spcBef>
+                      <a:spcPct val="20000"/>
+                    </a:spcBef>
+                    <a:buFont typeface="Arial" pitchFamily="34" charset="0"/>
+                    <a:buChar char="•"/>
+                    <a:defRPr sz="2400" kern="1200">
+                      <a:solidFill>
+                        <a:schemeClr val="tx1"/>
+                      </a:solidFill>
+                      <a:latin typeface="+mn-lt"/>
+                      <a:ea typeface="+mn-ea"/>
+                      <a:cs typeface="+mn-cs"/>
+                    </a:defRPr>
+                  </a:lvl3pPr>
+                  <a:lvl4pPr marL="1600200" indent="-228600" algn="l" defTabSz="914400" rtl="0" eaLnBrk="1" latinLnBrk="0" hangingPunct="1">
+                    <a:spcBef>
+                      <a:spcPct val="20000"/>
+                    </a:spcBef>
+                    <a:buFont typeface="Arial" pitchFamily="34" charset="0"/>
+                    <a:buChar char="–"/>
+                    <a:defRPr sz="2000" kern="1200">
+                      <a:solidFill>
+                        <a:schemeClr val="tx1"/>
+                      </a:solidFill>
+                      <a:latin typeface="+mn-lt"/>
+                      <a:ea typeface="+mn-ea"/>
+                      <a:cs typeface="+mn-cs"/>
+                    </a:defRPr>
+                  </a:lvl4pPr>
+                  <a:lvl5pPr marL="2057400" indent="-228600" algn="l" defTabSz="914400" rtl="0" eaLnBrk="1" latinLnBrk="0" hangingPunct="1">
+                    <a:spcBef>
+                      <a:spcPct val="20000"/>
+                    </a:spcBef>
+                    <a:buFont typeface="Arial" pitchFamily="34" charset="0"/>
+                    <a:buChar char="»"/>
+                    <a:defRPr sz="2000" kern="1200">
+                      <a:solidFill>
+                        <a:schemeClr val="tx1"/>
+                      </a:solidFill>
+                      <a:latin typeface="+mn-lt"/>
+                      <a:ea typeface="+mn-ea"/>
+                      <a:cs typeface="+mn-cs"/>
+                    </a:defRPr>
+                  </a:lvl5pPr>
+                  <a:lvl6pPr marL="2514600" indent="-228600" algn="l" defTabSz="914400" rtl="0" eaLnBrk="1" latinLnBrk="0" hangingPunct="1">
+                    <a:spcBef>
+                      <a:spcPct val="20000"/>
+                    </a:spcBef>
+                    <a:buFont typeface="Arial" pitchFamily="34" charset="0"/>
+                    <a:buChar char="•"/>
+                    <a:defRPr sz="2000" kern="1200">
+                      <a:solidFill>
+                        <a:schemeClr val="tx1"/>
+                      </a:solidFill>
+                      <a:latin typeface="+mn-lt"/>
+                      <a:ea typeface="+mn-ea"/>
+                      <a:cs typeface="+mn-cs"/>
+                    </a:defRPr>
+                  </a:lvl6pPr>
+                  <a:lvl7pPr marL="2971800" indent="-228600" algn="l" defTabSz="914400" rtl="0" eaLnBrk="1" latinLnBrk="0" hangingPunct="1">
+                    <a:spcBef>
+                      <a:spcPct val="20000"/>
+                    </a:spcBef>
+                    <a:buFont typeface="Arial" pitchFamily="34" charset="0"/>
+                    <a:buChar char="•"/>
+                    <a:defRPr sz="2000" kern="1200">
+                      <a:solidFill>
+                        <a:schemeClr val="tx1"/>
+                      </a:solidFill>
+                      <a:latin typeface="+mn-lt"/>
+                      <a:ea typeface="+mn-ea"/>
+                      <a:cs typeface="+mn-cs"/>
+                    </a:defRPr>
+                  </a:lvl7pPr>
+                  <a:lvl8pPr marL="3429000" indent="-228600" algn="l" defTabSz="914400" rtl="0" eaLnBrk="1" latinLnBrk="0" hangingPunct="1">
+                    <a:spcBef>
+                      <a:spcPct val="20000"/>
+                    </a:spcBef>
+                    <a:buFont typeface="Arial" pitchFamily="34" charset="0"/>
+                    <a:buChar char="•"/>
+                    <a:defRPr sz="2000" kern="1200">
+                      <a:solidFill>
+                        <a:schemeClr val="tx1"/>
+                      </a:solidFill>
+                      <a:latin typeface="+mn-lt"/>
+                      <a:ea typeface="+mn-ea"/>
+                      <a:cs typeface="+mn-cs"/>
+                    </a:defRPr>
+                  </a:lvl8pPr>
+                  <a:lvl9pPr marL="3886200" indent="-228600" algn="l" defTabSz="914400" rtl="0" eaLnBrk="1" latinLnBrk="0" hangingPunct="1">
+                    <a:spcBef>
+                      <a:spcPct val="20000"/>
+                    </a:spcBef>
+                    <a:buFont typeface="Arial" pitchFamily="34" charset="0"/>
+                    <a:buChar char="•"/>
+                    <a:defRPr sz="2000" kern="1200">
+                      <a:solidFill>
+                        <a:schemeClr val="tx1"/>
+                      </a:solidFill>
+                      <a:latin typeface="+mn-lt"/>
+                      <a:ea typeface="+mn-ea"/>
+                      <a:cs typeface="+mn-cs"/>
+                    </a:defRPr>
+                  </a:lvl9pPr>
+                </a:lstStyle>
+                <a:p>
+                  <a:pPr marL="0" indent="0" algn="ctr">
+                    <a:buFont typeface="Arial" pitchFamily="34" charset="0"/>
+                    <a:buNone/>
+                  </a:pPr>
+                  <a:r>
+                    <a:rPr lang="en-GB" sz="1100" b="1" dirty="0" smtClean="0">
+                      <a:latin typeface="Airal"/>
+                    </a:rPr>
+                    <a:t>Train Database</a:t>
+                  </a:r>
+                  <a:endParaRPr lang="en-GB" sz="1100" dirty="0" smtClean="0">
+                    <a:latin typeface="Airal"/>
+                  </a:endParaRPr>
+                </a:p>
+              </p:txBody>
+            </p:sp>
+          </p:grpSp>
+          <p:sp>
+            <p:nvSpPr>
+              <p:cNvPr id="7" name="Content Placeholder 2"/>
+              <p:cNvSpPr txBox="1">
+                <a:spLocks/>
+              </p:cNvSpPr>
+              <p:nvPr/>
+            </p:nvSpPr>
+            <p:spPr>
+              <a:xfrm>
+                <a:off x="2550079" y="2618030"/>
+                <a:ext cx="1251529" cy="872853"/>
+              </a:xfrm>
+              <a:prstGeom prst="rect">
+                <a:avLst/>
+              </a:prstGeom>
+              <a:solidFill>
+                <a:schemeClr val="accent6">
+                  <a:lumMod val="20000"/>
+                  <a:lumOff val="80000"/>
+                </a:schemeClr>
+              </a:solidFill>
+              <a:ln w="38100">
+                <a:solidFill>
+                  <a:schemeClr val="bg1"/>
+                </a:solidFill>
+              </a:ln>
+            </p:spPr>
+            <p:txBody>
+              <a:bodyPr anchor="ctr"/>
+              <a:lstStyle>
+                <a:lvl1pPr marL="342900" indent="-342900" algn="l" defTabSz="914400" rtl="0" eaLnBrk="1" latinLnBrk="0" hangingPunct="1">
+                  <a:spcBef>
+                    <a:spcPct val="20000"/>
+                  </a:spcBef>
+                  <a:buFont typeface="Arial" pitchFamily="34" charset="0"/>
+                  <a:buChar char="•"/>
+                  <a:defRPr sz="3200" kern="1200">
+                    <a:solidFill>
+                      <a:schemeClr val="tx1"/>
+                    </a:solidFill>
+                    <a:latin typeface="+mn-lt"/>
+                    <a:ea typeface="+mn-ea"/>
+                    <a:cs typeface="+mn-cs"/>
+                  </a:defRPr>
+                </a:lvl1pPr>
+                <a:lvl2pPr marL="742950" indent="-285750" algn="l" defTabSz="914400" rtl="0" eaLnBrk="1" latinLnBrk="0" hangingPunct="1">
+                  <a:spcBef>
+                    <a:spcPct val="20000"/>
+                  </a:spcBef>
+                  <a:buFont typeface="Arial" pitchFamily="34" charset="0"/>
+                  <a:buChar char="–"/>
+                  <a:defRPr sz="2800" kern="1200">
+                    <a:solidFill>
+                      <a:schemeClr val="tx1"/>
+                    </a:solidFill>
+                    <a:latin typeface="+mn-lt"/>
+                    <a:ea typeface="+mn-ea"/>
+                    <a:cs typeface="+mn-cs"/>
+                  </a:defRPr>
+                </a:lvl2pPr>
+                <a:lvl3pPr marL="1143000" indent="-228600" algn="l" defTabSz="914400" rtl="0" eaLnBrk="1" latinLnBrk="0" hangingPunct="1">
+                  <a:spcBef>
+                    <a:spcPct val="20000"/>
+                  </a:spcBef>
+                  <a:buFont typeface="Arial" pitchFamily="34" charset="0"/>
+                  <a:buChar char="•"/>
+                  <a:defRPr sz="2400" kern="1200">
+                    <a:solidFill>
+                      <a:schemeClr val="tx1"/>
+                    </a:solidFill>
+                    <a:latin typeface="+mn-lt"/>
+                    <a:ea typeface="+mn-ea"/>
+                    <a:cs typeface="+mn-cs"/>
+                  </a:defRPr>
+                </a:lvl3pPr>
+                <a:lvl4pPr marL="1600200" indent="-228600" algn="l" defTabSz="914400" rtl="0" eaLnBrk="1" latinLnBrk="0" hangingPunct="1">
+                  <a:spcBef>
+                    <a:spcPct val="20000"/>
+                  </a:spcBef>
+                  <a:buFont typeface="Arial" pitchFamily="34" charset="0"/>
+                  <a:buChar char="–"/>
+                  <a:defRPr sz="2000" kern="1200">
+                    <a:solidFill>
+                      <a:schemeClr val="tx1"/>
+                    </a:solidFill>
+                    <a:latin typeface="+mn-lt"/>
+                    <a:ea typeface="+mn-ea"/>
+                    <a:cs typeface="+mn-cs"/>
+                  </a:defRPr>
+                </a:lvl4pPr>
+                <a:lvl5pPr marL="2057400" indent="-228600" algn="l" defTabSz="914400" rtl="0" eaLnBrk="1" latinLnBrk="0" hangingPunct="1">
+                  <a:spcBef>
+                    <a:spcPct val="20000"/>
+                  </a:spcBef>
+                  <a:buFont typeface="Arial" pitchFamily="34" charset="0"/>
+                  <a:buChar char="»"/>
+                  <a:defRPr sz="2000" kern="1200">
+                    <a:solidFill>
+                      <a:schemeClr val="tx1"/>
+                    </a:solidFill>
+                    <a:latin typeface="+mn-lt"/>
+                    <a:ea typeface="+mn-ea"/>
+                    <a:cs typeface="+mn-cs"/>
+                  </a:defRPr>
+                </a:lvl5pPr>
+                <a:lvl6pPr marL="2514600" indent="-228600" algn="l" defTabSz="914400" rtl="0" eaLnBrk="1" latinLnBrk="0" hangingPunct="1">
+                  <a:spcBef>
+                    <a:spcPct val="20000"/>
+                  </a:spcBef>
+                  <a:buFont typeface="Arial" pitchFamily="34" charset="0"/>
+                  <a:buChar char="•"/>
+                  <a:defRPr sz="2000" kern="1200">
+                    <a:solidFill>
+                      <a:schemeClr val="tx1"/>
+                    </a:solidFill>
+                    <a:latin typeface="+mn-lt"/>
+                    <a:ea typeface="+mn-ea"/>
+                    <a:cs typeface="+mn-cs"/>
+                  </a:defRPr>
+                </a:lvl6pPr>
+                <a:lvl7pPr marL="2971800" indent="-228600" algn="l" defTabSz="914400" rtl="0" eaLnBrk="1" latinLnBrk="0" hangingPunct="1">
+                  <a:spcBef>
+                    <a:spcPct val="20000"/>
+                  </a:spcBef>
+                  <a:buFont typeface="Arial" pitchFamily="34" charset="0"/>
+                  <a:buChar char="•"/>
+                  <a:defRPr sz="2000" kern="1200">
+                    <a:solidFill>
+                      <a:schemeClr val="tx1"/>
+                    </a:solidFill>
+                    <a:latin typeface="+mn-lt"/>
+                    <a:ea typeface="+mn-ea"/>
+                    <a:cs typeface="+mn-cs"/>
+                  </a:defRPr>
+                </a:lvl7pPr>
+                <a:lvl8pPr marL="3429000" indent="-228600" algn="l" defTabSz="914400" rtl="0" eaLnBrk="1" latinLnBrk="0" hangingPunct="1">
+                  <a:spcBef>
+                    <a:spcPct val="20000"/>
+                  </a:spcBef>
+                  <a:buFont typeface="Arial" pitchFamily="34" charset="0"/>
+                  <a:buChar char="•"/>
+                  <a:defRPr sz="2000" kern="1200">
+                    <a:solidFill>
+                      <a:schemeClr val="tx1"/>
+                    </a:solidFill>
+                    <a:latin typeface="+mn-lt"/>
+                    <a:ea typeface="+mn-ea"/>
+                    <a:cs typeface="+mn-cs"/>
+                  </a:defRPr>
+                </a:lvl8pPr>
+                <a:lvl9pPr marL="3886200" indent="-228600" algn="l" defTabSz="914400" rtl="0" eaLnBrk="1" latinLnBrk="0" hangingPunct="1">
+                  <a:spcBef>
+                    <a:spcPct val="20000"/>
+                  </a:spcBef>
+                  <a:buFont typeface="Arial" pitchFamily="34" charset="0"/>
+                  <a:buChar char="•"/>
+                  <a:defRPr sz="2000" kern="1200">
+                    <a:solidFill>
+                      <a:schemeClr val="tx1"/>
+                    </a:solidFill>
+                    <a:latin typeface="+mn-lt"/>
+                    <a:ea typeface="+mn-ea"/>
+                    <a:cs typeface="+mn-cs"/>
+                  </a:defRPr>
+                </a:lvl9pPr>
+              </a:lstStyle>
+              <a:p>
+                <a:pPr marL="0" indent="0" algn="ctr">
+                  <a:buFont typeface="Arial" pitchFamily="34" charset="0"/>
+                  <a:buNone/>
+                </a:pPr>
+                <a:r>
+                  <a:rPr lang="en-GB" sz="1100" b="1" dirty="0" smtClean="0">
+                    <a:latin typeface="Airal"/>
+                  </a:rPr>
+                  <a:t>Model Pipeline</a:t>
+                </a:r>
+              </a:p>
+            </p:txBody>
+          </p:sp>
+          <p:grpSp>
+            <p:nvGrpSpPr>
+              <p:cNvPr id="8" name="Group 7"/>
+              <p:cNvGrpSpPr/>
+              <p:nvPr/>
+            </p:nvGrpSpPr>
+            <p:grpSpPr>
+              <a:xfrm>
+                <a:off x="4147236" y="2449777"/>
+                <a:ext cx="1099178" cy="1145126"/>
+                <a:chOff x="3804333" y="1971791"/>
+                <a:chExt cx="1099178" cy="1145126"/>
+              </a:xfrm>
+            </p:grpSpPr>
+            <p:pic>
+              <p:nvPicPr>
+                <p:cNvPr id="10" name="Picture 9"/>
+                <p:cNvPicPr>
+                  <a:picLocks noChangeAspect="1"/>
+                </p:cNvPicPr>
+                <p:nvPr/>
+              </p:nvPicPr>
+              <p:blipFill>
+                <a:blip r:embed="rId3" cstate="print">
+                  <a:extLst>
+                    <a:ext uri="{28A0092B-C50C-407E-A947-70E740481C1C}">
+                      <a14:useLocalDpi xmlns:a14="http://schemas.microsoft.com/office/drawing/2010/main" val="0"/>
+                    </a:ext>
+                  </a:extLst>
+                </a:blip>
+                <a:stretch>
+                  <a:fillRect/>
+                </a:stretch>
+              </p:blipFill>
+              <p:spPr>
+                <a:xfrm>
+                  <a:off x="3927168" y="2285237"/>
+                  <a:ext cx="830008" cy="831680"/>
+                </a:xfrm>
+                <a:prstGeom prst="rect">
+                  <a:avLst/>
+                </a:prstGeom>
+              </p:spPr>
+            </p:pic>
+            <p:sp>
+              <p:nvSpPr>
+                <p:cNvPr id="11" name="Content Placeholder 2"/>
+                <p:cNvSpPr txBox="1">
+                  <a:spLocks/>
+                </p:cNvSpPr>
+                <p:nvPr/>
+              </p:nvSpPr>
+              <p:spPr>
+                <a:xfrm>
+                  <a:off x="3804333" y="1971791"/>
+                  <a:ext cx="1099178" cy="366973"/>
+                </a:xfrm>
+                <a:prstGeom prst="rect">
+                  <a:avLst/>
+                </a:prstGeom>
+                <a:noFill/>
+              </p:spPr>
+              <p:txBody>
+                <a:bodyPr anchor="ctr"/>
+                <a:lstStyle>
+                  <a:lvl1pPr marL="342900" indent="-342900" algn="l" defTabSz="914400" rtl="0" eaLnBrk="1" latinLnBrk="0" hangingPunct="1">
+                    <a:spcBef>
+                      <a:spcPct val="20000"/>
+                    </a:spcBef>
+                    <a:buFont typeface="Arial" pitchFamily="34" charset="0"/>
+                    <a:buChar char="•"/>
+                    <a:defRPr sz="3200" kern="1200">
+                      <a:solidFill>
+                        <a:schemeClr val="tx1"/>
+                      </a:solidFill>
+                      <a:latin typeface="+mn-lt"/>
+                      <a:ea typeface="+mn-ea"/>
+                      <a:cs typeface="+mn-cs"/>
+                    </a:defRPr>
+                  </a:lvl1pPr>
+                  <a:lvl2pPr marL="742950" indent="-285750" algn="l" defTabSz="914400" rtl="0" eaLnBrk="1" latinLnBrk="0" hangingPunct="1">
+                    <a:spcBef>
+                      <a:spcPct val="20000"/>
+                    </a:spcBef>
+                    <a:buFont typeface="Arial" pitchFamily="34" charset="0"/>
+                    <a:buChar char="–"/>
+                    <a:defRPr sz="2800" kern="1200">
+                      <a:solidFill>
+                        <a:schemeClr val="tx1"/>
+                      </a:solidFill>
+                      <a:latin typeface="+mn-lt"/>
+                      <a:ea typeface="+mn-ea"/>
+                      <a:cs typeface="+mn-cs"/>
+                    </a:defRPr>
+                  </a:lvl2pPr>
+                  <a:lvl3pPr marL="1143000" indent="-228600" algn="l" defTabSz="914400" rtl="0" eaLnBrk="1" latinLnBrk="0" hangingPunct="1">
+                    <a:spcBef>
+                      <a:spcPct val="20000"/>
+                    </a:spcBef>
+                    <a:buFont typeface="Arial" pitchFamily="34" charset="0"/>
+                    <a:buChar char="•"/>
+                    <a:defRPr sz="2400" kern="1200">
+                      <a:solidFill>
+                        <a:schemeClr val="tx1"/>
+                      </a:solidFill>
+                      <a:latin typeface="+mn-lt"/>
+                      <a:ea typeface="+mn-ea"/>
+                      <a:cs typeface="+mn-cs"/>
+                    </a:defRPr>
+                  </a:lvl3pPr>
+                  <a:lvl4pPr marL="1600200" indent="-228600" algn="l" defTabSz="914400" rtl="0" eaLnBrk="1" latinLnBrk="0" hangingPunct="1">
+                    <a:spcBef>
+                      <a:spcPct val="20000"/>
+                    </a:spcBef>
+                    <a:buFont typeface="Arial" pitchFamily="34" charset="0"/>
+                    <a:buChar char="–"/>
+                    <a:defRPr sz="2000" kern="1200">
+                      <a:solidFill>
+                        <a:schemeClr val="tx1"/>
+                      </a:solidFill>
+                      <a:latin typeface="+mn-lt"/>
+                      <a:ea typeface="+mn-ea"/>
+                      <a:cs typeface="+mn-cs"/>
+                    </a:defRPr>
+                  </a:lvl4pPr>
+                  <a:lvl5pPr marL="2057400" indent="-228600" algn="l" defTabSz="914400" rtl="0" eaLnBrk="1" latinLnBrk="0" hangingPunct="1">
+                    <a:spcBef>
+                      <a:spcPct val="20000"/>
+                    </a:spcBef>
+                    <a:buFont typeface="Arial" pitchFamily="34" charset="0"/>
+                    <a:buChar char="»"/>
+                    <a:defRPr sz="2000" kern="1200">
+                      <a:solidFill>
+                        <a:schemeClr val="tx1"/>
+                      </a:solidFill>
+                      <a:latin typeface="+mn-lt"/>
+                      <a:ea typeface="+mn-ea"/>
+                      <a:cs typeface="+mn-cs"/>
+                    </a:defRPr>
+                  </a:lvl5pPr>
+                  <a:lvl6pPr marL="2514600" indent="-228600" algn="l" defTabSz="914400" rtl="0" eaLnBrk="1" latinLnBrk="0" hangingPunct="1">
+                    <a:spcBef>
+                      <a:spcPct val="20000"/>
+                    </a:spcBef>
+                    <a:buFont typeface="Arial" pitchFamily="34" charset="0"/>
+                    <a:buChar char="•"/>
+                    <a:defRPr sz="2000" kern="1200">
+                      <a:solidFill>
+                        <a:schemeClr val="tx1"/>
+                      </a:solidFill>
+                      <a:latin typeface="+mn-lt"/>
+                      <a:ea typeface="+mn-ea"/>
+                      <a:cs typeface="+mn-cs"/>
+                    </a:defRPr>
+                  </a:lvl6pPr>
+                  <a:lvl7pPr marL="2971800" indent="-228600" algn="l" defTabSz="914400" rtl="0" eaLnBrk="1" latinLnBrk="0" hangingPunct="1">
+                    <a:spcBef>
+                      <a:spcPct val="20000"/>
+                    </a:spcBef>
+                    <a:buFont typeface="Arial" pitchFamily="34" charset="0"/>
+                    <a:buChar char="•"/>
+                    <a:defRPr sz="2000" kern="1200">
+                      <a:solidFill>
+                        <a:schemeClr val="tx1"/>
+                      </a:solidFill>
+                      <a:latin typeface="+mn-lt"/>
+                      <a:ea typeface="+mn-ea"/>
+                      <a:cs typeface="+mn-cs"/>
+                    </a:defRPr>
+                  </a:lvl7pPr>
+                  <a:lvl8pPr marL="3429000" indent="-228600" algn="l" defTabSz="914400" rtl="0" eaLnBrk="1" latinLnBrk="0" hangingPunct="1">
+                    <a:spcBef>
+                      <a:spcPct val="20000"/>
+                    </a:spcBef>
+                    <a:buFont typeface="Arial" pitchFamily="34" charset="0"/>
+                    <a:buChar char="•"/>
+                    <a:defRPr sz="2000" kern="1200">
+                      <a:solidFill>
+                        <a:schemeClr val="tx1"/>
+                      </a:solidFill>
+                      <a:latin typeface="+mn-lt"/>
+                      <a:ea typeface="+mn-ea"/>
+                      <a:cs typeface="+mn-cs"/>
+                    </a:defRPr>
+                  </a:lvl8pPr>
+                  <a:lvl9pPr marL="3886200" indent="-228600" algn="l" defTabSz="914400" rtl="0" eaLnBrk="1" latinLnBrk="0" hangingPunct="1">
+                    <a:spcBef>
+                      <a:spcPct val="20000"/>
+                    </a:spcBef>
+                    <a:buFont typeface="Arial" pitchFamily="34" charset="0"/>
+                    <a:buChar char="•"/>
+                    <a:defRPr sz="2000" kern="1200">
+                      <a:solidFill>
+                        <a:schemeClr val="tx1"/>
+                      </a:solidFill>
+                      <a:latin typeface="+mn-lt"/>
+                      <a:ea typeface="+mn-ea"/>
+                      <a:cs typeface="+mn-cs"/>
+                    </a:defRPr>
+                  </a:lvl9pPr>
+                </a:lstStyle>
+                <a:p>
+                  <a:pPr marL="0" indent="0" algn="ctr">
+                    <a:buFont typeface="Arial" pitchFamily="34" charset="0"/>
+                    <a:buNone/>
+                  </a:pPr>
+                  <a:r>
+                    <a:rPr lang="en-GB" sz="1100" b="1" dirty="0" smtClean="0">
+                      <a:latin typeface="Airal"/>
+                    </a:rPr>
+                    <a:t>Model</a:t>
+                  </a:r>
+                  <a:endParaRPr lang="en-GB" sz="1100" dirty="0" smtClean="0">
+                    <a:latin typeface="Airal"/>
+                  </a:endParaRPr>
+                </a:p>
+              </p:txBody>
+            </p:sp>
+          </p:grpSp>
+          <p:sp>
+            <p:nvSpPr>
+              <p:cNvPr id="9" name="Rectangle 8"/>
+              <p:cNvSpPr/>
+              <p:nvPr/>
+            </p:nvSpPr>
+            <p:spPr>
+              <a:xfrm>
+                <a:off x="426027" y="2293123"/>
+                <a:ext cx="4820387" cy="1522669"/>
+              </a:xfrm>
+              <a:prstGeom prst="rect">
+                <a:avLst/>
+              </a:prstGeom>
+              <a:noFill/>
+              <a:ln w="28575">
+                <a:prstDash val="sysDot"/>
+              </a:ln>
+            </p:spPr>
+            <p:style>
+              <a:lnRef idx="2">
+                <a:schemeClr val="accent1">
+                  <a:shade val="50000"/>
+                </a:schemeClr>
+              </a:lnRef>
+              <a:fillRef idx="1">
+                <a:schemeClr val="accent1"/>
+              </a:fillRef>
+              <a:effectRef idx="0">
+                <a:schemeClr val="accent1"/>
+              </a:effectRef>
+              <a:fontRef idx="minor">
+                <a:schemeClr val="lt1"/>
+              </a:fontRef>
+            </p:style>
+            <p:txBody>
+              <a:bodyPr rtlCol="0" anchor="ctr"/>
+              <a:lstStyle/>
+              <a:p>
+                <a:r>
+                  <a:rPr lang="en-GB" sz="1300" b="1" dirty="0" smtClean="0">
+                    <a:solidFill>
+                      <a:schemeClr val="tx1"/>
+                    </a:solidFill>
+                    <a:latin typeface="Airal"/>
+                  </a:rPr>
+                  <a:t>Step I:</a:t>
+                </a:r>
+              </a:p>
+              <a:p>
+                <a:r>
+                  <a:rPr lang="en-GB" sz="1300" b="1" dirty="0" smtClean="0">
+                    <a:solidFill>
+                      <a:schemeClr val="tx1"/>
+                    </a:solidFill>
+                    <a:latin typeface="Airal"/>
+                  </a:rPr>
+                  <a:t>Train</a:t>
+                </a:r>
+                <a:endParaRPr lang="en-US" sz="1300" b="1" dirty="0">
+                  <a:solidFill>
+                    <a:schemeClr val="tx1"/>
+                  </a:solidFill>
+                  <a:latin typeface="Airal"/>
+                </a:endParaRPr>
+              </a:p>
+            </p:txBody>
+          </p:sp>
+        </p:grpSp>
+        <p:grpSp>
+          <p:nvGrpSpPr>
+            <p:cNvPr id="14" name="Group 13"/>
+            <p:cNvGrpSpPr/>
+            <p:nvPr/>
+          </p:nvGrpSpPr>
+          <p:grpSpPr>
+            <a:xfrm>
+              <a:off x="1694106" y="3052952"/>
+              <a:ext cx="4820387" cy="1613918"/>
+              <a:chOff x="426027" y="4183013"/>
+              <a:chExt cx="4820387" cy="1613918"/>
+            </a:xfrm>
+          </p:grpSpPr>
+          <p:sp>
+            <p:nvSpPr>
+              <p:cNvPr id="15" name="Right Arrow 14"/>
+              <p:cNvSpPr/>
+              <p:nvPr/>
+            </p:nvSpPr>
+            <p:spPr>
+              <a:xfrm>
+                <a:off x="2574542" y="4848781"/>
+                <a:ext cx="1617896" cy="360040"/>
+              </a:xfrm>
+              <a:prstGeom prst="rightArrow">
+                <a:avLst/>
+              </a:prstGeom>
+              <a:solidFill>
+                <a:schemeClr val="accent1">
+                  <a:lumMod val="20000"/>
+                  <a:lumOff val="80000"/>
+                </a:schemeClr>
+              </a:solidFill>
+              <a:ln>
+                <a:noFill/>
+              </a:ln>
+            </p:spPr>
+            <p:style>
+              <a:lnRef idx="2">
+                <a:schemeClr val="accent1">
+                  <a:shade val="50000"/>
+                </a:schemeClr>
+              </a:lnRef>
+              <a:fillRef idx="1">
+                <a:schemeClr val="accent1"/>
+              </a:fillRef>
+              <a:effectRef idx="0">
+                <a:schemeClr val="accent1"/>
+              </a:effectRef>
+              <a:fontRef idx="minor">
+                <a:schemeClr val="lt1"/>
+              </a:fontRef>
+            </p:style>
+            <p:txBody>
+              <a:bodyPr rtlCol="0" anchor="ctr"/>
+              <a:lstStyle/>
+              <a:p>
+                <a:pPr algn="ctr"/>
+                <a:endParaRPr lang="en-US" sz="1100">
+                  <a:latin typeface="Airal"/>
+                </a:endParaRPr>
+              </a:p>
+            </p:txBody>
+          </p:sp>
+          <p:grpSp>
+            <p:nvGrpSpPr>
+              <p:cNvPr id="16" name="Group 15"/>
+              <p:cNvGrpSpPr/>
+              <p:nvPr/>
+            </p:nvGrpSpPr>
+            <p:grpSpPr>
+              <a:xfrm>
+                <a:off x="1193235" y="4334215"/>
+                <a:ext cx="1318921" cy="1324031"/>
+                <a:chOff x="923558" y="3424614"/>
+                <a:chExt cx="1318921" cy="1324031"/>
+              </a:xfrm>
+            </p:grpSpPr>
+            <p:pic>
+              <p:nvPicPr>
+                <p:cNvPr id="36" name="Picture 35"/>
+                <p:cNvPicPr>
+                  <a:picLocks noChangeAspect="1"/>
+                </p:cNvPicPr>
+                <p:nvPr/>
+              </p:nvPicPr>
+              <p:blipFill>
+                <a:blip r:embed="rId4" cstate="print">
+                  <a:extLst>
+                    <a:ext uri="{28A0092B-C50C-407E-A947-70E740481C1C}">
+                      <a14:useLocalDpi xmlns:a14="http://schemas.microsoft.com/office/drawing/2010/main" val="0"/>
+                    </a:ext>
+                  </a:extLst>
+                </a:blip>
+                <a:stretch>
+                  <a:fillRect/>
+                </a:stretch>
+              </p:blipFill>
+              <p:spPr>
+                <a:xfrm>
+                  <a:off x="1157396" y="3720142"/>
+                  <a:ext cx="273899" cy="273899"/>
+                </a:xfrm>
+                <a:prstGeom prst="rect">
+                  <a:avLst/>
+                </a:prstGeom>
+              </p:spPr>
+            </p:pic>
+            <p:pic>
+              <p:nvPicPr>
+                <p:cNvPr id="37" name="Picture 36"/>
+                <p:cNvPicPr>
+                  <a:picLocks noChangeAspect="1"/>
+                </p:cNvPicPr>
+                <p:nvPr/>
+              </p:nvPicPr>
+              <p:blipFill>
+                <a:blip r:embed="rId4" cstate="print">
+                  <a:extLst>
+                    <a:ext uri="{28A0092B-C50C-407E-A947-70E740481C1C}">
+                      <a14:useLocalDpi xmlns:a14="http://schemas.microsoft.com/office/drawing/2010/main" val="0"/>
+                    </a:ext>
+                  </a:extLst>
+                </a:blip>
+                <a:stretch>
+                  <a:fillRect/>
+                </a:stretch>
+              </p:blipFill>
+              <p:spPr>
+                <a:xfrm>
+                  <a:off x="1536809" y="3583192"/>
+                  <a:ext cx="273899" cy="273899"/>
+                </a:xfrm>
+                <a:prstGeom prst="rect">
+                  <a:avLst/>
+                </a:prstGeom>
+              </p:spPr>
+            </p:pic>
+            <p:pic>
+              <p:nvPicPr>
+                <p:cNvPr id="38" name="Picture 37"/>
+                <p:cNvPicPr>
+                  <a:picLocks noChangeAspect="1"/>
+                </p:cNvPicPr>
+                <p:nvPr/>
+              </p:nvPicPr>
+              <p:blipFill>
+                <a:blip r:embed="rId4" cstate="print">
+                  <a:extLst>
+                    <a:ext uri="{28A0092B-C50C-407E-A947-70E740481C1C}">
+                      <a14:useLocalDpi xmlns:a14="http://schemas.microsoft.com/office/drawing/2010/main" val="0"/>
+                    </a:ext>
+                  </a:extLst>
+                </a:blip>
+                <a:stretch>
+                  <a:fillRect/>
+                </a:stretch>
+              </p:blipFill>
+              <p:spPr>
+                <a:xfrm>
+                  <a:off x="1020446" y="4119200"/>
+                  <a:ext cx="273899" cy="273899"/>
+                </a:xfrm>
+                <a:prstGeom prst="rect">
+                  <a:avLst/>
+                </a:prstGeom>
+              </p:spPr>
+            </p:pic>
+            <p:pic>
+              <p:nvPicPr>
+                <p:cNvPr id="39" name="Picture 38"/>
+                <p:cNvPicPr>
+                  <a:picLocks noChangeAspect="1"/>
+                </p:cNvPicPr>
+                <p:nvPr/>
+              </p:nvPicPr>
+              <p:blipFill>
+                <a:blip r:embed="rId4" cstate="print">
+                  <a:extLst>
+                    <a:ext uri="{28A0092B-C50C-407E-A947-70E740481C1C}">
+                      <a14:useLocalDpi xmlns:a14="http://schemas.microsoft.com/office/drawing/2010/main" val="0"/>
+                    </a:ext>
+                  </a:extLst>
+                </a:blip>
+                <a:stretch>
+                  <a:fillRect/>
+                </a:stretch>
+              </p:blipFill>
+              <p:spPr>
+                <a:xfrm>
+                  <a:off x="1399859" y="3976026"/>
+                  <a:ext cx="273899" cy="273899"/>
+                </a:xfrm>
+                <a:prstGeom prst="rect">
+                  <a:avLst/>
+                </a:prstGeom>
+              </p:spPr>
+            </p:pic>
+            <p:pic>
+              <p:nvPicPr>
+                <p:cNvPr id="40" name="Picture 39"/>
+                <p:cNvPicPr>
+                  <a:picLocks noChangeAspect="1"/>
+                </p:cNvPicPr>
+                <p:nvPr/>
+              </p:nvPicPr>
+              <p:blipFill>
+                <a:blip r:embed="rId4" cstate="print">
+                  <a:extLst>
+                    <a:ext uri="{28A0092B-C50C-407E-A947-70E740481C1C}">
+                      <a14:useLocalDpi xmlns:a14="http://schemas.microsoft.com/office/drawing/2010/main" val="0"/>
+                    </a:ext>
+                  </a:extLst>
+                </a:blip>
+                <a:stretch>
+                  <a:fillRect/>
+                </a:stretch>
+              </p:blipFill>
+              <p:spPr>
+                <a:xfrm>
+                  <a:off x="1683746" y="4146441"/>
+                  <a:ext cx="273899" cy="273899"/>
+                </a:xfrm>
+                <a:prstGeom prst="rect">
+                  <a:avLst/>
+                </a:prstGeom>
+              </p:spPr>
+            </p:pic>
+            <p:sp>
+              <p:nvSpPr>
+                <p:cNvPr id="41" name="Oval 40"/>
+                <p:cNvSpPr/>
+                <p:nvPr/>
+              </p:nvSpPr>
+              <p:spPr>
+                <a:xfrm>
+                  <a:off x="923558" y="3424614"/>
+                  <a:ext cx="1318921" cy="1324031"/>
+                </a:xfrm>
+                <a:prstGeom prst="ellipse">
+                  <a:avLst/>
+                </a:prstGeom>
+                <a:noFill/>
+                <a:ln w="38100">
+                  <a:solidFill>
+                    <a:srgbClr val="00B0F0"/>
+                  </a:solidFill>
+                  <a:prstDash val="sysDash"/>
+                </a:ln>
+              </p:spPr>
+              <p:style>
+                <a:lnRef idx="2">
+                  <a:schemeClr val="accent1">
+                    <a:shade val="50000"/>
+                  </a:schemeClr>
+                </a:lnRef>
+                <a:fillRef idx="1">
+                  <a:schemeClr val="accent1"/>
+                </a:fillRef>
+                <a:effectRef idx="0">
+                  <a:schemeClr val="accent1"/>
+                </a:effectRef>
+                <a:fontRef idx="minor">
+                  <a:schemeClr val="lt1"/>
+                </a:fontRef>
+              </p:style>
+              <p:txBody>
+                <a:bodyPr rtlCol="0" anchor="ctr"/>
+                <a:lstStyle/>
+                <a:p>
+                  <a:pPr algn="ctr"/>
+                  <a:endParaRPr lang="en-US" sz="1100">
+                    <a:latin typeface="Airal"/>
+                  </a:endParaRPr>
+                </a:p>
+              </p:txBody>
+            </p:sp>
+          </p:grpSp>
+          <p:grpSp>
+            <p:nvGrpSpPr>
+              <p:cNvPr id="17" name="Group 16"/>
+              <p:cNvGrpSpPr/>
+              <p:nvPr/>
+            </p:nvGrpSpPr>
+            <p:grpSpPr>
+              <a:xfrm>
+                <a:off x="2728880" y="4334215"/>
+                <a:ext cx="1099178" cy="1145126"/>
+                <a:chOff x="4322033" y="1929438"/>
+                <a:chExt cx="1099178" cy="1145126"/>
+              </a:xfrm>
+            </p:grpSpPr>
+            <p:pic>
+              <p:nvPicPr>
+                <p:cNvPr id="34" name="Picture 33"/>
+                <p:cNvPicPr>
+                  <a:picLocks noChangeAspect="1"/>
+                </p:cNvPicPr>
+                <p:nvPr/>
+              </p:nvPicPr>
+              <p:blipFill>
+                <a:blip r:embed="rId3" cstate="print">
+                  <a:extLst>
+                    <a:ext uri="{28A0092B-C50C-407E-A947-70E740481C1C}">
+                      <a14:useLocalDpi xmlns:a14="http://schemas.microsoft.com/office/drawing/2010/main" val="0"/>
+                    </a:ext>
+                  </a:extLst>
+                </a:blip>
+                <a:stretch>
+                  <a:fillRect/>
+                </a:stretch>
+              </p:blipFill>
+              <p:spPr>
+                <a:xfrm>
+                  <a:off x="4444868" y="2242884"/>
+                  <a:ext cx="830008" cy="831680"/>
+                </a:xfrm>
+                <a:prstGeom prst="rect">
+                  <a:avLst/>
+                </a:prstGeom>
+              </p:spPr>
+            </p:pic>
+            <p:sp>
+              <p:nvSpPr>
+                <p:cNvPr id="35" name="Content Placeholder 2"/>
+                <p:cNvSpPr txBox="1">
+                  <a:spLocks/>
+                </p:cNvSpPr>
+                <p:nvPr/>
+              </p:nvSpPr>
+              <p:spPr>
+                <a:xfrm>
+                  <a:off x="4322033" y="1929438"/>
+                  <a:ext cx="1099178" cy="366973"/>
+                </a:xfrm>
+                <a:prstGeom prst="rect">
+                  <a:avLst/>
+                </a:prstGeom>
+                <a:noFill/>
+              </p:spPr>
+              <p:txBody>
+                <a:bodyPr anchor="ctr"/>
+                <a:lstStyle>
+                  <a:lvl1pPr marL="342900" indent="-342900" algn="l" defTabSz="914400" rtl="0" eaLnBrk="1" latinLnBrk="0" hangingPunct="1">
+                    <a:spcBef>
+                      <a:spcPct val="20000"/>
+                    </a:spcBef>
+                    <a:buFont typeface="Arial" pitchFamily="34" charset="0"/>
+                    <a:buChar char="•"/>
+                    <a:defRPr sz="3200" kern="1200">
+                      <a:solidFill>
+                        <a:schemeClr val="tx1"/>
+                      </a:solidFill>
+                      <a:latin typeface="+mn-lt"/>
+                      <a:ea typeface="+mn-ea"/>
+                      <a:cs typeface="+mn-cs"/>
+                    </a:defRPr>
+                  </a:lvl1pPr>
+                  <a:lvl2pPr marL="742950" indent="-285750" algn="l" defTabSz="914400" rtl="0" eaLnBrk="1" latinLnBrk="0" hangingPunct="1">
+                    <a:spcBef>
+                      <a:spcPct val="20000"/>
+                    </a:spcBef>
+                    <a:buFont typeface="Arial" pitchFamily="34" charset="0"/>
+                    <a:buChar char="–"/>
+                    <a:defRPr sz="2800" kern="1200">
+                      <a:solidFill>
+                        <a:schemeClr val="tx1"/>
+                      </a:solidFill>
+                      <a:latin typeface="+mn-lt"/>
+                      <a:ea typeface="+mn-ea"/>
+                      <a:cs typeface="+mn-cs"/>
+                    </a:defRPr>
+                  </a:lvl2pPr>
+                  <a:lvl3pPr marL="1143000" indent="-228600" algn="l" defTabSz="914400" rtl="0" eaLnBrk="1" latinLnBrk="0" hangingPunct="1">
+                    <a:spcBef>
+                      <a:spcPct val="20000"/>
+                    </a:spcBef>
+                    <a:buFont typeface="Arial" pitchFamily="34" charset="0"/>
+                    <a:buChar char="•"/>
+                    <a:defRPr sz="2400" kern="1200">
+                      <a:solidFill>
+                        <a:schemeClr val="tx1"/>
+                      </a:solidFill>
+                      <a:latin typeface="+mn-lt"/>
+                      <a:ea typeface="+mn-ea"/>
+                      <a:cs typeface="+mn-cs"/>
+                    </a:defRPr>
+                  </a:lvl3pPr>
+                  <a:lvl4pPr marL="1600200" indent="-228600" algn="l" defTabSz="914400" rtl="0" eaLnBrk="1" latinLnBrk="0" hangingPunct="1">
+                    <a:spcBef>
+                      <a:spcPct val="20000"/>
+                    </a:spcBef>
+                    <a:buFont typeface="Arial" pitchFamily="34" charset="0"/>
+                    <a:buChar char="–"/>
+                    <a:defRPr sz="2000" kern="1200">
+                      <a:solidFill>
+                        <a:schemeClr val="tx1"/>
+                      </a:solidFill>
+                      <a:latin typeface="+mn-lt"/>
+                      <a:ea typeface="+mn-ea"/>
+                      <a:cs typeface="+mn-cs"/>
+                    </a:defRPr>
+                  </a:lvl4pPr>
+                  <a:lvl5pPr marL="2057400" indent="-228600" algn="l" defTabSz="914400" rtl="0" eaLnBrk="1" latinLnBrk="0" hangingPunct="1">
+                    <a:spcBef>
+                      <a:spcPct val="20000"/>
+                    </a:spcBef>
+                    <a:buFont typeface="Arial" pitchFamily="34" charset="0"/>
+                    <a:buChar char="»"/>
+                    <a:defRPr sz="2000" kern="1200">
+                      <a:solidFill>
+                        <a:schemeClr val="tx1"/>
+                      </a:solidFill>
+                      <a:latin typeface="+mn-lt"/>
+                      <a:ea typeface="+mn-ea"/>
+                      <a:cs typeface="+mn-cs"/>
+                    </a:defRPr>
+                  </a:lvl5pPr>
+                  <a:lvl6pPr marL="2514600" indent="-228600" algn="l" defTabSz="914400" rtl="0" eaLnBrk="1" latinLnBrk="0" hangingPunct="1">
+                    <a:spcBef>
+                      <a:spcPct val="20000"/>
+                    </a:spcBef>
+                    <a:buFont typeface="Arial" pitchFamily="34" charset="0"/>
+                    <a:buChar char="•"/>
+                    <a:defRPr sz="2000" kern="1200">
+                      <a:solidFill>
+                        <a:schemeClr val="tx1"/>
+                      </a:solidFill>
+                      <a:latin typeface="+mn-lt"/>
+                      <a:ea typeface="+mn-ea"/>
+                      <a:cs typeface="+mn-cs"/>
+                    </a:defRPr>
+                  </a:lvl6pPr>
+                  <a:lvl7pPr marL="2971800" indent="-228600" algn="l" defTabSz="914400" rtl="0" eaLnBrk="1" latinLnBrk="0" hangingPunct="1">
+                    <a:spcBef>
+                      <a:spcPct val="20000"/>
+                    </a:spcBef>
+                    <a:buFont typeface="Arial" pitchFamily="34" charset="0"/>
+                    <a:buChar char="•"/>
+                    <a:defRPr sz="2000" kern="1200">
+                      <a:solidFill>
+                        <a:schemeClr val="tx1"/>
+                      </a:solidFill>
+                      <a:latin typeface="+mn-lt"/>
+                      <a:ea typeface="+mn-ea"/>
+                      <a:cs typeface="+mn-cs"/>
+                    </a:defRPr>
+                  </a:lvl7pPr>
+                  <a:lvl8pPr marL="3429000" indent="-228600" algn="l" defTabSz="914400" rtl="0" eaLnBrk="1" latinLnBrk="0" hangingPunct="1">
+                    <a:spcBef>
+                      <a:spcPct val="20000"/>
+                    </a:spcBef>
+                    <a:buFont typeface="Arial" pitchFamily="34" charset="0"/>
+                    <a:buChar char="•"/>
+                    <a:defRPr sz="2000" kern="1200">
+                      <a:solidFill>
+                        <a:schemeClr val="tx1"/>
+                      </a:solidFill>
+                      <a:latin typeface="+mn-lt"/>
+                      <a:ea typeface="+mn-ea"/>
+                      <a:cs typeface="+mn-cs"/>
+                    </a:defRPr>
+                  </a:lvl8pPr>
+                  <a:lvl9pPr marL="3886200" indent="-228600" algn="l" defTabSz="914400" rtl="0" eaLnBrk="1" latinLnBrk="0" hangingPunct="1">
+                    <a:spcBef>
+                      <a:spcPct val="20000"/>
+                    </a:spcBef>
+                    <a:buFont typeface="Arial" pitchFamily="34" charset="0"/>
+                    <a:buChar char="•"/>
+                    <a:defRPr sz="2000" kern="1200">
+                      <a:solidFill>
+                        <a:schemeClr val="tx1"/>
+                      </a:solidFill>
+                      <a:latin typeface="+mn-lt"/>
+                      <a:ea typeface="+mn-ea"/>
+                      <a:cs typeface="+mn-cs"/>
+                    </a:defRPr>
+                  </a:lvl9pPr>
+                </a:lstStyle>
+                <a:p>
+                  <a:pPr marL="0" indent="0" algn="ctr">
+                    <a:buFont typeface="Arial" pitchFamily="34" charset="0"/>
+                    <a:buNone/>
+                  </a:pPr>
+                  <a:r>
+                    <a:rPr lang="en-GB" sz="1100" b="1" dirty="0" smtClean="0">
+                      <a:latin typeface="Airal"/>
+                    </a:rPr>
+                    <a:t>Model</a:t>
+                  </a:r>
+                  <a:endParaRPr lang="en-GB" sz="1100" dirty="0" smtClean="0">
+                    <a:latin typeface="Airal"/>
+                  </a:endParaRPr>
+                </a:p>
+              </p:txBody>
+            </p:sp>
+          </p:grpSp>
+          <p:grpSp>
+            <p:nvGrpSpPr>
+              <p:cNvPr id="18" name="Group 17"/>
+              <p:cNvGrpSpPr/>
+              <p:nvPr/>
+            </p:nvGrpSpPr>
+            <p:grpSpPr>
+              <a:xfrm>
+                <a:off x="4209849" y="4218894"/>
+                <a:ext cx="972469" cy="273899"/>
+                <a:chOff x="3785201" y="3763969"/>
+                <a:chExt cx="972469" cy="273899"/>
+              </a:xfrm>
+            </p:grpSpPr>
+            <p:pic>
+              <p:nvPicPr>
+                <p:cNvPr id="32" name="Picture 31"/>
+                <p:cNvPicPr>
+                  <a:picLocks noChangeAspect="1"/>
+                </p:cNvPicPr>
+                <p:nvPr/>
+              </p:nvPicPr>
+              <p:blipFill>
+                <a:blip r:embed="rId4" cstate="print">
+                  <a:duotone>
+                    <a:schemeClr val="accent6">
+                      <a:shade val="45000"/>
+                      <a:satMod val="135000"/>
+                    </a:schemeClr>
+                    <a:prstClr val="white"/>
+                  </a:duotone>
+                  <a:extLst>
+                    <a:ext uri="{28A0092B-C50C-407E-A947-70E740481C1C}">
+                      <a14:useLocalDpi xmlns:a14="http://schemas.microsoft.com/office/drawing/2010/main" val="0"/>
+                    </a:ext>
+                  </a:extLst>
+                </a:blip>
+                <a:stretch>
+                  <a:fillRect/>
+                </a:stretch>
+              </p:blipFill>
+              <p:spPr>
+                <a:xfrm>
+                  <a:off x="3785201" y="3763969"/>
+                  <a:ext cx="273899" cy="273899"/>
+                </a:xfrm>
+                <a:prstGeom prst="rect">
+                  <a:avLst/>
+                </a:prstGeom>
+              </p:spPr>
+            </p:pic>
+            <p:sp>
+              <p:nvSpPr>
+                <p:cNvPr id="33" name="Content Placeholder 2"/>
+                <p:cNvSpPr txBox="1">
+                  <a:spLocks/>
+                </p:cNvSpPr>
+                <p:nvPr/>
+              </p:nvSpPr>
+              <p:spPr>
+                <a:xfrm>
+                  <a:off x="4183810" y="3800722"/>
+                  <a:ext cx="573860" cy="210837"/>
+                </a:xfrm>
+                <a:prstGeom prst="rect">
+                  <a:avLst/>
+                </a:prstGeom>
+                <a:solidFill>
+                  <a:schemeClr val="accent6">
+                    <a:lumMod val="20000"/>
+                    <a:lumOff val="80000"/>
+                  </a:schemeClr>
+                </a:solidFill>
+                <a:ln w="38100">
+                  <a:solidFill>
+                    <a:schemeClr val="bg1"/>
+                  </a:solidFill>
+                </a:ln>
+              </p:spPr>
+              <p:txBody>
+                <a:bodyPr anchor="ctr"/>
+                <a:lstStyle>
+                  <a:lvl1pPr marL="342900" indent="-342900" algn="l" defTabSz="914400" rtl="0" eaLnBrk="1" latinLnBrk="0" hangingPunct="1">
+                    <a:spcBef>
+                      <a:spcPct val="20000"/>
+                    </a:spcBef>
+                    <a:buFont typeface="Arial" pitchFamily="34" charset="0"/>
+                    <a:buChar char="•"/>
+                    <a:defRPr sz="3200" kern="1200">
+                      <a:solidFill>
+                        <a:schemeClr val="tx1"/>
+                      </a:solidFill>
+                      <a:latin typeface="+mn-lt"/>
+                      <a:ea typeface="+mn-ea"/>
+                      <a:cs typeface="+mn-cs"/>
+                    </a:defRPr>
+                  </a:lvl1pPr>
+                  <a:lvl2pPr marL="742950" indent="-285750" algn="l" defTabSz="914400" rtl="0" eaLnBrk="1" latinLnBrk="0" hangingPunct="1">
+                    <a:spcBef>
+                      <a:spcPct val="20000"/>
+                    </a:spcBef>
+                    <a:buFont typeface="Arial" pitchFamily="34" charset="0"/>
+                    <a:buChar char="–"/>
+                    <a:defRPr sz="2800" kern="1200">
+                      <a:solidFill>
+                        <a:schemeClr val="tx1"/>
+                      </a:solidFill>
+                      <a:latin typeface="+mn-lt"/>
+                      <a:ea typeface="+mn-ea"/>
+                      <a:cs typeface="+mn-cs"/>
+                    </a:defRPr>
+                  </a:lvl2pPr>
+                  <a:lvl3pPr marL="1143000" indent="-228600" algn="l" defTabSz="914400" rtl="0" eaLnBrk="1" latinLnBrk="0" hangingPunct="1">
+                    <a:spcBef>
+                      <a:spcPct val="20000"/>
+                    </a:spcBef>
+                    <a:buFont typeface="Arial" pitchFamily="34" charset="0"/>
+                    <a:buChar char="•"/>
+                    <a:defRPr sz="2400" kern="1200">
+                      <a:solidFill>
+                        <a:schemeClr val="tx1"/>
+                      </a:solidFill>
+                      <a:latin typeface="+mn-lt"/>
+                      <a:ea typeface="+mn-ea"/>
+                      <a:cs typeface="+mn-cs"/>
+                    </a:defRPr>
+                  </a:lvl3pPr>
+                  <a:lvl4pPr marL="1600200" indent="-228600" algn="l" defTabSz="914400" rtl="0" eaLnBrk="1" latinLnBrk="0" hangingPunct="1">
+                    <a:spcBef>
+                      <a:spcPct val="20000"/>
+                    </a:spcBef>
+                    <a:buFont typeface="Arial" pitchFamily="34" charset="0"/>
+                    <a:buChar char="–"/>
+                    <a:defRPr sz="2000" kern="1200">
+                      <a:solidFill>
+                        <a:schemeClr val="tx1"/>
+                      </a:solidFill>
+                      <a:latin typeface="+mn-lt"/>
+                      <a:ea typeface="+mn-ea"/>
+                      <a:cs typeface="+mn-cs"/>
+                    </a:defRPr>
+                  </a:lvl4pPr>
+                  <a:lvl5pPr marL="2057400" indent="-228600" algn="l" defTabSz="914400" rtl="0" eaLnBrk="1" latinLnBrk="0" hangingPunct="1">
+                    <a:spcBef>
+                      <a:spcPct val="20000"/>
+                    </a:spcBef>
+                    <a:buFont typeface="Arial" pitchFamily="34" charset="0"/>
+                    <a:buChar char="»"/>
+                    <a:defRPr sz="2000" kern="1200">
+                      <a:solidFill>
+                        <a:schemeClr val="tx1"/>
+                      </a:solidFill>
+                      <a:latin typeface="+mn-lt"/>
+                      <a:ea typeface="+mn-ea"/>
+                      <a:cs typeface="+mn-cs"/>
+                    </a:defRPr>
+                  </a:lvl5pPr>
+                  <a:lvl6pPr marL="2514600" indent="-228600" algn="l" defTabSz="914400" rtl="0" eaLnBrk="1" latinLnBrk="0" hangingPunct="1">
+                    <a:spcBef>
+                      <a:spcPct val="20000"/>
+                    </a:spcBef>
+                    <a:buFont typeface="Arial" pitchFamily="34" charset="0"/>
+                    <a:buChar char="•"/>
+                    <a:defRPr sz="2000" kern="1200">
+                      <a:solidFill>
+                        <a:schemeClr val="tx1"/>
+                      </a:solidFill>
+                      <a:latin typeface="+mn-lt"/>
+                      <a:ea typeface="+mn-ea"/>
+                      <a:cs typeface="+mn-cs"/>
+                    </a:defRPr>
+                  </a:lvl6pPr>
+                  <a:lvl7pPr marL="2971800" indent="-228600" algn="l" defTabSz="914400" rtl="0" eaLnBrk="1" latinLnBrk="0" hangingPunct="1">
+                    <a:spcBef>
+                      <a:spcPct val="20000"/>
+                    </a:spcBef>
+                    <a:buFont typeface="Arial" pitchFamily="34" charset="0"/>
+                    <a:buChar char="•"/>
+                    <a:defRPr sz="2000" kern="1200">
+                      <a:solidFill>
+                        <a:schemeClr val="tx1"/>
+                      </a:solidFill>
+                      <a:latin typeface="+mn-lt"/>
+                      <a:ea typeface="+mn-ea"/>
+                      <a:cs typeface="+mn-cs"/>
+                    </a:defRPr>
+                  </a:lvl7pPr>
+                  <a:lvl8pPr marL="3429000" indent="-228600" algn="l" defTabSz="914400" rtl="0" eaLnBrk="1" latinLnBrk="0" hangingPunct="1">
+                    <a:spcBef>
+                      <a:spcPct val="20000"/>
+                    </a:spcBef>
+                    <a:buFont typeface="Arial" pitchFamily="34" charset="0"/>
+                    <a:buChar char="•"/>
+                    <a:defRPr sz="2000" kern="1200">
+                      <a:solidFill>
+                        <a:schemeClr val="tx1"/>
+                      </a:solidFill>
+                      <a:latin typeface="+mn-lt"/>
+                      <a:ea typeface="+mn-ea"/>
+                      <a:cs typeface="+mn-cs"/>
+                    </a:defRPr>
+                  </a:lvl8pPr>
+                  <a:lvl9pPr marL="3886200" indent="-228600" algn="l" defTabSz="914400" rtl="0" eaLnBrk="1" latinLnBrk="0" hangingPunct="1">
+                    <a:spcBef>
+                      <a:spcPct val="20000"/>
+                    </a:spcBef>
+                    <a:buFont typeface="Arial" pitchFamily="34" charset="0"/>
+                    <a:buChar char="•"/>
+                    <a:defRPr sz="2000" kern="1200">
+                      <a:solidFill>
+                        <a:schemeClr val="tx1"/>
+                      </a:solidFill>
+                      <a:latin typeface="+mn-lt"/>
+                      <a:ea typeface="+mn-ea"/>
+                      <a:cs typeface="+mn-cs"/>
+                    </a:defRPr>
+                  </a:lvl9pPr>
+                </a:lstStyle>
+                <a:p>
+                  <a:pPr marL="0" indent="0" algn="ctr">
+                    <a:buFont typeface="Arial" pitchFamily="34" charset="0"/>
+                    <a:buNone/>
+                  </a:pPr>
+                  <a:r>
+                    <a:rPr lang="en-GB" sz="1100" b="1" dirty="0" smtClean="0">
+                      <a:latin typeface="Airal"/>
+                    </a:rPr>
+                    <a:t>2%</a:t>
+                  </a:r>
+                </a:p>
+              </p:txBody>
+            </p:sp>
+          </p:grpSp>
+          <p:grpSp>
+            <p:nvGrpSpPr>
+              <p:cNvPr id="19" name="Group 18"/>
+              <p:cNvGrpSpPr/>
+              <p:nvPr/>
+            </p:nvGrpSpPr>
+            <p:grpSpPr>
+              <a:xfrm>
+                <a:off x="4219234" y="4527548"/>
+                <a:ext cx="972469" cy="273899"/>
+                <a:chOff x="3785201" y="3763969"/>
+                <a:chExt cx="972469" cy="273899"/>
+              </a:xfrm>
+            </p:grpSpPr>
+            <p:pic>
+              <p:nvPicPr>
+                <p:cNvPr id="30" name="Picture 29"/>
+                <p:cNvPicPr>
+                  <a:picLocks noChangeAspect="1"/>
+                </p:cNvPicPr>
+                <p:nvPr/>
+              </p:nvPicPr>
+              <p:blipFill>
+                <a:blip r:embed="rId4" cstate="print">
+                  <a:duotone>
+                    <a:schemeClr val="accent6">
+                      <a:shade val="45000"/>
+                      <a:satMod val="135000"/>
+                    </a:schemeClr>
+                    <a:prstClr val="white"/>
+                  </a:duotone>
+                  <a:extLst>
+                    <a:ext uri="{28A0092B-C50C-407E-A947-70E740481C1C}">
+                      <a14:useLocalDpi xmlns:a14="http://schemas.microsoft.com/office/drawing/2010/main" val="0"/>
+                    </a:ext>
+                  </a:extLst>
+                </a:blip>
+                <a:stretch>
+                  <a:fillRect/>
+                </a:stretch>
+              </p:blipFill>
+              <p:spPr>
+                <a:xfrm>
+                  <a:off x="3785201" y="3763969"/>
+                  <a:ext cx="273899" cy="273899"/>
+                </a:xfrm>
+                <a:prstGeom prst="rect">
+                  <a:avLst/>
+                </a:prstGeom>
+              </p:spPr>
+            </p:pic>
+            <p:sp>
+              <p:nvSpPr>
+                <p:cNvPr id="31" name="Content Placeholder 2"/>
+                <p:cNvSpPr txBox="1">
+                  <a:spLocks/>
+                </p:cNvSpPr>
+                <p:nvPr/>
+              </p:nvSpPr>
+              <p:spPr>
+                <a:xfrm>
+                  <a:off x="4183810" y="3800722"/>
+                  <a:ext cx="573860" cy="210837"/>
+                </a:xfrm>
+                <a:prstGeom prst="rect">
+                  <a:avLst/>
+                </a:prstGeom>
+                <a:solidFill>
+                  <a:schemeClr val="accent6">
+                    <a:lumMod val="20000"/>
+                    <a:lumOff val="80000"/>
+                  </a:schemeClr>
+                </a:solidFill>
+                <a:ln w="38100">
+                  <a:solidFill>
+                    <a:schemeClr val="bg1"/>
+                  </a:solidFill>
+                </a:ln>
+              </p:spPr>
+              <p:txBody>
+                <a:bodyPr anchor="ctr"/>
+                <a:lstStyle>
+                  <a:lvl1pPr marL="342900" indent="-342900" algn="l" defTabSz="914400" rtl="0" eaLnBrk="1" latinLnBrk="0" hangingPunct="1">
+                    <a:spcBef>
+                      <a:spcPct val="20000"/>
+                    </a:spcBef>
+                    <a:buFont typeface="Arial" pitchFamily="34" charset="0"/>
+                    <a:buChar char="•"/>
+                    <a:defRPr sz="3200" kern="1200">
+                      <a:solidFill>
+                        <a:schemeClr val="tx1"/>
+                      </a:solidFill>
+                      <a:latin typeface="+mn-lt"/>
+                      <a:ea typeface="+mn-ea"/>
+                      <a:cs typeface="+mn-cs"/>
+                    </a:defRPr>
+                  </a:lvl1pPr>
+                  <a:lvl2pPr marL="742950" indent="-285750" algn="l" defTabSz="914400" rtl="0" eaLnBrk="1" latinLnBrk="0" hangingPunct="1">
+                    <a:spcBef>
+                      <a:spcPct val="20000"/>
+                    </a:spcBef>
+                    <a:buFont typeface="Arial" pitchFamily="34" charset="0"/>
+                    <a:buChar char="–"/>
+                    <a:defRPr sz="2800" kern="1200">
+                      <a:solidFill>
+                        <a:schemeClr val="tx1"/>
+                      </a:solidFill>
+                      <a:latin typeface="+mn-lt"/>
+                      <a:ea typeface="+mn-ea"/>
+                      <a:cs typeface="+mn-cs"/>
+                    </a:defRPr>
+                  </a:lvl2pPr>
+                  <a:lvl3pPr marL="1143000" indent="-228600" algn="l" defTabSz="914400" rtl="0" eaLnBrk="1" latinLnBrk="0" hangingPunct="1">
+                    <a:spcBef>
+                      <a:spcPct val="20000"/>
+                    </a:spcBef>
+                    <a:buFont typeface="Arial" pitchFamily="34" charset="0"/>
+                    <a:buChar char="•"/>
+                    <a:defRPr sz="2400" kern="1200">
+                      <a:solidFill>
+                        <a:schemeClr val="tx1"/>
+                      </a:solidFill>
+                      <a:latin typeface="+mn-lt"/>
+                      <a:ea typeface="+mn-ea"/>
+                      <a:cs typeface="+mn-cs"/>
+                    </a:defRPr>
+                  </a:lvl3pPr>
+                  <a:lvl4pPr marL="1600200" indent="-228600" algn="l" defTabSz="914400" rtl="0" eaLnBrk="1" latinLnBrk="0" hangingPunct="1">
+                    <a:spcBef>
+                      <a:spcPct val="20000"/>
+                    </a:spcBef>
+                    <a:buFont typeface="Arial" pitchFamily="34" charset="0"/>
+                    <a:buChar char="–"/>
+                    <a:defRPr sz="2000" kern="1200">
+                      <a:solidFill>
+                        <a:schemeClr val="tx1"/>
+                      </a:solidFill>
+                      <a:latin typeface="+mn-lt"/>
+                      <a:ea typeface="+mn-ea"/>
+                      <a:cs typeface="+mn-cs"/>
+                    </a:defRPr>
+                  </a:lvl4pPr>
+                  <a:lvl5pPr marL="2057400" indent="-228600" algn="l" defTabSz="914400" rtl="0" eaLnBrk="1" latinLnBrk="0" hangingPunct="1">
+                    <a:spcBef>
+                      <a:spcPct val="20000"/>
+                    </a:spcBef>
+                    <a:buFont typeface="Arial" pitchFamily="34" charset="0"/>
+                    <a:buChar char="»"/>
+                    <a:defRPr sz="2000" kern="1200">
+                      <a:solidFill>
+                        <a:schemeClr val="tx1"/>
+                      </a:solidFill>
+                      <a:latin typeface="+mn-lt"/>
+                      <a:ea typeface="+mn-ea"/>
+                      <a:cs typeface="+mn-cs"/>
+                    </a:defRPr>
+                  </a:lvl5pPr>
+                  <a:lvl6pPr marL="2514600" indent="-228600" algn="l" defTabSz="914400" rtl="0" eaLnBrk="1" latinLnBrk="0" hangingPunct="1">
+                    <a:spcBef>
+                      <a:spcPct val="20000"/>
+                    </a:spcBef>
+                    <a:buFont typeface="Arial" pitchFamily="34" charset="0"/>
+                    <a:buChar char="•"/>
+                    <a:defRPr sz="2000" kern="1200">
+                      <a:solidFill>
+                        <a:schemeClr val="tx1"/>
+                      </a:solidFill>
+                      <a:latin typeface="+mn-lt"/>
+                      <a:ea typeface="+mn-ea"/>
+                      <a:cs typeface="+mn-cs"/>
+                    </a:defRPr>
+                  </a:lvl6pPr>
+                  <a:lvl7pPr marL="2971800" indent="-228600" algn="l" defTabSz="914400" rtl="0" eaLnBrk="1" latinLnBrk="0" hangingPunct="1">
+                    <a:spcBef>
+                      <a:spcPct val="20000"/>
+                    </a:spcBef>
+                    <a:buFont typeface="Arial" pitchFamily="34" charset="0"/>
+                    <a:buChar char="•"/>
+                    <a:defRPr sz="2000" kern="1200">
+                      <a:solidFill>
+                        <a:schemeClr val="tx1"/>
+                      </a:solidFill>
+                      <a:latin typeface="+mn-lt"/>
+                      <a:ea typeface="+mn-ea"/>
+                      <a:cs typeface="+mn-cs"/>
+                    </a:defRPr>
+                  </a:lvl7pPr>
+                  <a:lvl8pPr marL="3429000" indent="-228600" algn="l" defTabSz="914400" rtl="0" eaLnBrk="1" latinLnBrk="0" hangingPunct="1">
+                    <a:spcBef>
+                      <a:spcPct val="20000"/>
+                    </a:spcBef>
+                    <a:buFont typeface="Arial" pitchFamily="34" charset="0"/>
+                    <a:buChar char="•"/>
+                    <a:defRPr sz="2000" kern="1200">
+                      <a:solidFill>
+                        <a:schemeClr val="tx1"/>
+                      </a:solidFill>
+                      <a:latin typeface="+mn-lt"/>
+                      <a:ea typeface="+mn-ea"/>
+                      <a:cs typeface="+mn-cs"/>
+                    </a:defRPr>
+                  </a:lvl8pPr>
+                  <a:lvl9pPr marL="3886200" indent="-228600" algn="l" defTabSz="914400" rtl="0" eaLnBrk="1" latinLnBrk="0" hangingPunct="1">
+                    <a:spcBef>
+                      <a:spcPct val="20000"/>
+                    </a:spcBef>
+                    <a:buFont typeface="Arial" pitchFamily="34" charset="0"/>
+                    <a:buChar char="•"/>
+                    <a:defRPr sz="2000" kern="1200">
+                      <a:solidFill>
+                        <a:schemeClr val="tx1"/>
+                      </a:solidFill>
+                      <a:latin typeface="+mn-lt"/>
+                      <a:ea typeface="+mn-ea"/>
+                      <a:cs typeface="+mn-cs"/>
+                    </a:defRPr>
+                  </a:lvl9pPr>
+                </a:lstStyle>
+                <a:p>
+                  <a:pPr marL="0" indent="0" algn="ctr">
+                    <a:buFont typeface="Arial" pitchFamily="34" charset="0"/>
+                    <a:buNone/>
+                  </a:pPr>
+                  <a:r>
+                    <a:rPr lang="en-GB" sz="1100" b="1" dirty="0" smtClean="0">
+                      <a:latin typeface="Airal"/>
+                    </a:rPr>
+                    <a:t>11%</a:t>
+                  </a:r>
+                </a:p>
+              </p:txBody>
+            </p:sp>
+          </p:grpSp>
+          <p:grpSp>
+            <p:nvGrpSpPr>
+              <p:cNvPr id="20" name="Group 19"/>
+              <p:cNvGrpSpPr/>
+              <p:nvPr/>
+            </p:nvGrpSpPr>
+            <p:grpSpPr>
+              <a:xfrm>
+                <a:off x="4215087" y="4839432"/>
+                <a:ext cx="972469" cy="273899"/>
+                <a:chOff x="3785201" y="3763969"/>
+                <a:chExt cx="972469" cy="273899"/>
+              </a:xfrm>
+            </p:grpSpPr>
+            <p:pic>
+              <p:nvPicPr>
+                <p:cNvPr id="28" name="Picture 27"/>
+                <p:cNvPicPr>
+                  <a:picLocks noChangeAspect="1"/>
+                </p:cNvPicPr>
+                <p:nvPr/>
+              </p:nvPicPr>
+              <p:blipFill>
+                <a:blip r:embed="rId4" cstate="print">
+                  <a:duotone>
+                    <a:schemeClr val="accent6">
+                      <a:shade val="45000"/>
+                      <a:satMod val="135000"/>
+                    </a:schemeClr>
+                    <a:prstClr val="white"/>
+                  </a:duotone>
+                  <a:extLst>
+                    <a:ext uri="{28A0092B-C50C-407E-A947-70E740481C1C}">
+                      <a14:useLocalDpi xmlns:a14="http://schemas.microsoft.com/office/drawing/2010/main" val="0"/>
+                    </a:ext>
+                  </a:extLst>
+                </a:blip>
+                <a:stretch>
+                  <a:fillRect/>
+                </a:stretch>
+              </p:blipFill>
+              <p:spPr>
+                <a:xfrm>
+                  <a:off x="3785201" y="3763969"/>
+                  <a:ext cx="273899" cy="273899"/>
+                </a:xfrm>
+                <a:prstGeom prst="rect">
+                  <a:avLst/>
+                </a:prstGeom>
+              </p:spPr>
+            </p:pic>
+            <p:sp>
+              <p:nvSpPr>
+                <p:cNvPr id="29" name="Content Placeholder 2"/>
+                <p:cNvSpPr txBox="1">
+                  <a:spLocks/>
+                </p:cNvSpPr>
+                <p:nvPr/>
+              </p:nvSpPr>
+              <p:spPr>
+                <a:xfrm>
+                  <a:off x="4183810" y="3800722"/>
+                  <a:ext cx="573860" cy="210837"/>
+                </a:xfrm>
+                <a:prstGeom prst="rect">
+                  <a:avLst/>
+                </a:prstGeom>
+                <a:solidFill>
+                  <a:schemeClr val="accent6">
+                    <a:lumMod val="20000"/>
+                    <a:lumOff val="80000"/>
+                  </a:schemeClr>
+                </a:solidFill>
+                <a:ln w="38100">
+                  <a:solidFill>
+                    <a:schemeClr val="bg1"/>
+                  </a:solidFill>
+                </a:ln>
+              </p:spPr>
+              <p:txBody>
+                <a:bodyPr anchor="ctr"/>
+                <a:lstStyle>
+                  <a:lvl1pPr marL="342900" indent="-342900" algn="l" defTabSz="914400" rtl="0" eaLnBrk="1" latinLnBrk="0" hangingPunct="1">
+                    <a:spcBef>
+                      <a:spcPct val="20000"/>
+                    </a:spcBef>
+                    <a:buFont typeface="Arial" pitchFamily="34" charset="0"/>
+                    <a:buChar char="•"/>
+                    <a:defRPr sz="3200" kern="1200">
+                      <a:solidFill>
+                        <a:schemeClr val="tx1"/>
+                      </a:solidFill>
+                      <a:latin typeface="+mn-lt"/>
+                      <a:ea typeface="+mn-ea"/>
+                      <a:cs typeface="+mn-cs"/>
+                    </a:defRPr>
+                  </a:lvl1pPr>
+                  <a:lvl2pPr marL="742950" indent="-285750" algn="l" defTabSz="914400" rtl="0" eaLnBrk="1" latinLnBrk="0" hangingPunct="1">
+                    <a:spcBef>
+                      <a:spcPct val="20000"/>
+                    </a:spcBef>
+                    <a:buFont typeface="Arial" pitchFamily="34" charset="0"/>
+                    <a:buChar char="–"/>
+                    <a:defRPr sz="2800" kern="1200">
+                      <a:solidFill>
+                        <a:schemeClr val="tx1"/>
+                      </a:solidFill>
+                      <a:latin typeface="+mn-lt"/>
+                      <a:ea typeface="+mn-ea"/>
+                      <a:cs typeface="+mn-cs"/>
+                    </a:defRPr>
+                  </a:lvl2pPr>
+                  <a:lvl3pPr marL="1143000" indent="-228600" algn="l" defTabSz="914400" rtl="0" eaLnBrk="1" latinLnBrk="0" hangingPunct="1">
+                    <a:spcBef>
+                      <a:spcPct val="20000"/>
+                    </a:spcBef>
+                    <a:buFont typeface="Arial" pitchFamily="34" charset="0"/>
+                    <a:buChar char="•"/>
+                    <a:defRPr sz="2400" kern="1200">
+                      <a:solidFill>
+                        <a:schemeClr val="tx1"/>
+                      </a:solidFill>
+                      <a:latin typeface="+mn-lt"/>
+                      <a:ea typeface="+mn-ea"/>
+                      <a:cs typeface="+mn-cs"/>
+                    </a:defRPr>
+                  </a:lvl3pPr>
+                  <a:lvl4pPr marL="1600200" indent="-228600" algn="l" defTabSz="914400" rtl="0" eaLnBrk="1" latinLnBrk="0" hangingPunct="1">
+                    <a:spcBef>
+                      <a:spcPct val="20000"/>
+                    </a:spcBef>
+                    <a:buFont typeface="Arial" pitchFamily="34" charset="0"/>
+                    <a:buChar char="–"/>
+                    <a:defRPr sz="2000" kern="1200">
+                      <a:solidFill>
+                        <a:schemeClr val="tx1"/>
+                      </a:solidFill>
+                      <a:latin typeface="+mn-lt"/>
+                      <a:ea typeface="+mn-ea"/>
+                      <a:cs typeface="+mn-cs"/>
+                    </a:defRPr>
+                  </a:lvl4pPr>
+                  <a:lvl5pPr marL="2057400" indent="-228600" algn="l" defTabSz="914400" rtl="0" eaLnBrk="1" latinLnBrk="0" hangingPunct="1">
+                    <a:spcBef>
+                      <a:spcPct val="20000"/>
+                    </a:spcBef>
+                    <a:buFont typeface="Arial" pitchFamily="34" charset="0"/>
+                    <a:buChar char="»"/>
+                    <a:defRPr sz="2000" kern="1200">
+                      <a:solidFill>
+                        <a:schemeClr val="tx1"/>
+                      </a:solidFill>
+                      <a:latin typeface="+mn-lt"/>
+                      <a:ea typeface="+mn-ea"/>
+                      <a:cs typeface="+mn-cs"/>
+                    </a:defRPr>
+                  </a:lvl5pPr>
+                  <a:lvl6pPr marL="2514600" indent="-228600" algn="l" defTabSz="914400" rtl="0" eaLnBrk="1" latinLnBrk="0" hangingPunct="1">
+                    <a:spcBef>
+                      <a:spcPct val="20000"/>
+                    </a:spcBef>
+                    <a:buFont typeface="Arial" pitchFamily="34" charset="0"/>
+                    <a:buChar char="•"/>
+                    <a:defRPr sz="2000" kern="1200">
+                      <a:solidFill>
+                        <a:schemeClr val="tx1"/>
+                      </a:solidFill>
+                      <a:latin typeface="+mn-lt"/>
+                      <a:ea typeface="+mn-ea"/>
+                      <a:cs typeface="+mn-cs"/>
+                    </a:defRPr>
+                  </a:lvl6pPr>
+                  <a:lvl7pPr marL="2971800" indent="-228600" algn="l" defTabSz="914400" rtl="0" eaLnBrk="1" latinLnBrk="0" hangingPunct="1">
+                    <a:spcBef>
+                      <a:spcPct val="20000"/>
+                    </a:spcBef>
+                    <a:buFont typeface="Arial" pitchFamily="34" charset="0"/>
+                    <a:buChar char="•"/>
+                    <a:defRPr sz="2000" kern="1200">
+                      <a:solidFill>
+                        <a:schemeClr val="tx1"/>
+                      </a:solidFill>
+                      <a:latin typeface="+mn-lt"/>
+                      <a:ea typeface="+mn-ea"/>
+                      <a:cs typeface="+mn-cs"/>
+                    </a:defRPr>
+                  </a:lvl7pPr>
+                  <a:lvl8pPr marL="3429000" indent="-228600" algn="l" defTabSz="914400" rtl="0" eaLnBrk="1" latinLnBrk="0" hangingPunct="1">
+                    <a:spcBef>
+                      <a:spcPct val="20000"/>
+                    </a:spcBef>
+                    <a:buFont typeface="Arial" pitchFamily="34" charset="0"/>
+                    <a:buChar char="•"/>
+                    <a:defRPr sz="2000" kern="1200">
+                      <a:solidFill>
+                        <a:schemeClr val="tx1"/>
+                      </a:solidFill>
+                      <a:latin typeface="+mn-lt"/>
+                      <a:ea typeface="+mn-ea"/>
+                      <a:cs typeface="+mn-cs"/>
+                    </a:defRPr>
+                  </a:lvl8pPr>
+                  <a:lvl9pPr marL="3886200" indent="-228600" algn="l" defTabSz="914400" rtl="0" eaLnBrk="1" latinLnBrk="0" hangingPunct="1">
+                    <a:spcBef>
+                      <a:spcPct val="20000"/>
+                    </a:spcBef>
+                    <a:buFont typeface="Arial" pitchFamily="34" charset="0"/>
+                    <a:buChar char="•"/>
+                    <a:defRPr sz="2000" kern="1200">
+                      <a:solidFill>
+                        <a:schemeClr val="tx1"/>
+                      </a:solidFill>
+                      <a:latin typeface="+mn-lt"/>
+                      <a:ea typeface="+mn-ea"/>
+                      <a:cs typeface="+mn-cs"/>
+                    </a:defRPr>
+                  </a:lvl9pPr>
+                </a:lstStyle>
+                <a:p>
+                  <a:pPr marL="0" indent="0" algn="ctr">
+                    <a:buFont typeface="Arial" pitchFamily="34" charset="0"/>
+                    <a:buNone/>
+                  </a:pPr>
+                  <a:r>
+                    <a:rPr lang="en-GB" sz="1100" b="1" dirty="0" smtClean="0">
+                      <a:latin typeface="Airal"/>
+                    </a:rPr>
+                    <a:t>19%</a:t>
+                  </a:r>
+                </a:p>
+              </p:txBody>
+            </p:sp>
+          </p:grpSp>
+          <p:grpSp>
+            <p:nvGrpSpPr>
+              <p:cNvPr id="21" name="Group 20"/>
+              <p:cNvGrpSpPr/>
+              <p:nvPr/>
+            </p:nvGrpSpPr>
+            <p:grpSpPr>
+              <a:xfrm>
+                <a:off x="4209849" y="5182198"/>
+                <a:ext cx="972469" cy="273899"/>
+                <a:chOff x="3785201" y="3763969"/>
+                <a:chExt cx="972469" cy="273899"/>
+              </a:xfrm>
+            </p:grpSpPr>
+            <p:pic>
+              <p:nvPicPr>
+                <p:cNvPr id="26" name="Picture 25"/>
+                <p:cNvPicPr>
+                  <a:picLocks noChangeAspect="1"/>
+                </p:cNvPicPr>
+                <p:nvPr/>
+              </p:nvPicPr>
+              <p:blipFill>
+                <a:blip r:embed="rId4" cstate="print">
+                  <a:duotone>
+                    <a:schemeClr val="accent2">
+                      <a:shade val="45000"/>
+                      <a:satMod val="135000"/>
+                    </a:schemeClr>
+                    <a:prstClr val="white"/>
+                  </a:duotone>
+                  <a:extLst>
+                    <a:ext uri="{28A0092B-C50C-407E-A947-70E740481C1C}">
+                      <a14:useLocalDpi xmlns:a14="http://schemas.microsoft.com/office/drawing/2010/main" val="0"/>
+                    </a:ext>
+                  </a:extLst>
+                </a:blip>
+                <a:stretch>
+                  <a:fillRect/>
+                </a:stretch>
+              </p:blipFill>
+              <p:spPr>
+                <a:xfrm>
+                  <a:off x="3785201" y="3763969"/>
+                  <a:ext cx="273899" cy="273899"/>
+                </a:xfrm>
+                <a:prstGeom prst="rect">
+                  <a:avLst/>
+                </a:prstGeom>
+              </p:spPr>
+            </p:pic>
+            <p:sp>
+              <p:nvSpPr>
+                <p:cNvPr id="27" name="Content Placeholder 2"/>
+                <p:cNvSpPr txBox="1">
+                  <a:spLocks/>
+                </p:cNvSpPr>
+                <p:nvPr/>
+              </p:nvSpPr>
+              <p:spPr>
+                <a:xfrm>
+                  <a:off x="4183810" y="3800722"/>
+                  <a:ext cx="573860" cy="210837"/>
+                </a:xfrm>
+                <a:prstGeom prst="rect">
+                  <a:avLst/>
+                </a:prstGeom>
+                <a:solidFill>
+                  <a:schemeClr val="accent6">
+                    <a:lumMod val="20000"/>
+                    <a:lumOff val="80000"/>
+                  </a:schemeClr>
+                </a:solidFill>
+                <a:ln w="38100">
+                  <a:solidFill>
+                    <a:schemeClr val="bg1"/>
+                  </a:solidFill>
+                </a:ln>
+              </p:spPr>
+              <p:txBody>
+                <a:bodyPr anchor="ctr"/>
+                <a:lstStyle>
+                  <a:lvl1pPr marL="342900" indent="-342900" algn="l" defTabSz="914400" rtl="0" eaLnBrk="1" latinLnBrk="0" hangingPunct="1">
+                    <a:spcBef>
+                      <a:spcPct val="20000"/>
+                    </a:spcBef>
+                    <a:buFont typeface="Arial" pitchFamily="34" charset="0"/>
+                    <a:buChar char="•"/>
+                    <a:defRPr sz="3200" kern="1200">
+                      <a:solidFill>
+                        <a:schemeClr val="tx1"/>
+                      </a:solidFill>
+                      <a:latin typeface="+mn-lt"/>
+                      <a:ea typeface="+mn-ea"/>
+                      <a:cs typeface="+mn-cs"/>
+                    </a:defRPr>
+                  </a:lvl1pPr>
+                  <a:lvl2pPr marL="742950" indent="-285750" algn="l" defTabSz="914400" rtl="0" eaLnBrk="1" latinLnBrk="0" hangingPunct="1">
+                    <a:spcBef>
+                      <a:spcPct val="20000"/>
+                    </a:spcBef>
+                    <a:buFont typeface="Arial" pitchFamily="34" charset="0"/>
+                    <a:buChar char="–"/>
+                    <a:defRPr sz="2800" kern="1200">
+                      <a:solidFill>
+                        <a:schemeClr val="tx1"/>
+                      </a:solidFill>
+                      <a:latin typeface="+mn-lt"/>
+                      <a:ea typeface="+mn-ea"/>
+                      <a:cs typeface="+mn-cs"/>
+                    </a:defRPr>
+                  </a:lvl2pPr>
+                  <a:lvl3pPr marL="1143000" indent="-228600" algn="l" defTabSz="914400" rtl="0" eaLnBrk="1" latinLnBrk="0" hangingPunct="1">
+                    <a:spcBef>
+                      <a:spcPct val="20000"/>
+                    </a:spcBef>
+                    <a:buFont typeface="Arial" pitchFamily="34" charset="0"/>
+                    <a:buChar char="•"/>
+                    <a:defRPr sz="2400" kern="1200">
+                      <a:solidFill>
+                        <a:schemeClr val="tx1"/>
+                      </a:solidFill>
+                      <a:latin typeface="+mn-lt"/>
+                      <a:ea typeface="+mn-ea"/>
+                      <a:cs typeface="+mn-cs"/>
+                    </a:defRPr>
+                  </a:lvl3pPr>
+                  <a:lvl4pPr marL="1600200" indent="-228600" algn="l" defTabSz="914400" rtl="0" eaLnBrk="1" latinLnBrk="0" hangingPunct="1">
+                    <a:spcBef>
+                      <a:spcPct val="20000"/>
+                    </a:spcBef>
+                    <a:buFont typeface="Arial" pitchFamily="34" charset="0"/>
+                    <a:buChar char="–"/>
+                    <a:defRPr sz="2000" kern="1200">
+                      <a:solidFill>
+                        <a:schemeClr val="tx1"/>
+                      </a:solidFill>
+                      <a:latin typeface="+mn-lt"/>
+                      <a:ea typeface="+mn-ea"/>
+                      <a:cs typeface="+mn-cs"/>
+                    </a:defRPr>
+                  </a:lvl4pPr>
+                  <a:lvl5pPr marL="2057400" indent="-228600" algn="l" defTabSz="914400" rtl="0" eaLnBrk="1" latinLnBrk="0" hangingPunct="1">
+                    <a:spcBef>
+                      <a:spcPct val="20000"/>
+                    </a:spcBef>
+                    <a:buFont typeface="Arial" pitchFamily="34" charset="0"/>
+                    <a:buChar char="»"/>
+                    <a:defRPr sz="2000" kern="1200">
+                      <a:solidFill>
+                        <a:schemeClr val="tx1"/>
+                      </a:solidFill>
+                      <a:latin typeface="+mn-lt"/>
+                      <a:ea typeface="+mn-ea"/>
+                      <a:cs typeface="+mn-cs"/>
+                    </a:defRPr>
+                  </a:lvl5pPr>
+                  <a:lvl6pPr marL="2514600" indent="-228600" algn="l" defTabSz="914400" rtl="0" eaLnBrk="1" latinLnBrk="0" hangingPunct="1">
+                    <a:spcBef>
+                      <a:spcPct val="20000"/>
+                    </a:spcBef>
+                    <a:buFont typeface="Arial" pitchFamily="34" charset="0"/>
+                    <a:buChar char="•"/>
+                    <a:defRPr sz="2000" kern="1200">
+                      <a:solidFill>
+                        <a:schemeClr val="tx1"/>
+                      </a:solidFill>
+                      <a:latin typeface="+mn-lt"/>
+                      <a:ea typeface="+mn-ea"/>
+                      <a:cs typeface="+mn-cs"/>
+                    </a:defRPr>
+                  </a:lvl6pPr>
+                  <a:lvl7pPr marL="2971800" indent="-228600" algn="l" defTabSz="914400" rtl="0" eaLnBrk="1" latinLnBrk="0" hangingPunct="1">
+                    <a:spcBef>
+                      <a:spcPct val="20000"/>
+                    </a:spcBef>
+                    <a:buFont typeface="Arial" pitchFamily="34" charset="0"/>
+                    <a:buChar char="•"/>
+                    <a:defRPr sz="2000" kern="1200">
+                      <a:solidFill>
+                        <a:schemeClr val="tx1"/>
+                      </a:solidFill>
+                      <a:latin typeface="+mn-lt"/>
+                      <a:ea typeface="+mn-ea"/>
+                      <a:cs typeface="+mn-cs"/>
+                    </a:defRPr>
+                  </a:lvl7pPr>
+                  <a:lvl8pPr marL="3429000" indent="-228600" algn="l" defTabSz="914400" rtl="0" eaLnBrk="1" latinLnBrk="0" hangingPunct="1">
+                    <a:spcBef>
+                      <a:spcPct val="20000"/>
+                    </a:spcBef>
+                    <a:buFont typeface="Arial" pitchFamily="34" charset="0"/>
+                    <a:buChar char="•"/>
+                    <a:defRPr sz="2000" kern="1200">
+                      <a:solidFill>
+                        <a:schemeClr val="tx1"/>
+                      </a:solidFill>
+                      <a:latin typeface="+mn-lt"/>
+                      <a:ea typeface="+mn-ea"/>
+                      <a:cs typeface="+mn-cs"/>
+                    </a:defRPr>
+                  </a:lvl8pPr>
+                  <a:lvl9pPr marL="3886200" indent="-228600" algn="l" defTabSz="914400" rtl="0" eaLnBrk="1" latinLnBrk="0" hangingPunct="1">
+                    <a:spcBef>
+                      <a:spcPct val="20000"/>
+                    </a:spcBef>
+                    <a:buFont typeface="Arial" pitchFamily="34" charset="0"/>
+                    <a:buChar char="•"/>
+                    <a:defRPr sz="2000" kern="1200">
+                      <a:solidFill>
+                        <a:schemeClr val="tx1"/>
+                      </a:solidFill>
+                      <a:latin typeface="+mn-lt"/>
+                      <a:ea typeface="+mn-ea"/>
+                      <a:cs typeface="+mn-cs"/>
+                    </a:defRPr>
+                  </a:lvl9pPr>
+                </a:lstStyle>
+                <a:p>
+                  <a:pPr marL="0" indent="0" algn="ctr">
+                    <a:buFont typeface="Arial" pitchFamily="34" charset="0"/>
+                    <a:buNone/>
+                  </a:pPr>
+                  <a:r>
+                    <a:rPr lang="en-GB" sz="1100" b="1" dirty="0" smtClean="0">
+                      <a:latin typeface="Airal"/>
+                    </a:rPr>
+                    <a:t>38%</a:t>
+                  </a:r>
+                </a:p>
+              </p:txBody>
+            </p:sp>
+          </p:grpSp>
+          <p:grpSp>
+            <p:nvGrpSpPr>
+              <p:cNvPr id="22" name="Group 21"/>
+              <p:cNvGrpSpPr/>
+              <p:nvPr/>
+            </p:nvGrpSpPr>
+            <p:grpSpPr>
+              <a:xfrm>
+                <a:off x="4219234" y="5523032"/>
+                <a:ext cx="972469" cy="273899"/>
+                <a:chOff x="3785201" y="3763969"/>
+                <a:chExt cx="972469" cy="273899"/>
+              </a:xfrm>
+            </p:grpSpPr>
+            <p:pic>
+              <p:nvPicPr>
+                <p:cNvPr id="24" name="Picture 23"/>
+                <p:cNvPicPr>
+                  <a:picLocks noChangeAspect="1"/>
+                </p:cNvPicPr>
+                <p:nvPr/>
+              </p:nvPicPr>
+              <p:blipFill>
+                <a:blip r:embed="rId4" cstate="print">
+                  <a:duotone>
+                    <a:schemeClr val="accent2">
+                      <a:shade val="45000"/>
+                      <a:satMod val="135000"/>
+                    </a:schemeClr>
+                    <a:prstClr val="white"/>
+                  </a:duotone>
+                  <a:extLst>
+                    <a:ext uri="{28A0092B-C50C-407E-A947-70E740481C1C}">
+                      <a14:useLocalDpi xmlns:a14="http://schemas.microsoft.com/office/drawing/2010/main" val="0"/>
+                    </a:ext>
+                  </a:extLst>
+                </a:blip>
+                <a:stretch>
+                  <a:fillRect/>
+                </a:stretch>
+              </p:blipFill>
+              <p:spPr>
+                <a:xfrm>
+                  <a:off x="3785201" y="3763969"/>
+                  <a:ext cx="273899" cy="273899"/>
+                </a:xfrm>
+                <a:prstGeom prst="rect">
+                  <a:avLst/>
+                </a:prstGeom>
+              </p:spPr>
+            </p:pic>
+            <p:sp>
+              <p:nvSpPr>
+                <p:cNvPr id="25" name="Content Placeholder 2"/>
+                <p:cNvSpPr txBox="1">
+                  <a:spLocks/>
+                </p:cNvSpPr>
+                <p:nvPr/>
+              </p:nvSpPr>
+              <p:spPr>
+                <a:xfrm>
+                  <a:off x="4183810" y="3800722"/>
+                  <a:ext cx="573860" cy="210837"/>
+                </a:xfrm>
+                <a:prstGeom prst="rect">
+                  <a:avLst/>
+                </a:prstGeom>
+                <a:solidFill>
+                  <a:schemeClr val="accent6">
+                    <a:lumMod val="20000"/>
+                    <a:lumOff val="80000"/>
+                  </a:schemeClr>
+                </a:solidFill>
+                <a:ln w="38100">
+                  <a:solidFill>
+                    <a:schemeClr val="bg1"/>
+                  </a:solidFill>
+                </a:ln>
+              </p:spPr>
+              <p:txBody>
+                <a:bodyPr anchor="ctr"/>
+                <a:lstStyle>
+                  <a:lvl1pPr marL="342900" indent="-342900" algn="l" defTabSz="914400" rtl="0" eaLnBrk="1" latinLnBrk="0" hangingPunct="1">
+                    <a:spcBef>
+                      <a:spcPct val="20000"/>
+                    </a:spcBef>
+                    <a:buFont typeface="Arial" pitchFamily="34" charset="0"/>
+                    <a:buChar char="•"/>
+                    <a:defRPr sz="3200" kern="1200">
+                      <a:solidFill>
+                        <a:schemeClr val="tx1"/>
+                      </a:solidFill>
+                      <a:latin typeface="+mn-lt"/>
+                      <a:ea typeface="+mn-ea"/>
+                      <a:cs typeface="+mn-cs"/>
+                    </a:defRPr>
+                  </a:lvl1pPr>
+                  <a:lvl2pPr marL="742950" indent="-285750" algn="l" defTabSz="914400" rtl="0" eaLnBrk="1" latinLnBrk="0" hangingPunct="1">
+                    <a:spcBef>
+                      <a:spcPct val="20000"/>
+                    </a:spcBef>
+                    <a:buFont typeface="Arial" pitchFamily="34" charset="0"/>
+                    <a:buChar char="–"/>
+                    <a:defRPr sz="2800" kern="1200">
+                      <a:solidFill>
+                        <a:schemeClr val="tx1"/>
+                      </a:solidFill>
+                      <a:latin typeface="+mn-lt"/>
+                      <a:ea typeface="+mn-ea"/>
+                      <a:cs typeface="+mn-cs"/>
+                    </a:defRPr>
+                  </a:lvl2pPr>
+                  <a:lvl3pPr marL="1143000" indent="-228600" algn="l" defTabSz="914400" rtl="0" eaLnBrk="1" latinLnBrk="0" hangingPunct="1">
+                    <a:spcBef>
+                      <a:spcPct val="20000"/>
+                    </a:spcBef>
+                    <a:buFont typeface="Arial" pitchFamily="34" charset="0"/>
+                    <a:buChar char="•"/>
+                    <a:defRPr sz="2400" kern="1200">
+                      <a:solidFill>
+                        <a:schemeClr val="tx1"/>
+                      </a:solidFill>
+                      <a:latin typeface="+mn-lt"/>
+                      <a:ea typeface="+mn-ea"/>
+                      <a:cs typeface="+mn-cs"/>
+                    </a:defRPr>
+                  </a:lvl3pPr>
+                  <a:lvl4pPr marL="1600200" indent="-228600" algn="l" defTabSz="914400" rtl="0" eaLnBrk="1" latinLnBrk="0" hangingPunct="1">
+                    <a:spcBef>
+                      <a:spcPct val="20000"/>
+                    </a:spcBef>
+                    <a:buFont typeface="Arial" pitchFamily="34" charset="0"/>
+                    <a:buChar char="–"/>
+                    <a:defRPr sz="2000" kern="1200">
+                      <a:solidFill>
+                        <a:schemeClr val="tx1"/>
+                      </a:solidFill>
+                      <a:latin typeface="+mn-lt"/>
+                      <a:ea typeface="+mn-ea"/>
+                      <a:cs typeface="+mn-cs"/>
+                    </a:defRPr>
+                  </a:lvl4pPr>
+                  <a:lvl5pPr marL="2057400" indent="-228600" algn="l" defTabSz="914400" rtl="0" eaLnBrk="1" latinLnBrk="0" hangingPunct="1">
+                    <a:spcBef>
+                      <a:spcPct val="20000"/>
+                    </a:spcBef>
+                    <a:buFont typeface="Arial" pitchFamily="34" charset="0"/>
+                    <a:buChar char="»"/>
+                    <a:defRPr sz="2000" kern="1200">
+                      <a:solidFill>
+                        <a:schemeClr val="tx1"/>
+                      </a:solidFill>
+                      <a:latin typeface="+mn-lt"/>
+                      <a:ea typeface="+mn-ea"/>
+                      <a:cs typeface="+mn-cs"/>
+                    </a:defRPr>
+                  </a:lvl5pPr>
+                  <a:lvl6pPr marL="2514600" indent="-228600" algn="l" defTabSz="914400" rtl="0" eaLnBrk="1" latinLnBrk="0" hangingPunct="1">
+                    <a:spcBef>
+                      <a:spcPct val="20000"/>
+                    </a:spcBef>
+                    <a:buFont typeface="Arial" pitchFamily="34" charset="0"/>
+                    <a:buChar char="•"/>
+                    <a:defRPr sz="2000" kern="1200">
+                      <a:solidFill>
+                        <a:schemeClr val="tx1"/>
+                      </a:solidFill>
+                      <a:latin typeface="+mn-lt"/>
+                      <a:ea typeface="+mn-ea"/>
+                      <a:cs typeface="+mn-cs"/>
+                    </a:defRPr>
+                  </a:lvl6pPr>
+                  <a:lvl7pPr marL="2971800" indent="-228600" algn="l" defTabSz="914400" rtl="0" eaLnBrk="1" latinLnBrk="0" hangingPunct="1">
+                    <a:spcBef>
+                      <a:spcPct val="20000"/>
+                    </a:spcBef>
+                    <a:buFont typeface="Arial" pitchFamily="34" charset="0"/>
+                    <a:buChar char="•"/>
+                    <a:defRPr sz="2000" kern="1200">
+                      <a:solidFill>
+                        <a:schemeClr val="tx1"/>
+                      </a:solidFill>
+                      <a:latin typeface="+mn-lt"/>
+                      <a:ea typeface="+mn-ea"/>
+                      <a:cs typeface="+mn-cs"/>
+                    </a:defRPr>
+                  </a:lvl7pPr>
+                  <a:lvl8pPr marL="3429000" indent="-228600" algn="l" defTabSz="914400" rtl="0" eaLnBrk="1" latinLnBrk="0" hangingPunct="1">
+                    <a:spcBef>
+                      <a:spcPct val="20000"/>
+                    </a:spcBef>
+                    <a:buFont typeface="Arial" pitchFamily="34" charset="0"/>
+                    <a:buChar char="•"/>
+                    <a:defRPr sz="2000" kern="1200">
+                      <a:solidFill>
+                        <a:schemeClr val="tx1"/>
+                      </a:solidFill>
+                      <a:latin typeface="+mn-lt"/>
+                      <a:ea typeface="+mn-ea"/>
+                      <a:cs typeface="+mn-cs"/>
+                    </a:defRPr>
+                  </a:lvl8pPr>
+                  <a:lvl9pPr marL="3886200" indent="-228600" algn="l" defTabSz="914400" rtl="0" eaLnBrk="1" latinLnBrk="0" hangingPunct="1">
+                    <a:spcBef>
+                      <a:spcPct val="20000"/>
+                    </a:spcBef>
+                    <a:buFont typeface="Arial" pitchFamily="34" charset="0"/>
+                    <a:buChar char="•"/>
+                    <a:defRPr sz="2000" kern="1200">
+                      <a:solidFill>
+                        <a:schemeClr val="tx1"/>
+                      </a:solidFill>
+                      <a:latin typeface="+mn-lt"/>
+                      <a:ea typeface="+mn-ea"/>
+                      <a:cs typeface="+mn-cs"/>
+                    </a:defRPr>
+                  </a:lvl9pPr>
+                </a:lstStyle>
+                <a:p>
+                  <a:pPr marL="0" indent="0" algn="ctr">
+                    <a:buFont typeface="Arial" pitchFamily="34" charset="0"/>
+                    <a:buNone/>
+                  </a:pPr>
+                  <a:r>
+                    <a:rPr lang="en-GB" sz="1100" b="1" dirty="0" smtClean="0">
+                      <a:latin typeface="Airal"/>
+                    </a:rPr>
+                    <a:t>67%</a:t>
+                  </a:r>
+                </a:p>
+              </p:txBody>
+            </p:sp>
+          </p:grpSp>
+          <p:sp>
+            <p:nvSpPr>
+              <p:cNvPr id="23" name="Rectangle 22"/>
+              <p:cNvSpPr/>
+              <p:nvPr/>
+            </p:nvSpPr>
+            <p:spPr>
+              <a:xfrm>
+                <a:off x="426027" y="4183013"/>
+                <a:ext cx="4820387" cy="1613918"/>
+              </a:xfrm>
+              <a:prstGeom prst="rect">
+                <a:avLst/>
+              </a:prstGeom>
+              <a:noFill/>
+              <a:ln w="28575">
+                <a:prstDash val="sysDot"/>
+              </a:ln>
+            </p:spPr>
+            <p:style>
+              <a:lnRef idx="2">
+                <a:schemeClr val="accent1">
+                  <a:shade val="50000"/>
+                </a:schemeClr>
+              </a:lnRef>
+              <a:fillRef idx="1">
+                <a:schemeClr val="accent1"/>
+              </a:fillRef>
+              <a:effectRef idx="0">
+                <a:schemeClr val="accent1"/>
+              </a:effectRef>
+              <a:fontRef idx="minor">
+                <a:schemeClr val="lt1"/>
+              </a:fontRef>
+            </p:style>
+            <p:txBody>
+              <a:bodyPr rtlCol="0" anchor="ctr"/>
+              <a:lstStyle/>
+              <a:p>
+                <a:r>
+                  <a:rPr lang="en-GB" sz="1300" b="1" dirty="0" smtClean="0">
+                    <a:solidFill>
+                      <a:schemeClr val="tx1"/>
+                    </a:solidFill>
+                    <a:latin typeface="Airal"/>
+                  </a:rPr>
+                  <a:t>Step II:</a:t>
+                </a:r>
+              </a:p>
+              <a:p>
+                <a:r>
+                  <a:rPr lang="en-GB" sz="1300" b="1" dirty="0" smtClean="0">
+                    <a:solidFill>
+                      <a:schemeClr val="tx1"/>
+                    </a:solidFill>
+                    <a:latin typeface="Airal"/>
+                  </a:rPr>
+                  <a:t>Predict</a:t>
+                </a:r>
+                <a:endParaRPr lang="en-US" sz="1300" b="1" dirty="0">
+                  <a:solidFill>
+                    <a:schemeClr val="tx1"/>
+                  </a:solidFill>
+                  <a:latin typeface="Airal"/>
+                </a:endParaRPr>
+              </a:p>
+            </p:txBody>
+          </p:sp>
+        </p:grpSp>
+        <p:grpSp>
+          <p:nvGrpSpPr>
+            <p:cNvPr id="42" name="Group 41"/>
+            <p:cNvGrpSpPr/>
+            <p:nvPr/>
+          </p:nvGrpSpPr>
+          <p:grpSpPr>
+            <a:xfrm>
+              <a:off x="6599220" y="3052952"/>
+              <a:ext cx="2645119" cy="1613918"/>
+              <a:chOff x="7021909" y="4183013"/>
+              <a:chExt cx="3859121" cy="1613918"/>
+            </a:xfrm>
+          </p:grpSpPr>
+          <p:sp>
+            <p:nvSpPr>
+              <p:cNvPr id="43" name="Right Arrow 42"/>
+              <p:cNvSpPr/>
+              <p:nvPr/>
+            </p:nvSpPr>
+            <p:spPr>
+              <a:xfrm>
+                <a:off x="7021909" y="4856301"/>
+                <a:ext cx="1661638" cy="360040"/>
+              </a:xfrm>
+              <a:prstGeom prst="rightArrow">
+                <a:avLst/>
+              </a:prstGeom>
+              <a:solidFill>
+                <a:schemeClr val="accent1">
+                  <a:lumMod val="20000"/>
+                  <a:lumOff val="80000"/>
+                </a:schemeClr>
+              </a:solidFill>
+              <a:ln>
+                <a:noFill/>
+              </a:ln>
+            </p:spPr>
+            <p:style>
+              <a:lnRef idx="2">
+                <a:schemeClr val="accent1">
+                  <a:shade val="50000"/>
+                </a:schemeClr>
+              </a:lnRef>
+              <a:fillRef idx="1">
+                <a:schemeClr val="accent1"/>
+              </a:fillRef>
+              <a:effectRef idx="0">
+                <a:schemeClr val="accent1"/>
+              </a:effectRef>
+              <a:fontRef idx="minor">
+                <a:schemeClr val="lt1"/>
+              </a:fontRef>
+            </p:style>
+            <p:txBody>
+              <a:bodyPr rtlCol="0" anchor="ctr"/>
+              <a:lstStyle/>
+              <a:p>
+                <a:pPr algn="ctr"/>
+                <a:endParaRPr lang="en-US" sz="1100">
+                  <a:latin typeface="Airal"/>
+                </a:endParaRPr>
+              </a:p>
+            </p:txBody>
+          </p:sp>
+          <p:sp>
+            <p:nvSpPr>
+              <p:cNvPr id="44" name="Content Placeholder 2"/>
+              <p:cNvSpPr txBox="1">
+                <a:spLocks/>
+              </p:cNvSpPr>
+              <p:nvPr/>
+            </p:nvSpPr>
+            <p:spPr>
+              <a:xfrm>
+                <a:off x="7330569" y="4592374"/>
+                <a:ext cx="950784" cy="872853"/>
+              </a:xfrm>
+              <a:prstGeom prst="rect">
+                <a:avLst/>
+              </a:prstGeom>
+              <a:solidFill>
+                <a:schemeClr val="accent6">
+                  <a:lumMod val="20000"/>
+                  <a:lumOff val="80000"/>
+                </a:schemeClr>
+              </a:solidFill>
+              <a:ln w="38100">
+                <a:solidFill>
+                  <a:schemeClr val="bg1"/>
+                </a:solidFill>
+              </a:ln>
+            </p:spPr>
+            <p:txBody>
+              <a:bodyPr anchor="ctr"/>
+              <a:lstStyle>
+                <a:lvl1pPr marL="342900" indent="-342900" algn="l" defTabSz="914400" rtl="0" eaLnBrk="1" latinLnBrk="0" hangingPunct="1">
+                  <a:spcBef>
+                    <a:spcPct val="20000"/>
+                  </a:spcBef>
+                  <a:buFont typeface="Arial" pitchFamily="34" charset="0"/>
+                  <a:buChar char="•"/>
+                  <a:defRPr sz="3200" kern="1200">
+                    <a:solidFill>
+                      <a:schemeClr val="tx1"/>
+                    </a:solidFill>
+                    <a:latin typeface="+mn-lt"/>
+                    <a:ea typeface="+mn-ea"/>
+                    <a:cs typeface="+mn-cs"/>
+                  </a:defRPr>
+                </a:lvl1pPr>
+                <a:lvl2pPr marL="742950" indent="-285750" algn="l" defTabSz="914400" rtl="0" eaLnBrk="1" latinLnBrk="0" hangingPunct="1">
+                  <a:spcBef>
+                    <a:spcPct val="20000"/>
+                  </a:spcBef>
+                  <a:buFont typeface="Arial" pitchFamily="34" charset="0"/>
+                  <a:buChar char="–"/>
+                  <a:defRPr sz="2800" kern="1200">
+                    <a:solidFill>
+                      <a:schemeClr val="tx1"/>
+                    </a:solidFill>
+                    <a:latin typeface="+mn-lt"/>
+                    <a:ea typeface="+mn-ea"/>
+                    <a:cs typeface="+mn-cs"/>
+                  </a:defRPr>
+                </a:lvl2pPr>
+                <a:lvl3pPr marL="1143000" indent="-228600" algn="l" defTabSz="914400" rtl="0" eaLnBrk="1" latinLnBrk="0" hangingPunct="1">
+                  <a:spcBef>
+                    <a:spcPct val="20000"/>
+                  </a:spcBef>
+                  <a:buFont typeface="Arial" pitchFamily="34" charset="0"/>
+                  <a:buChar char="•"/>
+                  <a:defRPr sz="2400" kern="1200">
+                    <a:solidFill>
+                      <a:schemeClr val="tx1"/>
+                    </a:solidFill>
+                    <a:latin typeface="+mn-lt"/>
+                    <a:ea typeface="+mn-ea"/>
+                    <a:cs typeface="+mn-cs"/>
+                  </a:defRPr>
+                </a:lvl3pPr>
+                <a:lvl4pPr marL="1600200" indent="-228600" algn="l" defTabSz="914400" rtl="0" eaLnBrk="1" latinLnBrk="0" hangingPunct="1">
+                  <a:spcBef>
+                    <a:spcPct val="20000"/>
+                  </a:spcBef>
+                  <a:buFont typeface="Arial" pitchFamily="34" charset="0"/>
+                  <a:buChar char="–"/>
+                  <a:defRPr sz="2000" kern="1200">
+                    <a:solidFill>
+                      <a:schemeClr val="tx1"/>
+                    </a:solidFill>
+                    <a:latin typeface="+mn-lt"/>
+                    <a:ea typeface="+mn-ea"/>
+                    <a:cs typeface="+mn-cs"/>
+                  </a:defRPr>
+                </a:lvl4pPr>
+                <a:lvl5pPr marL="2057400" indent="-228600" algn="l" defTabSz="914400" rtl="0" eaLnBrk="1" latinLnBrk="0" hangingPunct="1">
+                  <a:spcBef>
+                    <a:spcPct val="20000"/>
+                  </a:spcBef>
+                  <a:buFont typeface="Arial" pitchFamily="34" charset="0"/>
+                  <a:buChar char="»"/>
+                  <a:defRPr sz="2000" kern="1200">
+                    <a:solidFill>
+                      <a:schemeClr val="tx1"/>
+                    </a:solidFill>
+                    <a:latin typeface="+mn-lt"/>
+                    <a:ea typeface="+mn-ea"/>
+                    <a:cs typeface="+mn-cs"/>
+                  </a:defRPr>
+                </a:lvl5pPr>
+                <a:lvl6pPr marL="2514600" indent="-228600" algn="l" defTabSz="914400" rtl="0" eaLnBrk="1" latinLnBrk="0" hangingPunct="1">
+                  <a:spcBef>
+                    <a:spcPct val="20000"/>
+                  </a:spcBef>
+                  <a:buFont typeface="Arial" pitchFamily="34" charset="0"/>
+                  <a:buChar char="•"/>
+                  <a:defRPr sz="2000" kern="1200">
+                    <a:solidFill>
+                      <a:schemeClr val="tx1"/>
+                    </a:solidFill>
+                    <a:latin typeface="+mn-lt"/>
+                    <a:ea typeface="+mn-ea"/>
+                    <a:cs typeface="+mn-cs"/>
+                  </a:defRPr>
+                </a:lvl6pPr>
+                <a:lvl7pPr marL="2971800" indent="-228600" algn="l" defTabSz="914400" rtl="0" eaLnBrk="1" latinLnBrk="0" hangingPunct="1">
+                  <a:spcBef>
+                    <a:spcPct val="20000"/>
+                  </a:spcBef>
+                  <a:buFont typeface="Arial" pitchFamily="34" charset="0"/>
+                  <a:buChar char="•"/>
+                  <a:defRPr sz="2000" kern="1200">
+                    <a:solidFill>
+                      <a:schemeClr val="tx1"/>
+                    </a:solidFill>
+                    <a:latin typeface="+mn-lt"/>
+                    <a:ea typeface="+mn-ea"/>
+                    <a:cs typeface="+mn-cs"/>
+                  </a:defRPr>
+                </a:lvl7pPr>
+                <a:lvl8pPr marL="3429000" indent="-228600" algn="l" defTabSz="914400" rtl="0" eaLnBrk="1" latinLnBrk="0" hangingPunct="1">
+                  <a:spcBef>
+                    <a:spcPct val="20000"/>
+                  </a:spcBef>
+                  <a:buFont typeface="Arial" pitchFamily="34" charset="0"/>
+                  <a:buChar char="•"/>
+                  <a:defRPr sz="2000" kern="1200">
+                    <a:solidFill>
+                      <a:schemeClr val="tx1"/>
+                    </a:solidFill>
+                    <a:latin typeface="+mn-lt"/>
+                    <a:ea typeface="+mn-ea"/>
+                    <a:cs typeface="+mn-cs"/>
+                  </a:defRPr>
+                </a:lvl8pPr>
+                <a:lvl9pPr marL="3886200" indent="-228600" algn="l" defTabSz="914400" rtl="0" eaLnBrk="1" latinLnBrk="0" hangingPunct="1">
+                  <a:spcBef>
+                    <a:spcPct val="20000"/>
+                  </a:spcBef>
+                  <a:buFont typeface="Arial" pitchFamily="34" charset="0"/>
+                  <a:buChar char="•"/>
+                  <a:defRPr sz="2000" kern="1200">
+                    <a:solidFill>
+                      <a:schemeClr val="tx1"/>
+                    </a:solidFill>
+                    <a:latin typeface="+mn-lt"/>
+                    <a:ea typeface="+mn-ea"/>
+                    <a:cs typeface="+mn-cs"/>
+                  </a:defRPr>
+                </a:lvl9pPr>
+              </a:lstStyle>
+              <a:p>
+                <a:pPr marL="0" indent="0" algn="ctr">
+                  <a:buFont typeface="Arial" pitchFamily="34" charset="0"/>
+                  <a:buNone/>
+                </a:pPr>
+                <a:r>
+                  <a:rPr lang="en-GB" sz="1100" b="1" dirty="0" smtClean="0">
+                    <a:latin typeface="Airal"/>
+                  </a:rPr>
+                  <a:t>CRM Team</a:t>
+                </a:r>
+              </a:p>
+            </p:txBody>
+          </p:sp>
+          <p:sp>
+            <p:nvSpPr>
+              <p:cNvPr id="45" name="Content Placeholder 2"/>
+              <p:cNvSpPr txBox="1">
+                <a:spLocks/>
+              </p:cNvSpPr>
+              <p:nvPr/>
+            </p:nvSpPr>
+            <p:spPr>
+              <a:xfrm>
+                <a:off x="8731353" y="4183013"/>
+                <a:ext cx="2149677" cy="1613918"/>
+              </a:xfrm>
+              <a:prstGeom prst="rect">
+                <a:avLst/>
+              </a:prstGeom>
+              <a:noFill/>
+              <a:ln w="38100">
+                <a:solidFill>
+                  <a:srgbClr val="00B0F0"/>
+                </a:solidFill>
+                <a:prstDash val="sysDash"/>
+              </a:ln>
+            </p:spPr>
+            <p:txBody>
+              <a:bodyPr anchor="t"/>
+              <a:lstStyle>
+                <a:lvl1pPr marL="342900" indent="-342900" algn="l" defTabSz="914400" rtl="0" eaLnBrk="1" latinLnBrk="0" hangingPunct="1">
+                  <a:spcBef>
+                    <a:spcPct val="20000"/>
+                  </a:spcBef>
+                  <a:buFont typeface="Arial" pitchFamily="34" charset="0"/>
+                  <a:buChar char="•"/>
+                  <a:defRPr sz="3200" kern="1200">
+                    <a:solidFill>
+                      <a:schemeClr val="tx1"/>
+                    </a:solidFill>
+                    <a:latin typeface="+mn-lt"/>
+                    <a:ea typeface="+mn-ea"/>
+                    <a:cs typeface="+mn-cs"/>
+                  </a:defRPr>
+                </a:lvl1pPr>
+                <a:lvl2pPr marL="742950" indent="-285750" algn="l" defTabSz="914400" rtl="0" eaLnBrk="1" latinLnBrk="0" hangingPunct="1">
+                  <a:spcBef>
+                    <a:spcPct val="20000"/>
+                  </a:spcBef>
+                  <a:buFont typeface="Arial" pitchFamily="34" charset="0"/>
+                  <a:buChar char="–"/>
+                  <a:defRPr sz="2800" kern="1200">
+                    <a:solidFill>
+                      <a:schemeClr val="tx1"/>
+                    </a:solidFill>
+                    <a:latin typeface="+mn-lt"/>
+                    <a:ea typeface="+mn-ea"/>
+                    <a:cs typeface="+mn-cs"/>
+                  </a:defRPr>
+                </a:lvl2pPr>
+                <a:lvl3pPr marL="1143000" indent="-228600" algn="l" defTabSz="914400" rtl="0" eaLnBrk="1" latinLnBrk="0" hangingPunct="1">
+                  <a:spcBef>
+                    <a:spcPct val="20000"/>
+                  </a:spcBef>
+                  <a:buFont typeface="Arial" pitchFamily="34" charset="0"/>
+                  <a:buChar char="•"/>
+                  <a:defRPr sz="2400" kern="1200">
+                    <a:solidFill>
+                      <a:schemeClr val="tx1"/>
+                    </a:solidFill>
+                    <a:latin typeface="+mn-lt"/>
+                    <a:ea typeface="+mn-ea"/>
+                    <a:cs typeface="+mn-cs"/>
+                  </a:defRPr>
+                </a:lvl3pPr>
+                <a:lvl4pPr marL="1600200" indent="-228600" algn="l" defTabSz="914400" rtl="0" eaLnBrk="1" latinLnBrk="0" hangingPunct="1">
+                  <a:spcBef>
+                    <a:spcPct val="20000"/>
+                  </a:spcBef>
+                  <a:buFont typeface="Arial" pitchFamily="34" charset="0"/>
+                  <a:buChar char="–"/>
+                  <a:defRPr sz="2000" kern="1200">
+                    <a:solidFill>
+                      <a:schemeClr val="tx1"/>
+                    </a:solidFill>
+                    <a:latin typeface="+mn-lt"/>
+                    <a:ea typeface="+mn-ea"/>
+                    <a:cs typeface="+mn-cs"/>
+                  </a:defRPr>
+                </a:lvl4pPr>
+                <a:lvl5pPr marL="2057400" indent="-228600" algn="l" defTabSz="914400" rtl="0" eaLnBrk="1" latinLnBrk="0" hangingPunct="1">
+                  <a:spcBef>
+                    <a:spcPct val="20000"/>
+                  </a:spcBef>
+                  <a:buFont typeface="Arial" pitchFamily="34" charset="0"/>
+                  <a:buChar char="»"/>
+                  <a:defRPr sz="2000" kern="1200">
+                    <a:solidFill>
+                      <a:schemeClr val="tx1"/>
+                    </a:solidFill>
+                    <a:latin typeface="+mn-lt"/>
+                    <a:ea typeface="+mn-ea"/>
+                    <a:cs typeface="+mn-cs"/>
+                  </a:defRPr>
+                </a:lvl5pPr>
+                <a:lvl6pPr marL="2514600" indent="-228600" algn="l" defTabSz="914400" rtl="0" eaLnBrk="1" latinLnBrk="0" hangingPunct="1">
+                  <a:spcBef>
+                    <a:spcPct val="20000"/>
+                  </a:spcBef>
+                  <a:buFont typeface="Arial" pitchFamily="34" charset="0"/>
+                  <a:buChar char="•"/>
+                  <a:defRPr sz="2000" kern="1200">
+                    <a:solidFill>
+                      <a:schemeClr val="tx1"/>
+                    </a:solidFill>
+                    <a:latin typeface="+mn-lt"/>
+                    <a:ea typeface="+mn-ea"/>
+                    <a:cs typeface="+mn-cs"/>
+                  </a:defRPr>
+                </a:lvl6pPr>
+                <a:lvl7pPr marL="2971800" indent="-228600" algn="l" defTabSz="914400" rtl="0" eaLnBrk="1" latinLnBrk="0" hangingPunct="1">
+                  <a:spcBef>
+                    <a:spcPct val="20000"/>
+                  </a:spcBef>
+                  <a:buFont typeface="Arial" pitchFamily="34" charset="0"/>
+                  <a:buChar char="•"/>
+                  <a:defRPr sz="2000" kern="1200">
+                    <a:solidFill>
+                      <a:schemeClr val="tx1"/>
+                    </a:solidFill>
+                    <a:latin typeface="+mn-lt"/>
+                    <a:ea typeface="+mn-ea"/>
+                    <a:cs typeface="+mn-cs"/>
+                  </a:defRPr>
+                </a:lvl7pPr>
+                <a:lvl8pPr marL="3429000" indent="-228600" algn="l" defTabSz="914400" rtl="0" eaLnBrk="1" latinLnBrk="0" hangingPunct="1">
+                  <a:spcBef>
+                    <a:spcPct val="20000"/>
+                  </a:spcBef>
+                  <a:buFont typeface="Arial" pitchFamily="34" charset="0"/>
+                  <a:buChar char="•"/>
+                  <a:defRPr sz="2000" kern="1200">
+                    <a:solidFill>
+                      <a:schemeClr val="tx1"/>
+                    </a:solidFill>
+                    <a:latin typeface="+mn-lt"/>
+                    <a:ea typeface="+mn-ea"/>
+                    <a:cs typeface="+mn-cs"/>
+                  </a:defRPr>
+                </a:lvl8pPr>
+                <a:lvl9pPr marL="3886200" indent="-228600" algn="l" defTabSz="914400" rtl="0" eaLnBrk="1" latinLnBrk="0" hangingPunct="1">
+                  <a:spcBef>
+                    <a:spcPct val="20000"/>
+                  </a:spcBef>
+                  <a:buFont typeface="Arial" pitchFamily="34" charset="0"/>
+                  <a:buChar char="•"/>
+                  <a:defRPr sz="2000" kern="1200">
+                    <a:solidFill>
+                      <a:schemeClr val="tx1"/>
+                    </a:solidFill>
+                    <a:latin typeface="+mn-lt"/>
+                    <a:ea typeface="+mn-ea"/>
+                    <a:cs typeface="+mn-cs"/>
+                  </a:defRPr>
+                </a:lvl9pPr>
+              </a:lstStyle>
+              <a:p>
+                <a:pPr marL="0" indent="0" algn="ctr">
+                  <a:buFont typeface="Arial" pitchFamily="34" charset="0"/>
+                  <a:buNone/>
+                </a:pPr>
+                <a:r>
+                  <a:rPr lang="en-GB" sz="1100" b="1" dirty="0" smtClean="0">
+                    <a:latin typeface="Airal"/>
+                  </a:rPr>
+                  <a:t>Customised retention strategies:</a:t>
+                </a:r>
+              </a:p>
+              <a:p>
+                <a:pPr marL="0" indent="0" algn="ctr">
+                  <a:buFont typeface="Arial" pitchFamily="34" charset="0"/>
+                  <a:buNone/>
+                </a:pPr>
+                <a:endParaRPr lang="en-GB" sz="1100" b="1" dirty="0">
+                  <a:latin typeface="Airal"/>
+                </a:endParaRPr>
+              </a:p>
+              <a:p>
+                <a:pPr>
+                  <a:buFont typeface="Wingdings" panose="05000000000000000000" pitchFamily="2" charset="2"/>
+                  <a:buChar char="ü"/>
+                </a:pPr>
+                <a:r>
+                  <a:rPr lang="en-GB" sz="1100" dirty="0" smtClean="0">
+                    <a:latin typeface="Airal"/>
+                  </a:rPr>
+                  <a:t>Discount offers</a:t>
+                </a:r>
+              </a:p>
+              <a:p>
+                <a:pPr>
+                  <a:buFont typeface="Wingdings" panose="05000000000000000000" pitchFamily="2" charset="2"/>
+                  <a:buChar char="ü"/>
+                </a:pPr>
+                <a:endParaRPr lang="en-GB" sz="1100" dirty="0" smtClean="0">
+                  <a:latin typeface="Airal"/>
+                </a:endParaRPr>
+              </a:p>
+              <a:p>
+                <a:pPr>
+                  <a:buFont typeface="Wingdings" panose="05000000000000000000" pitchFamily="2" charset="2"/>
+                  <a:buChar char="ü"/>
+                </a:pPr>
+                <a:r>
+                  <a:rPr lang="en-GB" sz="1100" dirty="0" smtClean="0">
+                    <a:latin typeface="Airal"/>
+                  </a:rPr>
+                  <a:t>Reminder of </a:t>
+                </a:r>
+                <a:r>
+                  <a:rPr lang="en-GB" sz="1100" dirty="0" smtClean="0">
+                    <a:latin typeface="Airal"/>
+                  </a:rPr>
+                  <a:t>engagement</a:t>
+                </a:r>
+                <a:endParaRPr lang="en-GB" sz="1100" dirty="0" smtClean="0">
+                  <a:latin typeface="Airal"/>
+                </a:endParaRPr>
+              </a:p>
+            </p:txBody>
+          </p:sp>
+        </p:grpSp>
+      </p:grpSp>
+    </p:spTree>
+    <p:extLst>
+      <p:ext uri="{BB962C8B-B14F-4D97-AF65-F5344CB8AC3E}">
+        <p14:creationId xmlns:p14="http://schemas.microsoft.com/office/powerpoint/2010/main" val="2388042381"/>
+      </p:ext>
+    </p:extLst>
+  </p:cSld>
+  <p:clrMapOvr>
+    <a:masterClrMapping/>
+  </p:clrMapOvr>
+  <p:timing>
+    <p:tnLst>
+      <p:par>
+        <p:cTn id="1" dur="indefinite" restart="never" nodeType="tmRoot"/>
+      </p:par>
+    </p:tnLst>
+  </p:timing>
+</p:sld>
+</file>
+
 <file path=ppt/theme/theme1.xml><?xml version="1.0" encoding="utf-8"?>
 <a:theme xmlns:a="http://schemas.openxmlformats.org/drawingml/2006/main" name="Office Theme">
   <a:themeElements>

</xml_diff>

<commit_message>
finalise report and slides
</commit_message>
<xml_diff>
--- a/Report/Figure/Figure.pptx
+++ b/Report/Figure/Figure.pptx
@@ -4946,7 +4946,7 @@
           <a:p>
             <a:fld id="{A8DE2402-11CB-48E9-B2A8-3DD8F13E9CB1}" type="datetimeFigureOut">
               <a:rPr lang="en-US" smtClean="0"/>
-              <a:t>6/20/2018</a:t>
+              <a:t>6/21/2018</a:t>
             </a:fld>
             <a:endParaRPr lang="en-US"/>
           </a:p>
@@ -5116,7 +5116,7 @@
           <a:p>
             <a:fld id="{A8DE2402-11CB-48E9-B2A8-3DD8F13E9CB1}" type="datetimeFigureOut">
               <a:rPr lang="en-US" smtClean="0"/>
-              <a:t>6/20/2018</a:t>
+              <a:t>6/21/2018</a:t>
             </a:fld>
             <a:endParaRPr lang="en-US"/>
           </a:p>
@@ -5296,7 +5296,7 @@
           <a:p>
             <a:fld id="{A8DE2402-11CB-48E9-B2A8-3DD8F13E9CB1}" type="datetimeFigureOut">
               <a:rPr lang="en-US" smtClean="0"/>
-              <a:t>6/20/2018</a:t>
+              <a:t>6/21/2018</a:t>
             </a:fld>
             <a:endParaRPr lang="en-US"/>
           </a:p>
@@ -5736,7 +5736,7 @@
           <a:p>
             <a:fld id="{A8DE2402-11CB-48E9-B2A8-3DD8F13E9CB1}" type="datetimeFigureOut">
               <a:rPr lang="en-US" smtClean="0"/>
-              <a:t>6/20/2018</a:t>
+              <a:t>6/21/2018</a:t>
             </a:fld>
             <a:endParaRPr lang="en-US"/>
           </a:p>
@@ -5982,7 +5982,7 @@
           <a:p>
             <a:fld id="{A8DE2402-11CB-48E9-B2A8-3DD8F13E9CB1}" type="datetimeFigureOut">
               <a:rPr lang="en-US" smtClean="0"/>
-              <a:t>6/20/2018</a:t>
+              <a:t>6/21/2018</a:t>
             </a:fld>
             <a:endParaRPr lang="en-US"/>
           </a:p>
@@ -6214,7 +6214,7 @@
           <a:p>
             <a:fld id="{A8DE2402-11CB-48E9-B2A8-3DD8F13E9CB1}" type="datetimeFigureOut">
               <a:rPr lang="en-US" smtClean="0"/>
-              <a:t>6/20/2018</a:t>
+              <a:t>6/21/2018</a:t>
             </a:fld>
             <a:endParaRPr lang="en-US"/>
           </a:p>
@@ -6581,7 +6581,7 @@
           <a:p>
             <a:fld id="{A8DE2402-11CB-48E9-B2A8-3DD8F13E9CB1}" type="datetimeFigureOut">
               <a:rPr lang="en-US" smtClean="0"/>
-              <a:t>6/20/2018</a:t>
+              <a:t>6/21/2018</a:t>
             </a:fld>
             <a:endParaRPr lang="en-US"/>
           </a:p>
@@ -6699,7 +6699,7 @@
           <a:p>
             <a:fld id="{A8DE2402-11CB-48E9-B2A8-3DD8F13E9CB1}" type="datetimeFigureOut">
               <a:rPr lang="en-US" smtClean="0"/>
-              <a:t>6/20/2018</a:t>
+              <a:t>6/21/2018</a:t>
             </a:fld>
             <a:endParaRPr lang="en-US"/>
           </a:p>
@@ -6794,7 +6794,7 @@
           <a:p>
             <a:fld id="{A8DE2402-11CB-48E9-B2A8-3DD8F13E9CB1}" type="datetimeFigureOut">
               <a:rPr lang="en-US" smtClean="0"/>
-              <a:t>6/20/2018</a:t>
+              <a:t>6/21/2018</a:t>
             </a:fld>
             <a:endParaRPr lang="en-US"/>
           </a:p>
@@ -7071,7 +7071,7 @@
           <a:p>
             <a:fld id="{A8DE2402-11CB-48E9-B2A8-3DD8F13E9CB1}" type="datetimeFigureOut">
               <a:rPr lang="en-US" smtClean="0"/>
-              <a:t>6/20/2018</a:t>
+              <a:t>6/21/2018</a:t>
             </a:fld>
             <a:endParaRPr lang="en-US"/>
           </a:p>
@@ -7324,7 +7324,7 @@
           <a:p>
             <a:fld id="{A8DE2402-11CB-48E9-B2A8-3DD8F13E9CB1}" type="datetimeFigureOut">
               <a:rPr lang="en-US" smtClean="0"/>
-              <a:t>6/20/2018</a:t>
+              <a:t>6/21/2018</a:t>
             </a:fld>
             <a:endParaRPr lang="en-US"/>
           </a:p>
@@ -7537,7 +7537,7 @@
           <a:p>
             <a:fld id="{A8DE2402-11CB-48E9-B2A8-3DD8F13E9CB1}" type="datetimeFigureOut">
               <a:rPr lang="en-US" smtClean="0"/>
-              <a:t>6/20/2018</a:t>
+              <a:t>6/21/2018</a:t>
             </a:fld>
             <a:endParaRPr lang="en-US"/>
           </a:p>
@@ -17788,6 +17788,3750 @@
             </a:p>
           </p:txBody>
         </p:sp>
+      </p:grpSp>
+      <p:grpSp>
+        <p:nvGrpSpPr>
+          <p:cNvPr id="2" name="Group 1"/>
+          <p:cNvGrpSpPr/>
+          <p:nvPr/>
+        </p:nvGrpSpPr>
+        <p:grpSpPr>
+          <a:xfrm>
+            <a:off x="1115616" y="2852936"/>
+            <a:ext cx="4374732" cy="2898586"/>
+            <a:chOff x="1115616" y="2852936"/>
+            <a:chExt cx="4374732" cy="2898586"/>
+          </a:xfrm>
+        </p:grpSpPr>
+        <mc:AlternateContent xmlns:mc="http://schemas.openxmlformats.org/markup-compatibility/2006">
+          <mc:Choice xmlns:a14="http://schemas.microsoft.com/office/drawing/2010/main" Requires="a14">
+            <p:sp>
+              <p:nvSpPr>
+                <p:cNvPr id="32" name="Oval 31"/>
+                <p:cNvSpPr/>
+                <p:nvPr/>
+              </p:nvSpPr>
+              <p:spPr>
+                <a:xfrm>
+                  <a:off x="2250538" y="3829260"/>
+                  <a:ext cx="460587" cy="453812"/>
+                </a:xfrm>
+                <a:prstGeom prst="ellipse">
+                  <a:avLst/>
+                </a:prstGeom>
+                <a:solidFill>
+                  <a:srgbClr val="FF0000"/>
+                </a:solidFill>
+                <a:ln>
+                  <a:solidFill>
+                    <a:schemeClr val="tx1"/>
+                  </a:solidFill>
+                </a:ln>
+              </p:spPr>
+              <p:style>
+                <a:lnRef idx="2">
+                  <a:schemeClr val="accent1">
+                    <a:shade val="50000"/>
+                  </a:schemeClr>
+                </a:lnRef>
+                <a:fillRef idx="1">
+                  <a:schemeClr val="accent1"/>
+                </a:fillRef>
+                <a:effectRef idx="0">
+                  <a:schemeClr val="accent1"/>
+                </a:effectRef>
+                <a:fontRef idx="minor">
+                  <a:schemeClr val="lt1"/>
+                </a:fontRef>
+              </p:style>
+              <p:txBody>
+                <a:bodyPr lIns="0" rIns="0" rtlCol="0" anchor="ctr"/>
+                <a:lstStyle/>
+                <a:p>
+                  <a:pPr algn="ctr"/>
+                  <a14:m>
+                    <m:oMathPara xmlns:m="http://schemas.openxmlformats.org/officeDocument/2006/math">
+                      <m:oMathParaPr>
+                        <m:jc m:val="centerGroup"/>
+                      </m:oMathParaPr>
+                      <m:oMath xmlns:m="http://schemas.openxmlformats.org/officeDocument/2006/math">
+                        <m:sSub>
+                          <m:sSubPr>
+                            <m:ctrlPr>
+                              <a:rPr lang="en-GB" sz="1100" b="0" i="1" smtClean="0">
+                                <a:solidFill>
+                                  <a:schemeClr val="tx1"/>
+                                </a:solidFill>
+                                <a:latin typeface="Cambria Math" panose="02040503050406030204" pitchFamily="18" charset="0"/>
+                              </a:rPr>
+                            </m:ctrlPr>
+                          </m:sSubPr>
+                          <m:e>
+                            <m:r>
+                              <a:rPr lang="en-GB" sz="1100" b="0" i="1" smtClean="0">
+                                <a:solidFill>
+                                  <a:schemeClr val="tx1"/>
+                                </a:solidFill>
+                                <a:latin typeface="Cambria Math" panose="02040503050406030204" pitchFamily="18" charset="0"/>
+                              </a:rPr>
+                              <m:t>𝐶</m:t>
+                            </m:r>
+                          </m:e>
+                          <m:sub>
+                            <m:r>
+                              <a:rPr lang="en-GB" sz="1100" b="0" i="1" smtClean="0">
+                                <a:solidFill>
+                                  <a:schemeClr val="tx1"/>
+                                </a:solidFill>
+                                <a:latin typeface="Cambria Math" panose="02040503050406030204" pitchFamily="18" charset="0"/>
+                              </a:rPr>
+                              <m:t>1</m:t>
+                            </m:r>
+                          </m:sub>
+                        </m:sSub>
+                      </m:oMath>
+                    </m:oMathPara>
+                  </a14:m>
+                  <a:endParaRPr lang="en-US" sz="1100" dirty="0">
+                    <a:solidFill>
+                      <a:schemeClr val="tx1"/>
+                    </a:solidFill>
+                  </a:endParaRPr>
+                </a:p>
+              </p:txBody>
+            </p:sp>
+          </mc:Choice>
+          <mc:Fallback>
+            <p:sp>
+              <p:nvSpPr>
+                <p:cNvPr id="32" name="Oval 31"/>
+                <p:cNvSpPr>
+                  <a:spLocks noRot="1" noChangeAspect="1" noMove="1" noResize="1" noEditPoints="1" noAdjustHandles="1" noChangeArrowheads="1" noChangeShapeType="1" noTextEdit="1"/>
+                </p:cNvSpPr>
+                <p:nvPr/>
+              </p:nvSpPr>
+              <p:spPr>
+                <a:xfrm>
+                  <a:off x="2250538" y="3829260"/>
+                  <a:ext cx="460587" cy="453812"/>
+                </a:xfrm>
+                <a:prstGeom prst="ellipse">
+                  <a:avLst/>
+                </a:prstGeom>
+                <a:blipFill>
+                  <a:blip r:embed="rId9"/>
+                  <a:stretch>
+                    <a:fillRect/>
+                  </a:stretch>
+                </a:blipFill>
+                <a:ln>
+                  <a:solidFill>
+                    <a:schemeClr val="tx1"/>
+                  </a:solidFill>
+                </a:ln>
+              </p:spPr>
+              <p:txBody>
+                <a:bodyPr/>
+                <a:lstStyle/>
+                <a:p>
+                  <a:r>
+                    <a:rPr lang="en-US">
+                      <a:noFill/>
+                    </a:rPr>
+                    <a:t> </a:t>
+                  </a:r>
+                </a:p>
+              </p:txBody>
+            </p:sp>
+          </mc:Fallback>
+        </mc:AlternateContent>
+        <mc:AlternateContent xmlns:mc="http://schemas.openxmlformats.org/markup-compatibility/2006">
+          <mc:Choice xmlns:a14="http://schemas.microsoft.com/office/drawing/2010/main" Requires="a14">
+            <p:sp>
+              <p:nvSpPr>
+                <p:cNvPr id="33" name="Oval 32"/>
+                <p:cNvSpPr/>
+                <p:nvPr/>
+              </p:nvSpPr>
+              <p:spPr>
+                <a:xfrm>
+                  <a:off x="3340064" y="5055194"/>
+                  <a:ext cx="460587" cy="453812"/>
+                </a:xfrm>
+                <a:prstGeom prst="ellipse">
+                  <a:avLst/>
+                </a:prstGeom>
+                <a:solidFill>
+                  <a:schemeClr val="bg1">
+                    <a:lumMod val="95000"/>
+                  </a:schemeClr>
+                </a:solidFill>
+                <a:ln>
+                  <a:solidFill>
+                    <a:schemeClr val="tx1"/>
+                  </a:solidFill>
+                  <a:prstDash val="sysDot"/>
+                </a:ln>
+              </p:spPr>
+              <p:style>
+                <a:lnRef idx="2">
+                  <a:schemeClr val="accent1">
+                    <a:shade val="50000"/>
+                  </a:schemeClr>
+                </a:lnRef>
+                <a:fillRef idx="1">
+                  <a:schemeClr val="accent1"/>
+                </a:fillRef>
+                <a:effectRef idx="0">
+                  <a:schemeClr val="accent1"/>
+                </a:effectRef>
+                <a:fontRef idx="minor">
+                  <a:schemeClr val="lt1"/>
+                </a:fontRef>
+              </p:style>
+              <p:txBody>
+                <a:bodyPr lIns="0" rIns="0" rtlCol="0" anchor="ctr"/>
+                <a:lstStyle/>
+                <a:p>
+                  <a:pPr algn="ctr"/>
+                  <a14:m>
+                    <m:oMathPara xmlns:m="http://schemas.openxmlformats.org/officeDocument/2006/math">
+                      <m:oMathParaPr>
+                        <m:jc m:val="centerGroup"/>
+                      </m:oMathParaPr>
+                      <m:oMath xmlns:m="http://schemas.openxmlformats.org/officeDocument/2006/math">
+                        <m:sSub>
+                          <m:sSubPr>
+                            <m:ctrlPr>
+                              <a:rPr lang="en-GB" sz="1100" b="0" i="1" smtClean="0">
+                                <a:solidFill>
+                                  <a:schemeClr val="tx1"/>
+                                </a:solidFill>
+                                <a:latin typeface="Cambria Math" panose="02040503050406030204" pitchFamily="18" charset="0"/>
+                              </a:rPr>
+                            </m:ctrlPr>
+                          </m:sSubPr>
+                          <m:e>
+                            <m:r>
+                              <a:rPr lang="en-GB" sz="1100" b="0" i="1" smtClean="0">
+                                <a:solidFill>
+                                  <a:schemeClr val="tx1"/>
+                                </a:solidFill>
+                                <a:latin typeface="Cambria Math" panose="02040503050406030204" pitchFamily="18" charset="0"/>
+                              </a:rPr>
+                              <m:t>𝑆</m:t>
+                            </m:r>
+                          </m:e>
+                          <m:sub>
+                            <m:r>
+                              <a:rPr lang="en-GB" sz="1100" b="0" i="1" smtClean="0">
+                                <a:solidFill>
+                                  <a:schemeClr val="tx1"/>
+                                </a:solidFill>
+                                <a:latin typeface="Cambria Math" panose="02040503050406030204" pitchFamily="18" charset="0"/>
+                              </a:rPr>
+                              <m:t>2</m:t>
+                            </m:r>
+                          </m:sub>
+                        </m:sSub>
+                      </m:oMath>
+                    </m:oMathPara>
+                  </a14:m>
+                  <a:endParaRPr lang="en-US" sz="1100" dirty="0">
+                    <a:solidFill>
+                      <a:schemeClr val="tx1"/>
+                    </a:solidFill>
+                  </a:endParaRPr>
+                </a:p>
+              </p:txBody>
+            </p:sp>
+          </mc:Choice>
+          <mc:Fallback>
+            <p:sp>
+              <p:nvSpPr>
+                <p:cNvPr id="33" name="Oval 32"/>
+                <p:cNvSpPr>
+                  <a:spLocks noRot="1" noChangeAspect="1" noMove="1" noResize="1" noEditPoints="1" noAdjustHandles="1" noChangeArrowheads="1" noChangeShapeType="1" noTextEdit="1"/>
+                </p:cNvSpPr>
+                <p:nvPr/>
+              </p:nvSpPr>
+              <p:spPr>
+                <a:xfrm>
+                  <a:off x="3340064" y="5055194"/>
+                  <a:ext cx="460587" cy="453812"/>
+                </a:xfrm>
+                <a:prstGeom prst="ellipse">
+                  <a:avLst/>
+                </a:prstGeom>
+                <a:blipFill>
+                  <a:blip r:embed="rId10"/>
+                  <a:stretch>
+                    <a:fillRect/>
+                  </a:stretch>
+                </a:blipFill>
+                <a:ln>
+                  <a:solidFill>
+                    <a:schemeClr val="tx1"/>
+                  </a:solidFill>
+                  <a:prstDash val="sysDot"/>
+                </a:ln>
+              </p:spPr>
+              <p:txBody>
+                <a:bodyPr/>
+                <a:lstStyle/>
+                <a:p>
+                  <a:r>
+                    <a:rPr lang="en-US">
+                      <a:noFill/>
+                    </a:rPr>
+                    <a:t> </a:t>
+                  </a:r>
+                </a:p>
+              </p:txBody>
+            </p:sp>
+          </mc:Fallback>
+        </mc:AlternateContent>
+        <p:cxnSp>
+          <p:nvCxnSpPr>
+            <p:cNvPr id="35" name="Straight Connector 34"/>
+            <p:cNvCxnSpPr/>
+            <p:nvPr/>
+          </p:nvCxnSpPr>
+          <p:spPr>
+            <a:xfrm>
+              <a:off x="1169868" y="4743410"/>
+              <a:ext cx="4320480" cy="0"/>
+            </a:xfrm>
+            <a:prstGeom prst="line">
+              <a:avLst/>
+            </a:prstGeom>
+            <a:ln w="19050">
+              <a:solidFill>
+                <a:schemeClr val="tx1"/>
+              </a:solidFill>
+              <a:prstDash val="sysDot"/>
+            </a:ln>
+          </p:spPr>
+          <p:style>
+            <a:lnRef idx="1">
+              <a:schemeClr val="accent1"/>
+            </a:lnRef>
+            <a:fillRef idx="0">
+              <a:schemeClr val="accent1"/>
+            </a:fillRef>
+            <a:effectRef idx="0">
+              <a:schemeClr val="accent1"/>
+            </a:effectRef>
+            <a:fontRef idx="minor">
+              <a:schemeClr val="tx1"/>
+            </a:fontRef>
+          </p:style>
+        </p:cxnSp>
+        <mc:AlternateContent xmlns:mc="http://schemas.openxmlformats.org/markup-compatibility/2006">
+          <mc:Choice xmlns:a14="http://schemas.microsoft.com/office/drawing/2010/main" Requires="a14">
+            <p:sp>
+              <p:nvSpPr>
+                <p:cNvPr id="36" name="Oval 35"/>
+                <p:cNvSpPr/>
+                <p:nvPr/>
+              </p:nvSpPr>
+              <p:spPr>
+                <a:xfrm>
+                  <a:off x="4028912" y="5055194"/>
+                  <a:ext cx="460587" cy="453812"/>
+                </a:xfrm>
+                <a:prstGeom prst="ellipse">
+                  <a:avLst/>
+                </a:prstGeom>
+                <a:solidFill>
+                  <a:schemeClr val="bg1">
+                    <a:lumMod val="95000"/>
+                  </a:schemeClr>
+                </a:solidFill>
+                <a:ln>
+                  <a:solidFill>
+                    <a:schemeClr val="tx1"/>
+                  </a:solidFill>
+                  <a:prstDash val="sysDot"/>
+                </a:ln>
+              </p:spPr>
+              <p:style>
+                <a:lnRef idx="2">
+                  <a:schemeClr val="accent1">
+                    <a:shade val="50000"/>
+                  </a:schemeClr>
+                </a:lnRef>
+                <a:fillRef idx="1">
+                  <a:schemeClr val="accent1"/>
+                </a:fillRef>
+                <a:effectRef idx="0">
+                  <a:schemeClr val="accent1"/>
+                </a:effectRef>
+                <a:fontRef idx="minor">
+                  <a:schemeClr val="lt1"/>
+                </a:fontRef>
+              </p:style>
+              <p:txBody>
+                <a:bodyPr lIns="0" rIns="0" rtlCol="0" anchor="ctr"/>
+                <a:lstStyle/>
+                <a:p>
+                  <a:pPr algn="ctr"/>
+                  <a14:m>
+                    <m:oMathPara xmlns:m="http://schemas.openxmlformats.org/officeDocument/2006/math">
+                      <m:oMathParaPr>
+                        <m:jc m:val="centerGroup"/>
+                      </m:oMathParaPr>
+                      <m:oMath xmlns:m="http://schemas.openxmlformats.org/officeDocument/2006/math">
+                        <m:sSub>
+                          <m:sSubPr>
+                            <m:ctrlPr>
+                              <a:rPr lang="en-GB" sz="1100" b="0" i="1" smtClean="0">
+                                <a:solidFill>
+                                  <a:schemeClr val="tx1"/>
+                                </a:solidFill>
+                                <a:latin typeface="Cambria Math" panose="02040503050406030204" pitchFamily="18" charset="0"/>
+                              </a:rPr>
+                            </m:ctrlPr>
+                          </m:sSubPr>
+                          <m:e>
+                            <m:r>
+                              <a:rPr lang="en-GB" sz="1100" b="0" i="1" smtClean="0">
+                                <a:solidFill>
+                                  <a:schemeClr val="tx1"/>
+                                </a:solidFill>
+                                <a:latin typeface="Cambria Math" panose="02040503050406030204" pitchFamily="18" charset="0"/>
+                              </a:rPr>
+                              <m:t>𝑆</m:t>
+                            </m:r>
+                          </m:e>
+                          <m:sub>
+                            <m:r>
+                              <a:rPr lang="en-GB" sz="1100" b="0" i="1" smtClean="0">
+                                <a:solidFill>
+                                  <a:schemeClr val="tx1"/>
+                                </a:solidFill>
+                                <a:latin typeface="Cambria Math" panose="02040503050406030204" pitchFamily="18" charset="0"/>
+                              </a:rPr>
+                              <m:t>3</m:t>
+                            </m:r>
+                          </m:sub>
+                        </m:sSub>
+                      </m:oMath>
+                    </m:oMathPara>
+                  </a14:m>
+                  <a:endParaRPr lang="en-US" sz="1100" dirty="0">
+                    <a:solidFill>
+                      <a:schemeClr val="tx1"/>
+                    </a:solidFill>
+                  </a:endParaRPr>
+                </a:p>
+              </p:txBody>
+            </p:sp>
+          </mc:Choice>
+          <mc:Fallback>
+            <p:sp>
+              <p:nvSpPr>
+                <p:cNvPr id="36" name="Oval 35"/>
+                <p:cNvSpPr>
+                  <a:spLocks noRot="1" noChangeAspect="1" noMove="1" noResize="1" noEditPoints="1" noAdjustHandles="1" noChangeArrowheads="1" noChangeShapeType="1" noTextEdit="1"/>
+                </p:cNvSpPr>
+                <p:nvPr/>
+              </p:nvSpPr>
+              <p:spPr>
+                <a:xfrm>
+                  <a:off x="4028912" y="5055194"/>
+                  <a:ext cx="460587" cy="453812"/>
+                </a:xfrm>
+                <a:prstGeom prst="ellipse">
+                  <a:avLst/>
+                </a:prstGeom>
+                <a:blipFill>
+                  <a:blip r:embed="rId11"/>
+                  <a:stretch>
+                    <a:fillRect/>
+                  </a:stretch>
+                </a:blipFill>
+                <a:ln>
+                  <a:solidFill>
+                    <a:schemeClr val="tx1"/>
+                  </a:solidFill>
+                  <a:prstDash val="sysDot"/>
+                </a:ln>
+              </p:spPr>
+              <p:txBody>
+                <a:bodyPr/>
+                <a:lstStyle/>
+                <a:p>
+                  <a:r>
+                    <a:rPr lang="en-US">
+                      <a:noFill/>
+                    </a:rPr>
+                    <a:t> </a:t>
+                  </a:r>
+                </a:p>
+              </p:txBody>
+            </p:sp>
+          </mc:Fallback>
+        </mc:AlternateContent>
+        <mc:AlternateContent xmlns:mc="http://schemas.openxmlformats.org/markup-compatibility/2006">
+          <mc:Choice xmlns:a14="http://schemas.microsoft.com/office/drawing/2010/main" Requires="a14">
+            <p:sp>
+              <p:nvSpPr>
+                <p:cNvPr id="38" name="Oval 37"/>
+                <p:cNvSpPr/>
+                <p:nvPr/>
+              </p:nvSpPr>
+              <p:spPr>
+                <a:xfrm>
+                  <a:off x="2651216" y="5055194"/>
+                  <a:ext cx="460587" cy="453812"/>
+                </a:xfrm>
+                <a:prstGeom prst="ellipse">
+                  <a:avLst/>
+                </a:prstGeom>
+                <a:solidFill>
+                  <a:schemeClr val="bg1">
+                    <a:lumMod val="95000"/>
+                  </a:schemeClr>
+                </a:solidFill>
+                <a:ln>
+                  <a:solidFill>
+                    <a:schemeClr val="tx1"/>
+                  </a:solidFill>
+                  <a:prstDash val="sysDot"/>
+                </a:ln>
+              </p:spPr>
+              <p:style>
+                <a:lnRef idx="2">
+                  <a:schemeClr val="accent1">
+                    <a:shade val="50000"/>
+                  </a:schemeClr>
+                </a:lnRef>
+                <a:fillRef idx="1">
+                  <a:schemeClr val="accent1"/>
+                </a:fillRef>
+                <a:effectRef idx="0">
+                  <a:schemeClr val="accent1"/>
+                </a:effectRef>
+                <a:fontRef idx="minor">
+                  <a:schemeClr val="lt1"/>
+                </a:fontRef>
+              </p:style>
+              <p:txBody>
+                <a:bodyPr lIns="0" rIns="0" rtlCol="0" anchor="ctr"/>
+                <a:lstStyle/>
+                <a:p>
+                  <a:pPr algn="ctr"/>
+                  <a14:m>
+                    <m:oMathPara xmlns:m="http://schemas.openxmlformats.org/officeDocument/2006/math">
+                      <m:oMathParaPr>
+                        <m:jc m:val="centerGroup"/>
+                      </m:oMathParaPr>
+                      <m:oMath xmlns:m="http://schemas.openxmlformats.org/officeDocument/2006/math">
+                        <m:sSub>
+                          <m:sSubPr>
+                            <m:ctrlPr>
+                              <a:rPr lang="en-GB" sz="1100" b="0" i="1" smtClean="0">
+                                <a:solidFill>
+                                  <a:schemeClr val="tx1"/>
+                                </a:solidFill>
+                                <a:latin typeface="Cambria Math" panose="02040503050406030204" pitchFamily="18" charset="0"/>
+                              </a:rPr>
+                            </m:ctrlPr>
+                          </m:sSubPr>
+                          <m:e>
+                            <m:r>
+                              <a:rPr lang="en-GB" sz="1100" b="0" i="1" smtClean="0">
+                                <a:solidFill>
+                                  <a:schemeClr val="tx1"/>
+                                </a:solidFill>
+                                <a:latin typeface="Cambria Math" panose="02040503050406030204" pitchFamily="18" charset="0"/>
+                              </a:rPr>
+                              <m:t>𝑆</m:t>
+                            </m:r>
+                          </m:e>
+                          <m:sub>
+                            <m:r>
+                              <a:rPr lang="en-GB" sz="1100" b="0" i="1" smtClean="0">
+                                <a:solidFill>
+                                  <a:schemeClr val="tx1"/>
+                                </a:solidFill>
+                                <a:latin typeface="Cambria Math" panose="02040503050406030204" pitchFamily="18" charset="0"/>
+                              </a:rPr>
+                              <m:t>1</m:t>
+                            </m:r>
+                          </m:sub>
+                        </m:sSub>
+                      </m:oMath>
+                    </m:oMathPara>
+                  </a14:m>
+                  <a:endParaRPr lang="en-US" sz="1100" dirty="0">
+                    <a:solidFill>
+                      <a:schemeClr val="tx1"/>
+                    </a:solidFill>
+                  </a:endParaRPr>
+                </a:p>
+              </p:txBody>
+            </p:sp>
+          </mc:Choice>
+          <mc:Fallback>
+            <p:sp>
+              <p:nvSpPr>
+                <p:cNvPr id="38" name="Oval 37"/>
+                <p:cNvSpPr>
+                  <a:spLocks noRot="1" noChangeAspect="1" noMove="1" noResize="1" noEditPoints="1" noAdjustHandles="1" noChangeArrowheads="1" noChangeShapeType="1" noTextEdit="1"/>
+                </p:cNvSpPr>
+                <p:nvPr/>
+              </p:nvSpPr>
+              <p:spPr>
+                <a:xfrm>
+                  <a:off x="2651216" y="5055194"/>
+                  <a:ext cx="460587" cy="453812"/>
+                </a:xfrm>
+                <a:prstGeom prst="ellipse">
+                  <a:avLst/>
+                </a:prstGeom>
+                <a:blipFill>
+                  <a:blip r:embed="rId12"/>
+                  <a:stretch>
+                    <a:fillRect/>
+                  </a:stretch>
+                </a:blipFill>
+                <a:ln>
+                  <a:solidFill>
+                    <a:schemeClr val="tx1"/>
+                  </a:solidFill>
+                  <a:prstDash val="sysDot"/>
+                </a:ln>
+              </p:spPr>
+              <p:txBody>
+                <a:bodyPr/>
+                <a:lstStyle/>
+                <a:p>
+                  <a:r>
+                    <a:rPr lang="en-US">
+                      <a:noFill/>
+                    </a:rPr>
+                    <a:t> </a:t>
+                  </a:r>
+                </a:p>
+              </p:txBody>
+            </p:sp>
+          </mc:Fallback>
+        </mc:AlternateContent>
+        <p:sp>
+          <p:nvSpPr>
+            <p:cNvPr id="39" name="Content Placeholder 2"/>
+            <p:cNvSpPr txBox="1">
+              <a:spLocks/>
+            </p:cNvSpPr>
+            <p:nvPr/>
+          </p:nvSpPr>
+          <p:spPr>
+            <a:xfrm>
+              <a:off x="1115616" y="3894203"/>
+              <a:ext cx="1062364" cy="306298"/>
+            </a:xfrm>
+            <a:prstGeom prst="rect">
+              <a:avLst/>
+            </a:prstGeom>
+            <a:noFill/>
+          </p:spPr>
+          <p:txBody>
+            <a:bodyPr anchor="ctr"/>
+            <a:lstStyle>
+              <a:lvl1pPr marL="342900" indent="-342900" algn="l" defTabSz="914400" rtl="0" eaLnBrk="1" latinLnBrk="0" hangingPunct="1">
+                <a:spcBef>
+                  <a:spcPct val="20000"/>
+                </a:spcBef>
+                <a:buFont typeface="Arial" pitchFamily="34" charset="0"/>
+                <a:buChar char="•"/>
+                <a:defRPr sz="3200" kern="1200">
+                  <a:solidFill>
+                    <a:schemeClr val="tx1"/>
+                  </a:solidFill>
+                  <a:latin typeface="+mn-lt"/>
+                  <a:ea typeface="+mn-ea"/>
+                  <a:cs typeface="+mn-cs"/>
+                </a:defRPr>
+              </a:lvl1pPr>
+              <a:lvl2pPr marL="742950" indent="-285750" algn="l" defTabSz="914400" rtl="0" eaLnBrk="1" latinLnBrk="0" hangingPunct="1">
+                <a:spcBef>
+                  <a:spcPct val="20000"/>
+                </a:spcBef>
+                <a:buFont typeface="Arial" pitchFamily="34" charset="0"/>
+                <a:buChar char="–"/>
+                <a:defRPr sz="2800" kern="1200">
+                  <a:solidFill>
+                    <a:schemeClr val="tx1"/>
+                  </a:solidFill>
+                  <a:latin typeface="+mn-lt"/>
+                  <a:ea typeface="+mn-ea"/>
+                  <a:cs typeface="+mn-cs"/>
+                </a:defRPr>
+              </a:lvl2pPr>
+              <a:lvl3pPr marL="1143000" indent="-228600" algn="l" defTabSz="914400" rtl="0" eaLnBrk="1" latinLnBrk="0" hangingPunct="1">
+                <a:spcBef>
+                  <a:spcPct val="20000"/>
+                </a:spcBef>
+                <a:buFont typeface="Arial" pitchFamily="34" charset="0"/>
+                <a:buChar char="•"/>
+                <a:defRPr sz="2400" kern="1200">
+                  <a:solidFill>
+                    <a:schemeClr val="tx1"/>
+                  </a:solidFill>
+                  <a:latin typeface="+mn-lt"/>
+                  <a:ea typeface="+mn-ea"/>
+                  <a:cs typeface="+mn-cs"/>
+                </a:defRPr>
+              </a:lvl3pPr>
+              <a:lvl4pPr marL="1600200" indent="-228600" algn="l" defTabSz="914400" rtl="0" eaLnBrk="1" latinLnBrk="0" hangingPunct="1">
+                <a:spcBef>
+                  <a:spcPct val="20000"/>
+                </a:spcBef>
+                <a:buFont typeface="Arial" pitchFamily="34" charset="0"/>
+                <a:buChar char="–"/>
+                <a:defRPr sz="2000" kern="1200">
+                  <a:solidFill>
+                    <a:schemeClr val="tx1"/>
+                  </a:solidFill>
+                  <a:latin typeface="+mn-lt"/>
+                  <a:ea typeface="+mn-ea"/>
+                  <a:cs typeface="+mn-cs"/>
+                </a:defRPr>
+              </a:lvl4pPr>
+              <a:lvl5pPr marL="2057400" indent="-228600" algn="l" defTabSz="914400" rtl="0" eaLnBrk="1" latinLnBrk="0" hangingPunct="1">
+                <a:spcBef>
+                  <a:spcPct val="20000"/>
+                </a:spcBef>
+                <a:buFont typeface="Arial" pitchFamily="34" charset="0"/>
+                <a:buChar char="»"/>
+                <a:defRPr sz="2000" kern="1200">
+                  <a:solidFill>
+                    <a:schemeClr val="tx1"/>
+                  </a:solidFill>
+                  <a:latin typeface="+mn-lt"/>
+                  <a:ea typeface="+mn-ea"/>
+                  <a:cs typeface="+mn-cs"/>
+                </a:defRPr>
+              </a:lvl5pPr>
+              <a:lvl6pPr marL="2514600" indent="-228600" algn="l" defTabSz="914400" rtl="0" eaLnBrk="1" latinLnBrk="0" hangingPunct="1">
+                <a:spcBef>
+                  <a:spcPct val="20000"/>
+                </a:spcBef>
+                <a:buFont typeface="Arial" pitchFamily="34" charset="0"/>
+                <a:buChar char="•"/>
+                <a:defRPr sz="2000" kern="1200">
+                  <a:solidFill>
+                    <a:schemeClr val="tx1"/>
+                  </a:solidFill>
+                  <a:latin typeface="+mn-lt"/>
+                  <a:ea typeface="+mn-ea"/>
+                  <a:cs typeface="+mn-cs"/>
+                </a:defRPr>
+              </a:lvl6pPr>
+              <a:lvl7pPr marL="2971800" indent="-228600" algn="l" defTabSz="914400" rtl="0" eaLnBrk="1" latinLnBrk="0" hangingPunct="1">
+                <a:spcBef>
+                  <a:spcPct val="20000"/>
+                </a:spcBef>
+                <a:buFont typeface="Arial" pitchFamily="34" charset="0"/>
+                <a:buChar char="•"/>
+                <a:defRPr sz="2000" kern="1200">
+                  <a:solidFill>
+                    <a:schemeClr val="tx1"/>
+                  </a:solidFill>
+                  <a:latin typeface="+mn-lt"/>
+                  <a:ea typeface="+mn-ea"/>
+                  <a:cs typeface="+mn-cs"/>
+                </a:defRPr>
+              </a:lvl7pPr>
+              <a:lvl8pPr marL="3429000" indent="-228600" algn="l" defTabSz="914400" rtl="0" eaLnBrk="1" latinLnBrk="0" hangingPunct="1">
+                <a:spcBef>
+                  <a:spcPct val="20000"/>
+                </a:spcBef>
+                <a:buFont typeface="Arial" pitchFamily="34" charset="0"/>
+                <a:buChar char="•"/>
+                <a:defRPr sz="2000" kern="1200">
+                  <a:solidFill>
+                    <a:schemeClr val="tx1"/>
+                  </a:solidFill>
+                  <a:latin typeface="+mn-lt"/>
+                  <a:ea typeface="+mn-ea"/>
+                  <a:cs typeface="+mn-cs"/>
+                </a:defRPr>
+              </a:lvl8pPr>
+              <a:lvl9pPr marL="3886200" indent="-228600" algn="l" defTabSz="914400" rtl="0" eaLnBrk="1" latinLnBrk="0" hangingPunct="1">
+                <a:spcBef>
+                  <a:spcPct val="20000"/>
+                </a:spcBef>
+                <a:buFont typeface="Arial" pitchFamily="34" charset="0"/>
+                <a:buChar char="•"/>
+                <a:defRPr sz="2000" kern="1200">
+                  <a:solidFill>
+                    <a:schemeClr val="tx1"/>
+                  </a:solidFill>
+                  <a:latin typeface="+mn-lt"/>
+                  <a:ea typeface="+mn-ea"/>
+                  <a:cs typeface="+mn-cs"/>
+                </a:defRPr>
+              </a:lvl9pPr>
+            </a:lstStyle>
+            <a:p>
+              <a:pPr marL="0" indent="0">
+                <a:buFont typeface="Arial" pitchFamily="34" charset="0"/>
+                <a:buNone/>
+              </a:pPr>
+              <a:r>
+                <a:rPr lang="en-GB" sz="1100" dirty="0" smtClean="0">
+                  <a:latin typeface="Arial" panose="020B0604020202020204" pitchFamily="34" charset="0"/>
+                  <a:cs typeface="Arial" panose="020B0604020202020204" pitchFamily="34" charset="0"/>
+                </a:rPr>
+                <a:t>Clusters</a:t>
+              </a:r>
+              <a:endParaRPr lang="en-US" sz="1100" dirty="0">
+                <a:latin typeface="Arial" panose="020B0604020202020204" pitchFamily="34" charset="0"/>
+                <a:cs typeface="Arial" panose="020B0604020202020204" pitchFamily="34" charset="0"/>
+              </a:endParaRPr>
+            </a:p>
+          </p:txBody>
+        </p:sp>
+        <p:sp>
+          <p:nvSpPr>
+            <p:cNvPr id="41" name="Content Placeholder 2"/>
+            <p:cNvSpPr txBox="1">
+              <a:spLocks/>
+            </p:cNvSpPr>
+            <p:nvPr/>
+          </p:nvSpPr>
+          <p:spPr>
+            <a:xfrm>
+              <a:off x="1143431" y="5128951"/>
+              <a:ext cx="818525" cy="306298"/>
+            </a:xfrm>
+            <a:prstGeom prst="rect">
+              <a:avLst/>
+            </a:prstGeom>
+            <a:noFill/>
+          </p:spPr>
+          <p:txBody>
+            <a:bodyPr anchor="ctr"/>
+            <a:lstStyle>
+              <a:lvl1pPr marL="342900" indent="-342900" algn="l" defTabSz="914400" rtl="0" eaLnBrk="1" latinLnBrk="0" hangingPunct="1">
+                <a:spcBef>
+                  <a:spcPct val="20000"/>
+                </a:spcBef>
+                <a:buFont typeface="Arial" pitchFamily="34" charset="0"/>
+                <a:buChar char="•"/>
+                <a:defRPr sz="3200" kern="1200">
+                  <a:solidFill>
+                    <a:schemeClr val="tx1"/>
+                  </a:solidFill>
+                  <a:latin typeface="+mn-lt"/>
+                  <a:ea typeface="+mn-ea"/>
+                  <a:cs typeface="+mn-cs"/>
+                </a:defRPr>
+              </a:lvl1pPr>
+              <a:lvl2pPr marL="742950" indent="-285750" algn="l" defTabSz="914400" rtl="0" eaLnBrk="1" latinLnBrk="0" hangingPunct="1">
+                <a:spcBef>
+                  <a:spcPct val="20000"/>
+                </a:spcBef>
+                <a:buFont typeface="Arial" pitchFamily="34" charset="0"/>
+                <a:buChar char="–"/>
+                <a:defRPr sz="2800" kern="1200">
+                  <a:solidFill>
+                    <a:schemeClr val="tx1"/>
+                  </a:solidFill>
+                  <a:latin typeface="+mn-lt"/>
+                  <a:ea typeface="+mn-ea"/>
+                  <a:cs typeface="+mn-cs"/>
+                </a:defRPr>
+              </a:lvl2pPr>
+              <a:lvl3pPr marL="1143000" indent="-228600" algn="l" defTabSz="914400" rtl="0" eaLnBrk="1" latinLnBrk="0" hangingPunct="1">
+                <a:spcBef>
+                  <a:spcPct val="20000"/>
+                </a:spcBef>
+                <a:buFont typeface="Arial" pitchFamily="34" charset="0"/>
+                <a:buChar char="•"/>
+                <a:defRPr sz="2400" kern="1200">
+                  <a:solidFill>
+                    <a:schemeClr val="tx1"/>
+                  </a:solidFill>
+                  <a:latin typeface="+mn-lt"/>
+                  <a:ea typeface="+mn-ea"/>
+                  <a:cs typeface="+mn-cs"/>
+                </a:defRPr>
+              </a:lvl3pPr>
+              <a:lvl4pPr marL="1600200" indent="-228600" algn="l" defTabSz="914400" rtl="0" eaLnBrk="1" latinLnBrk="0" hangingPunct="1">
+                <a:spcBef>
+                  <a:spcPct val="20000"/>
+                </a:spcBef>
+                <a:buFont typeface="Arial" pitchFamily="34" charset="0"/>
+                <a:buChar char="–"/>
+                <a:defRPr sz="2000" kern="1200">
+                  <a:solidFill>
+                    <a:schemeClr val="tx1"/>
+                  </a:solidFill>
+                  <a:latin typeface="+mn-lt"/>
+                  <a:ea typeface="+mn-ea"/>
+                  <a:cs typeface="+mn-cs"/>
+                </a:defRPr>
+              </a:lvl4pPr>
+              <a:lvl5pPr marL="2057400" indent="-228600" algn="l" defTabSz="914400" rtl="0" eaLnBrk="1" latinLnBrk="0" hangingPunct="1">
+                <a:spcBef>
+                  <a:spcPct val="20000"/>
+                </a:spcBef>
+                <a:buFont typeface="Arial" pitchFamily="34" charset="0"/>
+                <a:buChar char="»"/>
+                <a:defRPr sz="2000" kern="1200">
+                  <a:solidFill>
+                    <a:schemeClr val="tx1"/>
+                  </a:solidFill>
+                  <a:latin typeface="+mn-lt"/>
+                  <a:ea typeface="+mn-ea"/>
+                  <a:cs typeface="+mn-cs"/>
+                </a:defRPr>
+              </a:lvl5pPr>
+              <a:lvl6pPr marL="2514600" indent="-228600" algn="l" defTabSz="914400" rtl="0" eaLnBrk="1" latinLnBrk="0" hangingPunct="1">
+                <a:spcBef>
+                  <a:spcPct val="20000"/>
+                </a:spcBef>
+                <a:buFont typeface="Arial" pitchFamily="34" charset="0"/>
+                <a:buChar char="•"/>
+                <a:defRPr sz="2000" kern="1200">
+                  <a:solidFill>
+                    <a:schemeClr val="tx1"/>
+                  </a:solidFill>
+                  <a:latin typeface="+mn-lt"/>
+                  <a:ea typeface="+mn-ea"/>
+                  <a:cs typeface="+mn-cs"/>
+                </a:defRPr>
+              </a:lvl6pPr>
+              <a:lvl7pPr marL="2971800" indent="-228600" algn="l" defTabSz="914400" rtl="0" eaLnBrk="1" latinLnBrk="0" hangingPunct="1">
+                <a:spcBef>
+                  <a:spcPct val="20000"/>
+                </a:spcBef>
+                <a:buFont typeface="Arial" pitchFamily="34" charset="0"/>
+                <a:buChar char="•"/>
+                <a:defRPr sz="2000" kern="1200">
+                  <a:solidFill>
+                    <a:schemeClr val="tx1"/>
+                  </a:solidFill>
+                  <a:latin typeface="+mn-lt"/>
+                  <a:ea typeface="+mn-ea"/>
+                  <a:cs typeface="+mn-cs"/>
+                </a:defRPr>
+              </a:lvl7pPr>
+              <a:lvl8pPr marL="3429000" indent="-228600" algn="l" defTabSz="914400" rtl="0" eaLnBrk="1" latinLnBrk="0" hangingPunct="1">
+                <a:spcBef>
+                  <a:spcPct val="20000"/>
+                </a:spcBef>
+                <a:buFont typeface="Arial" pitchFamily="34" charset="0"/>
+                <a:buChar char="•"/>
+                <a:defRPr sz="2000" kern="1200">
+                  <a:solidFill>
+                    <a:schemeClr val="tx1"/>
+                  </a:solidFill>
+                  <a:latin typeface="+mn-lt"/>
+                  <a:ea typeface="+mn-ea"/>
+                  <a:cs typeface="+mn-cs"/>
+                </a:defRPr>
+              </a:lvl8pPr>
+              <a:lvl9pPr marL="3886200" indent="-228600" algn="l" defTabSz="914400" rtl="0" eaLnBrk="1" latinLnBrk="0" hangingPunct="1">
+                <a:spcBef>
+                  <a:spcPct val="20000"/>
+                </a:spcBef>
+                <a:buFont typeface="Arial" pitchFamily="34" charset="0"/>
+                <a:buChar char="•"/>
+                <a:defRPr sz="2000" kern="1200">
+                  <a:solidFill>
+                    <a:schemeClr val="tx1"/>
+                  </a:solidFill>
+                  <a:latin typeface="+mn-lt"/>
+                  <a:ea typeface="+mn-ea"/>
+                  <a:cs typeface="+mn-cs"/>
+                </a:defRPr>
+              </a:lvl9pPr>
+            </a:lstStyle>
+            <a:p>
+              <a:pPr marL="0" indent="0">
+                <a:buFont typeface="Arial" pitchFamily="34" charset="0"/>
+                <a:buNone/>
+              </a:pPr>
+              <a:r>
+                <a:rPr lang="en-GB" sz="1100" dirty="0" smtClean="0">
+                  <a:latin typeface="Arial" panose="020B0604020202020204" pitchFamily="34" charset="0"/>
+                  <a:cs typeface="Arial" panose="020B0604020202020204" pitchFamily="34" charset="0"/>
+                </a:rPr>
+                <a:t>States</a:t>
+              </a:r>
+              <a:endParaRPr lang="en-US" sz="1100" dirty="0">
+                <a:latin typeface="Arial" panose="020B0604020202020204" pitchFamily="34" charset="0"/>
+                <a:cs typeface="Arial" panose="020B0604020202020204" pitchFamily="34" charset="0"/>
+              </a:endParaRPr>
+            </a:p>
+          </p:txBody>
+        </p:sp>
+        <p:cxnSp>
+          <p:nvCxnSpPr>
+            <p:cNvPr id="42" name="Straight Arrow Connector 41"/>
+            <p:cNvCxnSpPr>
+              <a:stCxn id="38" idx="0"/>
+              <a:endCxn id="32" idx="4"/>
+            </p:cNvCxnSpPr>
+            <p:nvPr/>
+          </p:nvCxnSpPr>
+          <p:spPr>
+            <a:xfrm flipH="1" flipV="1">
+              <a:off x="2480832" y="4283072"/>
+              <a:ext cx="400678" cy="772122"/>
+            </a:xfrm>
+            <a:prstGeom prst="straightConnector1">
+              <a:avLst/>
+            </a:prstGeom>
+            <a:ln>
+              <a:solidFill>
+                <a:schemeClr val="tx1"/>
+              </a:solidFill>
+              <a:headEnd type="none" w="sm" len="lg"/>
+              <a:tailEnd type="stealth" w="sm" len="lg"/>
+            </a:ln>
+          </p:spPr>
+          <p:style>
+            <a:lnRef idx="1">
+              <a:schemeClr val="accent1"/>
+            </a:lnRef>
+            <a:fillRef idx="0">
+              <a:schemeClr val="accent1"/>
+            </a:fillRef>
+            <a:effectRef idx="0">
+              <a:schemeClr val="accent1"/>
+            </a:effectRef>
+            <a:fontRef idx="minor">
+              <a:schemeClr val="tx1"/>
+            </a:fontRef>
+          </p:style>
+        </p:cxnSp>
+        <mc:AlternateContent xmlns:mc="http://schemas.openxmlformats.org/markup-compatibility/2006">
+          <mc:Choice xmlns:a14="http://schemas.microsoft.com/office/drawing/2010/main" Requires="a14">
+            <p:sp>
+              <p:nvSpPr>
+                <p:cNvPr id="43" name="Oval 42"/>
+                <p:cNvSpPr/>
+                <p:nvPr/>
+              </p:nvSpPr>
+              <p:spPr>
+                <a:xfrm>
+                  <a:off x="3027766" y="3847096"/>
+                  <a:ext cx="460587" cy="453812"/>
+                </a:xfrm>
+                <a:prstGeom prst="ellipse">
+                  <a:avLst/>
+                </a:prstGeom>
+                <a:solidFill>
+                  <a:srgbClr val="0070C0"/>
+                </a:solidFill>
+                <a:ln>
+                  <a:solidFill>
+                    <a:schemeClr val="tx1"/>
+                  </a:solidFill>
+                </a:ln>
+              </p:spPr>
+              <p:style>
+                <a:lnRef idx="2">
+                  <a:schemeClr val="accent1">
+                    <a:shade val="50000"/>
+                  </a:schemeClr>
+                </a:lnRef>
+                <a:fillRef idx="1">
+                  <a:schemeClr val="accent1"/>
+                </a:fillRef>
+                <a:effectRef idx="0">
+                  <a:schemeClr val="accent1"/>
+                </a:effectRef>
+                <a:fontRef idx="minor">
+                  <a:schemeClr val="lt1"/>
+                </a:fontRef>
+              </p:style>
+              <p:txBody>
+                <a:bodyPr lIns="0" rIns="0" rtlCol="0" anchor="ctr"/>
+                <a:lstStyle/>
+                <a:p>
+                  <a:pPr algn="ctr"/>
+                  <a14:m>
+                    <m:oMathPara xmlns:m="http://schemas.openxmlformats.org/officeDocument/2006/math">
+                      <m:oMathParaPr>
+                        <m:jc m:val="centerGroup"/>
+                      </m:oMathParaPr>
+                      <m:oMath xmlns:m="http://schemas.openxmlformats.org/officeDocument/2006/math">
+                        <m:sSub>
+                          <m:sSubPr>
+                            <m:ctrlPr>
+                              <a:rPr lang="en-GB" sz="1100" b="0" i="1" smtClean="0">
+                                <a:solidFill>
+                                  <a:schemeClr val="tx1"/>
+                                </a:solidFill>
+                                <a:latin typeface="Cambria Math" panose="02040503050406030204" pitchFamily="18" charset="0"/>
+                              </a:rPr>
+                            </m:ctrlPr>
+                          </m:sSubPr>
+                          <m:e>
+                            <m:r>
+                              <a:rPr lang="en-GB" sz="1100" b="0" i="1" smtClean="0">
+                                <a:solidFill>
+                                  <a:schemeClr val="tx1"/>
+                                </a:solidFill>
+                                <a:latin typeface="Cambria Math" panose="02040503050406030204" pitchFamily="18" charset="0"/>
+                              </a:rPr>
+                              <m:t>𝐶</m:t>
+                            </m:r>
+                          </m:e>
+                          <m:sub>
+                            <m:r>
+                              <a:rPr lang="en-GB" sz="1100" b="0" i="1" smtClean="0">
+                                <a:solidFill>
+                                  <a:schemeClr val="tx1"/>
+                                </a:solidFill>
+                                <a:latin typeface="Cambria Math" panose="02040503050406030204" pitchFamily="18" charset="0"/>
+                              </a:rPr>
+                              <m:t>2</m:t>
+                            </m:r>
+                          </m:sub>
+                        </m:sSub>
+                      </m:oMath>
+                    </m:oMathPara>
+                  </a14:m>
+                  <a:endParaRPr lang="en-US" sz="1100" dirty="0">
+                    <a:solidFill>
+                      <a:schemeClr val="tx1"/>
+                    </a:solidFill>
+                  </a:endParaRPr>
+                </a:p>
+              </p:txBody>
+            </p:sp>
+          </mc:Choice>
+          <mc:Fallback>
+            <p:sp>
+              <p:nvSpPr>
+                <p:cNvPr id="43" name="Oval 42"/>
+                <p:cNvSpPr>
+                  <a:spLocks noRot="1" noChangeAspect="1" noMove="1" noResize="1" noEditPoints="1" noAdjustHandles="1" noChangeArrowheads="1" noChangeShapeType="1" noTextEdit="1"/>
+                </p:cNvSpPr>
+                <p:nvPr/>
+              </p:nvSpPr>
+              <p:spPr>
+                <a:xfrm>
+                  <a:off x="3027766" y="3847096"/>
+                  <a:ext cx="460587" cy="453812"/>
+                </a:xfrm>
+                <a:prstGeom prst="ellipse">
+                  <a:avLst/>
+                </a:prstGeom>
+                <a:blipFill>
+                  <a:blip r:embed="rId13"/>
+                  <a:stretch>
+                    <a:fillRect/>
+                  </a:stretch>
+                </a:blipFill>
+                <a:ln>
+                  <a:solidFill>
+                    <a:schemeClr val="tx1"/>
+                  </a:solidFill>
+                </a:ln>
+              </p:spPr>
+              <p:txBody>
+                <a:bodyPr/>
+                <a:lstStyle/>
+                <a:p>
+                  <a:r>
+                    <a:rPr lang="en-US">
+                      <a:noFill/>
+                    </a:rPr>
+                    <a:t> </a:t>
+                  </a:r>
+                </a:p>
+              </p:txBody>
+            </p:sp>
+          </mc:Fallback>
+        </mc:AlternateContent>
+        <mc:AlternateContent xmlns:mc="http://schemas.openxmlformats.org/markup-compatibility/2006">
+          <mc:Choice xmlns:a14="http://schemas.microsoft.com/office/drawing/2010/main" Requires="a14">
+            <p:sp>
+              <p:nvSpPr>
+                <p:cNvPr id="45" name="Oval 44"/>
+                <p:cNvSpPr/>
+                <p:nvPr/>
+              </p:nvSpPr>
+              <p:spPr>
+                <a:xfrm>
+                  <a:off x="4095019" y="3847395"/>
+                  <a:ext cx="460587" cy="453812"/>
+                </a:xfrm>
+                <a:prstGeom prst="ellipse">
+                  <a:avLst/>
+                </a:prstGeom>
+                <a:solidFill>
+                  <a:srgbClr val="00B050"/>
+                </a:solidFill>
+                <a:ln>
+                  <a:solidFill>
+                    <a:schemeClr val="tx1"/>
+                  </a:solidFill>
+                </a:ln>
+              </p:spPr>
+              <p:style>
+                <a:lnRef idx="2">
+                  <a:schemeClr val="accent1">
+                    <a:shade val="50000"/>
+                  </a:schemeClr>
+                </a:lnRef>
+                <a:fillRef idx="1">
+                  <a:schemeClr val="accent1"/>
+                </a:fillRef>
+                <a:effectRef idx="0">
+                  <a:schemeClr val="accent1"/>
+                </a:effectRef>
+                <a:fontRef idx="minor">
+                  <a:schemeClr val="lt1"/>
+                </a:fontRef>
+              </p:style>
+              <p:txBody>
+                <a:bodyPr lIns="0" rIns="0" rtlCol="0" anchor="ctr"/>
+                <a:lstStyle/>
+                <a:p>
+                  <a:pPr algn="ctr"/>
+                  <a14:m>
+                    <m:oMathPara xmlns:m="http://schemas.openxmlformats.org/officeDocument/2006/math">
+                      <m:oMathParaPr>
+                        <m:jc m:val="centerGroup"/>
+                      </m:oMathParaPr>
+                      <m:oMath xmlns:m="http://schemas.openxmlformats.org/officeDocument/2006/math">
+                        <m:sSub>
+                          <m:sSubPr>
+                            <m:ctrlPr>
+                              <a:rPr lang="en-GB" sz="1100" b="0" i="1" smtClean="0">
+                                <a:solidFill>
+                                  <a:schemeClr val="tx1"/>
+                                </a:solidFill>
+                                <a:latin typeface="Cambria Math" panose="02040503050406030204" pitchFamily="18" charset="0"/>
+                              </a:rPr>
+                            </m:ctrlPr>
+                          </m:sSubPr>
+                          <m:e>
+                            <m:r>
+                              <a:rPr lang="en-GB" sz="1100" b="0" i="1" smtClean="0">
+                                <a:solidFill>
+                                  <a:schemeClr val="tx1"/>
+                                </a:solidFill>
+                                <a:latin typeface="Cambria Math" panose="02040503050406030204" pitchFamily="18" charset="0"/>
+                              </a:rPr>
+                              <m:t>𝐶</m:t>
+                            </m:r>
+                          </m:e>
+                          <m:sub>
+                            <m:r>
+                              <a:rPr lang="en-GB" sz="1100" b="0" i="1" smtClean="0">
+                                <a:solidFill>
+                                  <a:schemeClr val="tx1"/>
+                                </a:solidFill>
+                                <a:latin typeface="Cambria Math" panose="02040503050406030204" pitchFamily="18" charset="0"/>
+                              </a:rPr>
+                              <m:t>3</m:t>
+                            </m:r>
+                          </m:sub>
+                        </m:sSub>
+                      </m:oMath>
+                    </m:oMathPara>
+                  </a14:m>
+                  <a:endParaRPr lang="en-US" sz="1100" dirty="0">
+                    <a:solidFill>
+                      <a:schemeClr val="tx1"/>
+                    </a:solidFill>
+                  </a:endParaRPr>
+                </a:p>
+              </p:txBody>
+            </p:sp>
+          </mc:Choice>
+          <mc:Fallback>
+            <p:sp>
+              <p:nvSpPr>
+                <p:cNvPr id="45" name="Oval 44"/>
+                <p:cNvSpPr>
+                  <a:spLocks noRot="1" noChangeAspect="1" noMove="1" noResize="1" noEditPoints="1" noAdjustHandles="1" noChangeArrowheads="1" noChangeShapeType="1" noTextEdit="1"/>
+                </p:cNvSpPr>
+                <p:nvPr/>
+              </p:nvSpPr>
+              <p:spPr>
+                <a:xfrm>
+                  <a:off x="4095019" y="3847395"/>
+                  <a:ext cx="460587" cy="453812"/>
+                </a:xfrm>
+                <a:prstGeom prst="ellipse">
+                  <a:avLst/>
+                </a:prstGeom>
+                <a:blipFill>
+                  <a:blip r:embed="rId14"/>
+                  <a:stretch>
+                    <a:fillRect/>
+                  </a:stretch>
+                </a:blipFill>
+                <a:ln>
+                  <a:solidFill>
+                    <a:schemeClr val="tx1"/>
+                  </a:solidFill>
+                </a:ln>
+              </p:spPr>
+              <p:txBody>
+                <a:bodyPr/>
+                <a:lstStyle/>
+                <a:p>
+                  <a:r>
+                    <a:rPr lang="en-US">
+                      <a:noFill/>
+                    </a:rPr>
+                    <a:t> </a:t>
+                  </a:r>
+                </a:p>
+              </p:txBody>
+            </p:sp>
+          </mc:Fallback>
+        </mc:AlternateContent>
+        <mc:AlternateContent xmlns:mc="http://schemas.openxmlformats.org/markup-compatibility/2006">
+          <mc:Choice xmlns:a14="http://schemas.microsoft.com/office/drawing/2010/main" Requires="a14">
+            <p:sp>
+              <p:nvSpPr>
+                <p:cNvPr id="46" name="Oval 45"/>
+                <p:cNvSpPr/>
+                <p:nvPr/>
+              </p:nvSpPr>
+              <p:spPr>
+                <a:xfrm>
+                  <a:off x="4575847" y="3840706"/>
+                  <a:ext cx="460587" cy="453812"/>
+                </a:xfrm>
+                <a:prstGeom prst="ellipse">
+                  <a:avLst/>
+                </a:prstGeom>
+                <a:solidFill>
+                  <a:schemeClr val="accent4">
+                    <a:lumMod val="75000"/>
+                  </a:schemeClr>
+                </a:solidFill>
+                <a:ln>
+                  <a:solidFill>
+                    <a:schemeClr val="tx1"/>
+                  </a:solidFill>
+                </a:ln>
+              </p:spPr>
+              <p:style>
+                <a:lnRef idx="2">
+                  <a:schemeClr val="accent1">
+                    <a:shade val="50000"/>
+                  </a:schemeClr>
+                </a:lnRef>
+                <a:fillRef idx="1">
+                  <a:schemeClr val="accent1"/>
+                </a:fillRef>
+                <a:effectRef idx="0">
+                  <a:schemeClr val="accent1"/>
+                </a:effectRef>
+                <a:fontRef idx="minor">
+                  <a:schemeClr val="lt1"/>
+                </a:fontRef>
+              </p:style>
+              <p:txBody>
+                <a:bodyPr lIns="0" rIns="0" rtlCol="0" anchor="ctr"/>
+                <a:lstStyle/>
+                <a:p>
+                  <a:pPr algn="ctr"/>
+                  <a14:m>
+                    <m:oMathPara xmlns:m="http://schemas.openxmlformats.org/officeDocument/2006/math">
+                      <m:oMathParaPr>
+                        <m:jc m:val="centerGroup"/>
+                      </m:oMathParaPr>
+                      <m:oMath xmlns:m="http://schemas.openxmlformats.org/officeDocument/2006/math">
+                        <m:sSub>
+                          <m:sSubPr>
+                            <m:ctrlPr>
+                              <a:rPr lang="en-GB" sz="1100" b="0" i="1" smtClean="0">
+                                <a:solidFill>
+                                  <a:schemeClr val="tx1"/>
+                                </a:solidFill>
+                                <a:latin typeface="Cambria Math" panose="02040503050406030204" pitchFamily="18" charset="0"/>
+                              </a:rPr>
+                            </m:ctrlPr>
+                          </m:sSubPr>
+                          <m:e>
+                            <m:r>
+                              <a:rPr lang="en-GB" sz="1100" b="0" i="1" smtClean="0">
+                                <a:solidFill>
+                                  <a:schemeClr val="tx1"/>
+                                </a:solidFill>
+                                <a:latin typeface="Cambria Math" panose="02040503050406030204" pitchFamily="18" charset="0"/>
+                              </a:rPr>
+                              <m:t>𝐶</m:t>
+                            </m:r>
+                          </m:e>
+                          <m:sub>
+                            <m:r>
+                              <a:rPr lang="en-GB" sz="1100" b="0" i="1" smtClean="0">
+                                <a:solidFill>
+                                  <a:schemeClr val="tx1"/>
+                                </a:solidFill>
+                                <a:latin typeface="Cambria Math" panose="02040503050406030204" pitchFamily="18" charset="0"/>
+                              </a:rPr>
+                              <m:t>4</m:t>
+                            </m:r>
+                          </m:sub>
+                        </m:sSub>
+                      </m:oMath>
+                    </m:oMathPara>
+                  </a14:m>
+                  <a:endParaRPr lang="en-US" sz="1100" dirty="0">
+                    <a:solidFill>
+                      <a:schemeClr val="tx1"/>
+                    </a:solidFill>
+                  </a:endParaRPr>
+                </a:p>
+              </p:txBody>
+            </p:sp>
+          </mc:Choice>
+          <mc:Fallback>
+            <p:sp>
+              <p:nvSpPr>
+                <p:cNvPr id="46" name="Oval 45"/>
+                <p:cNvSpPr>
+                  <a:spLocks noRot="1" noChangeAspect="1" noMove="1" noResize="1" noEditPoints="1" noAdjustHandles="1" noChangeArrowheads="1" noChangeShapeType="1" noTextEdit="1"/>
+                </p:cNvSpPr>
+                <p:nvPr/>
+              </p:nvSpPr>
+              <p:spPr>
+                <a:xfrm>
+                  <a:off x="4575847" y="3840706"/>
+                  <a:ext cx="460587" cy="453812"/>
+                </a:xfrm>
+                <a:prstGeom prst="ellipse">
+                  <a:avLst/>
+                </a:prstGeom>
+                <a:blipFill>
+                  <a:blip r:embed="rId15"/>
+                  <a:stretch>
+                    <a:fillRect/>
+                  </a:stretch>
+                </a:blipFill>
+                <a:ln>
+                  <a:solidFill>
+                    <a:schemeClr val="tx1"/>
+                  </a:solidFill>
+                </a:ln>
+              </p:spPr>
+              <p:txBody>
+                <a:bodyPr/>
+                <a:lstStyle/>
+                <a:p>
+                  <a:r>
+                    <a:rPr lang="en-US">
+                      <a:noFill/>
+                    </a:rPr>
+                    <a:t> </a:t>
+                  </a:r>
+                </a:p>
+              </p:txBody>
+            </p:sp>
+          </mc:Fallback>
+        </mc:AlternateContent>
+        <p:cxnSp>
+          <p:nvCxnSpPr>
+            <p:cNvPr id="47" name="Straight Arrow Connector 46"/>
+            <p:cNvCxnSpPr>
+              <a:stCxn id="38" idx="0"/>
+              <a:endCxn id="43" idx="4"/>
+            </p:cNvCxnSpPr>
+            <p:nvPr/>
+          </p:nvCxnSpPr>
+          <p:spPr>
+            <a:xfrm flipV="1">
+              <a:off x="2881510" y="4300908"/>
+              <a:ext cx="376550" cy="754286"/>
+            </a:xfrm>
+            <a:prstGeom prst="straightConnector1">
+              <a:avLst/>
+            </a:prstGeom>
+            <a:ln>
+              <a:solidFill>
+                <a:schemeClr val="tx1"/>
+              </a:solidFill>
+              <a:headEnd type="none" w="sm" len="lg"/>
+              <a:tailEnd type="stealth" w="sm" len="lg"/>
+            </a:ln>
+          </p:spPr>
+          <p:style>
+            <a:lnRef idx="1">
+              <a:schemeClr val="accent1"/>
+            </a:lnRef>
+            <a:fillRef idx="0">
+              <a:schemeClr val="accent1"/>
+            </a:fillRef>
+            <a:effectRef idx="0">
+              <a:schemeClr val="accent1"/>
+            </a:effectRef>
+            <a:fontRef idx="minor">
+              <a:schemeClr val="tx1"/>
+            </a:fontRef>
+          </p:style>
+        </p:cxnSp>
+        <p:cxnSp>
+          <p:nvCxnSpPr>
+            <p:cNvPr id="49" name="Straight Arrow Connector 48"/>
+            <p:cNvCxnSpPr>
+              <a:stCxn id="38" idx="0"/>
+              <a:endCxn id="46" idx="4"/>
+            </p:cNvCxnSpPr>
+            <p:nvPr/>
+          </p:nvCxnSpPr>
+          <p:spPr>
+            <a:xfrm flipV="1">
+              <a:off x="2881510" y="4294518"/>
+              <a:ext cx="1924631" cy="760676"/>
+            </a:xfrm>
+            <a:prstGeom prst="straightConnector1">
+              <a:avLst/>
+            </a:prstGeom>
+            <a:ln>
+              <a:solidFill>
+                <a:schemeClr val="tx1"/>
+              </a:solidFill>
+              <a:headEnd type="none" w="sm" len="lg"/>
+              <a:tailEnd type="stealth" w="sm" len="lg"/>
+            </a:ln>
+          </p:spPr>
+          <p:style>
+            <a:lnRef idx="1">
+              <a:schemeClr val="accent1"/>
+            </a:lnRef>
+            <a:fillRef idx="0">
+              <a:schemeClr val="accent1"/>
+            </a:fillRef>
+            <a:effectRef idx="0">
+              <a:schemeClr val="accent1"/>
+            </a:effectRef>
+            <a:fontRef idx="minor">
+              <a:schemeClr val="tx1"/>
+            </a:fontRef>
+          </p:style>
+        </p:cxnSp>
+        <p:cxnSp>
+          <p:nvCxnSpPr>
+            <p:cNvPr id="50" name="Straight Arrow Connector 49"/>
+            <p:cNvCxnSpPr>
+              <a:stCxn id="33" idx="0"/>
+              <a:endCxn id="32" idx="4"/>
+            </p:cNvCxnSpPr>
+            <p:nvPr/>
+          </p:nvCxnSpPr>
+          <p:spPr>
+            <a:xfrm flipH="1" flipV="1">
+              <a:off x="2480832" y="4283072"/>
+              <a:ext cx="1089526" cy="772122"/>
+            </a:xfrm>
+            <a:prstGeom prst="straightConnector1">
+              <a:avLst/>
+            </a:prstGeom>
+            <a:ln>
+              <a:solidFill>
+                <a:schemeClr val="tx1"/>
+              </a:solidFill>
+              <a:headEnd type="none" w="sm" len="lg"/>
+              <a:tailEnd type="stealth"/>
+            </a:ln>
+          </p:spPr>
+          <p:style>
+            <a:lnRef idx="1">
+              <a:schemeClr val="accent1"/>
+            </a:lnRef>
+            <a:fillRef idx="0">
+              <a:schemeClr val="accent1"/>
+            </a:fillRef>
+            <a:effectRef idx="0">
+              <a:schemeClr val="accent1"/>
+            </a:effectRef>
+            <a:fontRef idx="minor">
+              <a:schemeClr val="tx1"/>
+            </a:fontRef>
+          </p:style>
+        </p:cxnSp>
+        <p:cxnSp>
+          <p:nvCxnSpPr>
+            <p:cNvPr id="52" name="Straight Arrow Connector 51"/>
+            <p:cNvCxnSpPr>
+              <a:stCxn id="33" idx="0"/>
+              <a:endCxn id="43" idx="4"/>
+            </p:cNvCxnSpPr>
+            <p:nvPr/>
+          </p:nvCxnSpPr>
+          <p:spPr>
+            <a:xfrm flipH="1" flipV="1">
+              <a:off x="3258060" y="4300908"/>
+              <a:ext cx="312298" cy="754286"/>
+            </a:xfrm>
+            <a:prstGeom prst="straightConnector1">
+              <a:avLst/>
+            </a:prstGeom>
+            <a:ln>
+              <a:solidFill>
+                <a:schemeClr val="tx1"/>
+              </a:solidFill>
+              <a:headEnd type="none" w="sm" len="lg"/>
+              <a:tailEnd type="stealth" w="sm" len="lg"/>
+            </a:ln>
+          </p:spPr>
+          <p:style>
+            <a:lnRef idx="1">
+              <a:schemeClr val="accent1"/>
+            </a:lnRef>
+            <a:fillRef idx="0">
+              <a:schemeClr val="accent1"/>
+            </a:fillRef>
+            <a:effectRef idx="0">
+              <a:schemeClr val="accent1"/>
+            </a:effectRef>
+            <a:fontRef idx="minor">
+              <a:schemeClr val="tx1"/>
+            </a:fontRef>
+          </p:style>
+        </p:cxnSp>
+        <p:cxnSp>
+          <p:nvCxnSpPr>
+            <p:cNvPr id="53" name="Straight Arrow Connector 52"/>
+            <p:cNvCxnSpPr>
+              <a:stCxn id="33" idx="0"/>
+              <a:endCxn id="45" idx="4"/>
+            </p:cNvCxnSpPr>
+            <p:nvPr/>
+          </p:nvCxnSpPr>
+          <p:spPr>
+            <a:xfrm flipV="1">
+              <a:off x="3570358" y="4301207"/>
+              <a:ext cx="754955" cy="753987"/>
+            </a:xfrm>
+            <a:prstGeom prst="straightConnector1">
+              <a:avLst/>
+            </a:prstGeom>
+            <a:ln>
+              <a:solidFill>
+                <a:schemeClr val="tx1"/>
+              </a:solidFill>
+              <a:headEnd type="none" w="sm" len="lg"/>
+              <a:tailEnd type="stealth" w="sm" len="lg"/>
+            </a:ln>
+          </p:spPr>
+          <p:style>
+            <a:lnRef idx="1">
+              <a:schemeClr val="accent1"/>
+            </a:lnRef>
+            <a:fillRef idx="0">
+              <a:schemeClr val="accent1"/>
+            </a:fillRef>
+            <a:effectRef idx="0">
+              <a:schemeClr val="accent1"/>
+            </a:effectRef>
+            <a:fontRef idx="minor">
+              <a:schemeClr val="tx1"/>
+            </a:fontRef>
+          </p:style>
+        </p:cxnSp>
+        <p:cxnSp>
+          <p:nvCxnSpPr>
+            <p:cNvPr id="56" name="Straight Arrow Connector 55"/>
+            <p:cNvCxnSpPr>
+              <a:stCxn id="36" idx="0"/>
+              <a:endCxn id="32" idx="4"/>
+            </p:cNvCxnSpPr>
+            <p:nvPr/>
+          </p:nvCxnSpPr>
+          <p:spPr>
+            <a:xfrm flipH="1" flipV="1">
+              <a:off x="2480832" y="4283072"/>
+              <a:ext cx="1778374" cy="772122"/>
+            </a:xfrm>
+            <a:prstGeom prst="straightConnector1">
+              <a:avLst/>
+            </a:prstGeom>
+            <a:ln>
+              <a:solidFill>
+                <a:schemeClr val="tx1"/>
+              </a:solidFill>
+              <a:headEnd type="none"/>
+              <a:tailEnd type="stealth" w="sm" len="lg"/>
+            </a:ln>
+          </p:spPr>
+          <p:style>
+            <a:lnRef idx="1">
+              <a:schemeClr val="accent1"/>
+            </a:lnRef>
+            <a:fillRef idx="0">
+              <a:schemeClr val="accent1"/>
+            </a:fillRef>
+            <a:effectRef idx="0">
+              <a:schemeClr val="accent1"/>
+            </a:effectRef>
+            <a:fontRef idx="minor">
+              <a:schemeClr val="tx1"/>
+            </a:fontRef>
+          </p:style>
+        </p:cxnSp>
+        <p:cxnSp>
+          <p:nvCxnSpPr>
+            <p:cNvPr id="59" name="Straight Arrow Connector 58"/>
+            <p:cNvCxnSpPr>
+              <a:stCxn id="36" idx="0"/>
+              <a:endCxn id="46" idx="4"/>
+            </p:cNvCxnSpPr>
+            <p:nvPr/>
+          </p:nvCxnSpPr>
+          <p:spPr>
+            <a:xfrm flipV="1">
+              <a:off x="4259206" y="4294518"/>
+              <a:ext cx="546935" cy="760676"/>
+            </a:xfrm>
+            <a:prstGeom prst="straightConnector1">
+              <a:avLst/>
+            </a:prstGeom>
+            <a:ln>
+              <a:solidFill>
+                <a:schemeClr val="tx1"/>
+              </a:solidFill>
+              <a:headEnd type="none" w="sm" len="lg"/>
+              <a:tailEnd type="stealth" w="sm" len="lg"/>
+            </a:ln>
+          </p:spPr>
+          <p:style>
+            <a:lnRef idx="1">
+              <a:schemeClr val="accent1"/>
+            </a:lnRef>
+            <a:fillRef idx="0">
+              <a:schemeClr val="accent1"/>
+            </a:fillRef>
+            <a:effectRef idx="0">
+              <a:schemeClr val="accent1"/>
+            </a:effectRef>
+            <a:fontRef idx="minor">
+              <a:schemeClr val="tx1"/>
+            </a:fontRef>
+          </p:style>
+        </p:cxnSp>
+        <p:sp>
+          <p:nvSpPr>
+            <p:cNvPr id="60" name="Content Placeholder 2"/>
+            <p:cNvSpPr txBox="1">
+              <a:spLocks/>
+            </p:cNvSpPr>
+            <p:nvPr/>
+          </p:nvSpPr>
+          <p:spPr>
+            <a:xfrm>
+              <a:off x="3912445" y="4477948"/>
+              <a:ext cx="816616" cy="163986"/>
+            </a:xfrm>
+            <a:prstGeom prst="rect">
+              <a:avLst/>
+            </a:prstGeom>
+            <a:solidFill>
+              <a:schemeClr val="bg1"/>
+            </a:solidFill>
+          </p:spPr>
+          <p:txBody>
+            <a:bodyPr anchor="ctr"/>
+            <a:lstStyle>
+              <a:lvl1pPr marL="342900" indent="-342900" algn="l" defTabSz="914400" rtl="0" eaLnBrk="1" latinLnBrk="0" hangingPunct="1">
+                <a:spcBef>
+                  <a:spcPct val="20000"/>
+                </a:spcBef>
+                <a:buFont typeface="Arial" pitchFamily="34" charset="0"/>
+                <a:buChar char="•"/>
+                <a:defRPr sz="3200" kern="1200">
+                  <a:solidFill>
+                    <a:schemeClr val="tx1"/>
+                  </a:solidFill>
+                  <a:latin typeface="+mn-lt"/>
+                  <a:ea typeface="+mn-ea"/>
+                  <a:cs typeface="+mn-cs"/>
+                </a:defRPr>
+              </a:lvl1pPr>
+              <a:lvl2pPr marL="742950" indent="-285750" algn="l" defTabSz="914400" rtl="0" eaLnBrk="1" latinLnBrk="0" hangingPunct="1">
+                <a:spcBef>
+                  <a:spcPct val="20000"/>
+                </a:spcBef>
+                <a:buFont typeface="Arial" pitchFamily="34" charset="0"/>
+                <a:buChar char="–"/>
+                <a:defRPr sz="2800" kern="1200">
+                  <a:solidFill>
+                    <a:schemeClr val="tx1"/>
+                  </a:solidFill>
+                  <a:latin typeface="+mn-lt"/>
+                  <a:ea typeface="+mn-ea"/>
+                  <a:cs typeface="+mn-cs"/>
+                </a:defRPr>
+              </a:lvl2pPr>
+              <a:lvl3pPr marL="1143000" indent="-228600" algn="l" defTabSz="914400" rtl="0" eaLnBrk="1" latinLnBrk="0" hangingPunct="1">
+                <a:spcBef>
+                  <a:spcPct val="20000"/>
+                </a:spcBef>
+                <a:buFont typeface="Arial" pitchFamily="34" charset="0"/>
+                <a:buChar char="•"/>
+                <a:defRPr sz="2400" kern="1200">
+                  <a:solidFill>
+                    <a:schemeClr val="tx1"/>
+                  </a:solidFill>
+                  <a:latin typeface="+mn-lt"/>
+                  <a:ea typeface="+mn-ea"/>
+                  <a:cs typeface="+mn-cs"/>
+                </a:defRPr>
+              </a:lvl3pPr>
+              <a:lvl4pPr marL="1600200" indent="-228600" algn="l" defTabSz="914400" rtl="0" eaLnBrk="1" latinLnBrk="0" hangingPunct="1">
+                <a:spcBef>
+                  <a:spcPct val="20000"/>
+                </a:spcBef>
+                <a:buFont typeface="Arial" pitchFamily="34" charset="0"/>
+                <a:buChar char="–"/>
+                <a:defRPr sz="2000" kern="1200">
+                  <a:solidFill>
+                    <a:schemeClr val="tx1"/>
+                  </a:solidFill>
+                  <a:latin typeface="+mn-lt"/>
+                  <a:ea typeface="+mn-ea"/>
+                  <a:cs typeface="+mn-cs"/>
+                </a:defRPr>
+              </a:lvl4pPr>
+              <a:lvl5pPr marL="2057400" indent="-228600" algn="l" defTabSz="914400" rtl="0" eaLnBrk="1" latinLnBrk="0" hangingPunct="1">
+                <a:spcBef>
+                  <a:spcPct val="20000"/>
+                </a:spcBef>
+                <a:buFont typeface="Arial" pitchFamily="34" charset="0"/>
+                <a:buChar char="»"/>
+                <a:defRPr sz="2000" kern="1200">
+                  <a:solidFill>
+                    <a:schemeClr val="tx1"/>
+                  </a:solidFill>
+                  <a:latin typeface="+mn-lt"/>
+                  <a:ea typeface="+mn-ea"/>
+                  <a:cs typeface="+mn-cs"/>
+                </a:defRPr>
+              </a:lvl5pPr>
+              <a:lvl6pPr marL="2514600" indent="-228600" algn="l" defTabSz="914400" rtl="0" eaLnBrk="1" latinLnBrk="0" hangingPunct="1">
+                <a:spcBef>
+                  <a:spcPct val="20000"/>
+                </a:spcBef>
+                <a:buFont typeface="Arial" pitchFamily="34" charset="0"/>
+                <a:buChar char="•"/>
+                <a:defRPr sz="2000" kern="1200">
+                  <a:solidFill>
+                    <a:schemeClr val="tx1"/>
+                  </a:solidFill>
+                  <a:latin typeface="+mn-lt"/>
+                  <a:ea typeface="+mn-ea"/>
+                  <a:cs typeface="+mn-cs"/>
+                </a:defRPr>
+              </a:lvl6pPr>
+              <a:lvl7pPr marL="2971800" indent="-228600" algn="l" defTabSz="914400" rtl="0" eaLnBrk="1" latinLnBrk="0" hangingPunct="1">
+                <a:spcBef>
+                  <a:spcPct val="20000"/>
+                </a:spcBef>
+                <a:buFont typeface="Arial" pitchFamily="34" charset="0"/>
+                <a:buChar char="•"/>
+                <a:defRPr sz="2000" kern="1200">
+                  <a:solidFill>
+                    <a:schemeClr val="tx1"/>
+                  </a:solidFill>
+                  <a:latin typeface="+mn-lt"/>
+                  <a:ea typeface="+mn-ea"/>
+                  <a:cs typeface="+mn-cs"/>
+                </a:defRPr>
+              </a:lvl7pPr>
+              <a:lvl8pPr marL="3429000" indent="-228600" algn="l" defTabSz="914400" rtl="0" eaLnBrk="1" latinLnBrk="0" hangingPunct="1">
+                <a:spcBef>
+                  <a:spcPct val="20000"/>
+                </a:spcBef>
+                <a:buFont typeface="Arial" pitchFamily="34" charset="0"/>
+                <a:buChar char="•"/>
+                <a:defRPr sz="2000" kern="1200">
+                  <a:solidFill>
+                    <a:schemeClr val="tx1"/>
+                  </a:solidFill>
+                  <a:latin typeface="+mn-lt"/>
+                  <a:ea typeface="+mn-ea"/>
+                  <a:cs typeface="+mn-cs"/>
+                </a:defRPr>
+              </a:lvl8pPr>
+              <a:lvl9pPr marL="3886200" indent="-228600" algn="l" defTabSz="914400" rtl="0" eaLnBrk="1" latinLnBrk="0" hangingPunct="1">
+                <a:spcBef>
+                  <a:spcPct val="20000"/>
+                </a:spcBef>
+                <a:buFont typeface="Arial" pitchFamily="34" charset="0"/>
+                <a:buChar char="•"/>
+                <a:defRPr sz="2000" kern="1200">
+                  <a:solidFill>
+                    <a:schemeClr val="tx1"/>
+                  </a:solidFill>
+                  <a:latin typeface="+mn-lt"/>
+                  <a:ea typeface="+mn-ea"/>
+                  <a:cs typeface="+mn-cs"/>
+                </a:defRPr>
+              </a:lvl9pPr>
+            </a:lstStyle>
+            <a:p>
+              <a:pPr marL="0" indent="0">
+                <a:buFont typeface="Arial" pitchFamily="34" charset="0"/>
+                <a:buNone/>
+              </a:pPr>
+              <a:r>
+                <a:rPr lang="en-GB" sz="1000" dirty="0" smtClean="0">
+                  <a:latin typeface="Arial" panose="020B0604020202020204" pitchFamily="34" charset="0"/>
+                  <a:cs typeface="Arial" panose="020B0604020202020204" pitchFamily="34" charset="0"/>
+                </a:rPr>
+                <a:t>Emission</a:t>
+              </a:r>
+              <a:endParaRPr lang="en-US" sz="1100" dirty="0">
+                <a:latin typeface="Arial" panose="020B0604020202020204" pitchFamily="34" charset="0"/>
+                <a:cs typeface="Arial" panose="020B0604020202020204" pitchFamily="34" charset="0"/>
+              </a:endParaRPr>
+            </a:p>
+          </p:txBody>
+        </p:sp>
+        <p:sp>
+          <p:nvSpPr>
+            <p:cNvPr id="66" name="Freeform 65"/>
+            <p:cNvSpPr/>
+            <p:nvPr/>
+          </p:nvSpPr>
+          <p:spPr>
+            <a:xfrm rot="20525016" flipH="1" flipV="1">
+              <a:off x="3067661" y="5396323"/>
+              <a:ext cx="321533" cy="116996"/>
+            </a:xfrm>
+            <a:custGeom>
+              <a:avLst/>
+              <a:gdLst>
+                <a:gd name="connsiteX0" fmla="*/ 0 w 1341120"/>
+                <a:gd name="connsiteY0" fmla="*/ 151608 h 572232"/>
+                <a:gd name="connsiteX1" fmla="*/ 804672 w 1341120"/>
+                <a:gd name="connsiteY1" fmla="*/ 23592 h 572232"/>
+                <a:gd name="connsiteX2" fmla="*/ 1341120 w 1341120"/>
+                <a:gd name="connsiteY2" fmla="*/ 572232 h 572232"/>
+              </a:gdLst>
+              <a:ahLst/>
+              <a:cxnLst>
+                <a:cxn ang="0">
+                  <a:pos x="connsiteX0" y="connsiteY0"/>
+                </a:cxn>
+                <a:cxn ang="0">
+                  <a:pos x="connsiteX1" y="connsiteY1"/>
+                </a:cxn>
+                <a:cxn ang="0">
+                  <a:pos x="connsiteX2" y="connsiteY2"/>
+                </a:cxn>
+              </a:cxnLst>
+              <a:rect l="l" t="t" r="r" b="b"/>
+              <a:pathLst>
+                <a:path w="1341120" h="572232">
+                  <a:moveTo>
+                    <a:pt x="0" y="151608"/>
+                  </a:moveTo>
+                  <a:cubicBezTo>
+                    <a:pt x="290576" y="52548"/>
+                    <a:pt x="581152" y="-46512"/>
+                    <a:pt x="804672" y="23592"/>
+                  </a:cubicBezTo>
+                  <a:cubicBezTo>
+                    <a:pt x="1028192" y="93696"/>
+                    <a:pt x="1184656" y="332964"/>
+                    <a:pt x="1341120" y="572232"/>
+                  </a:cubicBezTo>
+                </a:path>
+              </a:pathLst>
+            </a:custGeom>
+            <a:noFill/>
+            <a:ln>
+              <a:headEnd type="stealth" w="sm" len="lg"/>
+            </a:ln>
+          </p:spPr>
+          <p:style>
+            <a:lnRef idx="2">
+              <a:schemeClr val="accent1">
+                <a:shade val="50000"/>
+              </a:schemeClr>
+            </a:lnRef>
+            <a:fillRef idx="1">
+              <a:schemeClr val="accent1"/>
+            </a:fillRef>
+            <a:effectRef idx="0">
+              <a:schemeClr val="accent1"/>
+            </a:effectRef>
+            <a:fontRef idx="minor">
+              <a:schemeClr val="lt1"/>
+            </a:fontRef>
+          </p:style>
+          <p:txBody>
+            <a:bodyPr rtlCol="0" anchor="ctr"/>
+            <a:lstStyle/>
+            <a:p>
+              <a:pPr algn="ctr"/>
+              <a:endParaRPr lang="en-US"/>
+            </a:p>
+          </p:txBody>
+        </p:sp>
+        <p:sp>
+          <p:nvSpPr>
+            <p:cNvPr id="67" name="Freeform 66"/>
+            <p:cNvSpPr/>
+            <p:nvPr/>
+          </p:nvSpPr>
+          <p:spPr>
+            <a:xfrm rot="9783246" flipH="1" flipV="1">
+              <a:off x="3061971" y="5054675"/>
+              <a:ext cx="321533" cy="116996"/>
+            </a:xfrm>
+            <a:custGeom>
+              <a:avLst/>
+              <a:gdLst>
+                <a:gd name="connsiteX0" fmla="*/ 0 w 1341120"/>
+                <a:gd name="connsiteY0" fmla="*/ 151608 h 572232"/>
+                <a:gd name="connsiteX1" fmla="*/ 804672 w 1341120"/>
+                <a:gd name="connsiteY1" fmla="*/ 23592 h 572232"/>
+                <a:gd name="connsiteX2" fmla="*/ 1341120 w 1341120"/>
+                <a:gd name="connsiteY2" fmla="*/ 572232 h 572232"/>
+              </a:gdLst>
+              <a:ahLst/>
+              <a:cxnLst>
+                <a:cxn ang="0">
+                  <a:pos x="connsiteX0" y="connsiteY0"/>
+                </a:cxn>
+                <a:cxn ang="0">
+                  <a:pos x="connsiteX1" y="connsiteY1"/>
+                </a:cxn>
+                <a:cxn ang="0">
+                  <a:pos x="connsiteX2" y="connsiteY2"/>
+                </a:cxn>
+              </a:cxnLst>
+              <a:rect l="l" t="t" r="r" b="b"/>
+              <a:pathLst>
+                <a:path w="1341120" h="572232">
+                  <a:moveTo>
+                    <a:pt x="0" y="151608"/>
+                  </a:moveTo>
+                  <a:cubicBezTo>
+                    <a:pt x="290576" y="52548"/>
+                    <a:pt x="581152" y="-46512"/>
+                    <a:pt x="804672" y="23592"/>
+                  </a:cubicBezTo>
+                  <a:cubicBezTo>
+                    <a:pt x="1028192" y="93696"/>
+                    <a:pt x="1184656" y="332964"/>
+                    <a:pt x="1341120" y="572232"/>
+                  </a:cubicBezTo>
+                </a:path>
+              </a:pathLst>
+            </a:custGeom>
+            <a:noFill/>
+            <a:ln>
+              <a:headEnd type="stealth" w="sm" len="lg"/>
+            </a:ln>
+          </p:spPr>
+          <p:style>
+            <a:lnRef idx="2">
+              <a:schemeClr val="accent1">
+                <a:shade val="50000"/>
+              </a:schemeClr>
+            </a:lnRef>
+            <a:fillRef idx="1">
+              <a:schemeClr val="accent1"/>
+            </a:fillRef>
+            <a:effectRef idx="0">
+              <a:schemeClr val="accent1"/>
+            </a:effectRef>
+            <a:fontRef idx="minor">
+              <a:schemeClr val="lt1"/>
+            </a:fontRef>
+          </p:style>
+          <p:txBody>
+            <a:bodyPr rtlCol="0" anchor="ctr"/>
+            <a:lstStyle/>
+            <a:p>
+              <a:pPr algn="ctr"/>
+              <a:endParaRPr lang="en-US"/>
+            </a:p>
+          </p:txBody>
+        </p:sp>
+        <p:sp>
+          <p:nvSpPr>
+            <p:cNvPr id="68" name="Freeform 67"/>
+            <p:cNvSpPr/>
+            <p:nvPr/>
+          </p:nvSpPr>
+          <p:spPr>
+            <a:xfrm rot="20525016" flipH="1" flipV="1">
+              <a:off x="3757061" y="5401988"/>
+              <a:ext cx="321533" cy="116996"/>
+            </a:xfrm>
+            <a:custGeom>
+              <a:avLst/>
+              <a:gdLst>
+                <a:gd name="connsiteX0" fmla="*/ 0 w 1341120"/>
+                <a:gd name="connsiteY0" fmla="*/ 151608 h 572232"/>
+                <a:gd name="connsiteX1" fmla="*/ 804672 w 1341120"/>
+                <a:gd name="connsiteY1" fmla="*/ 23592 h 572232"/>
+                <a:gd name="connsiteX2" fmla="*/ 1341120 w 1341120"/>
+                <a:gd name="connsiteY2" fmla="*/ 572232 h 572232"/>
+              </a:gdLst>
+              <a:ahLst/>
+              <a:cxnLst>
+                <a:cxn ang="0">
+                  <a:pos x="connsiteX0" y="connsiteY0"/>
+                </a:cxn>
+                <a:cxn ang="0">
+                  <a:pos x="connsiteX1" y="connsiteY1"/>
+                </a:cxn>
+                <a:cxn ang="0">
+                  <a:pos x="connsiteX2" y="connsiteY2"/>
+                </a:cxn>
+              </a:cxnLst>
+              <a:rect l="l" t="t" r="r" b="b"/>
+              <a:pathLst>
+                <a:path w="1341120" h="572232">
+                  <a:moveTo>
+                    <a:pt x="0" y="151608"/>
+                  </a:moveTo>
+                  <a:cubicBezTo>
+                    <a:pt x="290576" y="52548"/>
+                    <a:pt x="581152" y="-46512"/>
+                    <a:pt x="804672" y="23592"/>
+                  </a:cubicBezTo>
+                  <a:cubicBezTo>
+                    <a:pt x="1028192" y="93696"/>
+                    <a:pt x="1184656" y="332964"/>
+                    <a:pt x="1341120" y="572232"/>
+                  </a:cubicBezTo>
+                </a:path>
+              </a:pathLst>
+            </a:custGeom>
+            <a:noFill/>
+            <a:ln>
+              <a:headEnd type="stealth" w="sm" len="lg"/>
+            </a:ln>
+          </p:spPr>
+          <p:style>
+            <a:lnRef idx="2">
+              <a:schemeClr val="accent1">
+                <a:shade val="50000"/>
+              </a:schemeClr>
+            </a:lnRef>
+            <a:fillRef idx="1">
+              <a:schemeClr val="accent1"/>
+            </a:fillRef>
+            <a:effectRef idx="0">
+              <a:schemeClr val="accent1"/>
+            </a:effectRef>
+            <a:fontRef idx="minor">
+              <a:schemeClr val="lt1"/>
+            </a:fontRef>
+          </p:style>
+          <p:txBody>
+            <a:bodyPr rtlCol="0" anchor="ctr"/>
+            <a:lstStyle/>
+            <a:p>
+              <a:pPr algn="ctr"/>
+              <a:endParaRPr lang="en-US"/>
+            </a:p>
+          </p:txBody>
+        </p:sp>
+        <p:sp>
+          <p:nvSpPr>
+            <p:cNvPr id="69" name="Arc 68"/>
+            <p:cNvSpPr/>
+            <p:nvPr/>
+          </p:nvSpPr>
+          <p:spPr>
+            <a:xfrm rot="588857">
+              <a:off x="4214414" y="5266487"/>
+              <a:ext cx="483886" cy="485035"/>
+            </a:xfrm>
+            <a:prstGeom prst="arc">
+              <a:avLst>
+                <a:gd name="adj1" fmla="val 16200000"/>
+                <a:gd name="adj2" fmla="val 10185818"/>
+              </a:avLst>
+            </a:prstGeom>
+            <a:noFill/>
+            <a:ln>
+              <a:headEnd type="stealth" w="sm" len="lg"/>
+            </a:ln>
+          </p:spPr>
+          <p:style>
+            <a:lnRef idx="2">
+              <a:schemeClr val="accent1">
+                <a:shade val="50000"/>
+              </a:schemeClr>
+            </a:lnRef>
+            <a:fillRef idx="1">
+              <a:schemeClr val="accent1"/>
+            </a:fillRef>
+            <a:effectRef idx="0">
+              <a:schemeClr val="accent1"/>
+            </a:effectRef>
+            <a:fontRef idx="minor">
+              <a:schemeClr val="lt1"/>
+            </a:fontRef>
+          </p:style>
+          <p:txBody>
+            <a:bodyPr rtlCol="0" anchor="ctr"/>
+            <a:lstStyle/>
+            <a:p>
+              <a:pPr algn="ctr"/>
+              <a:endParaRPr lang="en-US">
+                <a:solidFill>
+                  <a:schemeClr val="lt1"/>
+                </a:solidFill>
+              </a:endParaRPr>
+            </a:p>
+          </p:txBody>
+        </p:sp>
+        <p:sp>
+          <p:nvSpPr>
+            <p:cNvPr id="70" name="Arc 69"/>
+            <p:cNvSpPr/>
+            <p:nvPr/>
+          </p:nvSpPr>
+          <p:spPr>
+            <a:xfrm rot="5129880">
+              <a:off x="2454743" y="5266488"/>
+              <a:ext cx="483886" cy="485035"/>
+            </a:xfrm>
+            <a:prstGeom prst="arc">
+              <a:avLst>
+                <a:gd name="adj1" fmla="val 16200000"/>
+                <a:gd name="adj2" fmla="val 10185818"/>
+              </a:avLst>
+            </a:prstGeom>
+            <a:noFill/>
+            <a:ln>
+              <a:headEnd type="stealth" w="sm" len="lg"/>
+            </a:ln>
+          </p:spPr>
+          <p:style>
+            <a:lnRef idx="2">
+              <a:schemeClr val="accent1">
+                <a:shade val="50000"/>
+              </a:schemeClr>
+            </a:lnRef>
+            <a:fillRef idx="1">
+              <a:schemeClr val="accent1"/>
+            </a:fillRef>
+            <a:effectRef idx="0">
+              <a:schemeClr val="accent1"/>
+            </a:effectRef>
+            <a:fontRef idx="minor">
+              <a:schemeClr val="lt1"/>
+            </a:fontRef>
+          </p:style>
+          <p:txBody>
+            <a:bodyPr rtlCol="0" anchor="ctr"/>
+            <a:lstStyle/>
+            <a:p>
+              <a:pPr algn="ctr"/>
+              <a:endParaRPr lang="en-US">
+                <a:solidFill>
+                  <a:schemeClr val="lt1"/>
+                </a:solidFill>
+              </a:endParaRPr>
+            </a:p>
+          </p:txBody>
+        </p:sp>
+        <p:sp>
+          <p:nvSpPr>
+            <p:cNvPr id="71" name="Freeform 70"/>
+            <p:cNvSpPr/>
+            <p:nvPr/>
+          </p:nvSpPr>
+          <p:spPr>
+            <a:xfrm>
+              <a:off x="2253899" y="4819031"/>
+              <a:ext cx="2663952" cy="334304"/>
+            </a:xfrm>
+            <a:custGeom>
+              <a:avLst/>
+              <a:gdLst>
+                <a:gd name="connsiteX0" fmla="*/ 381076 w 2421092"/>
+                <a:gd name="connsiteY0" fmla="*/ 597432 h 597432"/>
+                <a:gd name="connsiteX1" fmla="*/ 39700 w 2421092"/>
+                <a:gd name="connsiteY1" fmla="*/ 225576 h 597432"/>
+                <a:gd name="connsiteX2" fmla="*/ 1197940 w 2421092"/>
+                <a:gd name="connsiteY2" fmla="*/ 24 h 597432"/>
+                <a:gd name="connsiteX3" fmla="*/ 2386660 w 2421092"/>
+                <a:gd name="connsiteY3" fmla="*/ 213384 h 597432"/>
+                <a:gd name="connsiteX4" fmla="*/ 1984324 w 2421092"/>
+                <a:gd name="connsiteY4" fmla="*/ 554760 h 597432"/>
+              </a:gdLst>
+              <a:ahLst/>
+              <a:cxnLst>
+                <a:cxn ang="0">
+                  <a:pos x="connsiteX0" y="connsiteY0"/>
+                </a:cxn>
+                <a:cxn ang="0">
+                  <a:pos x="connsiteX1" y="connsiteY1"/>
+                </a:cxn>
+                <a:cxn ang="0">
+                  <a:pos x="connsiteX2" y="connsiteY2"/>
+                </a:cxn>
+                <a:cxn ang="0">
+                  <a:pos x="connsiteX3" y="connsiteY3"/>
+                </a:cxn>
+                <a:cxn ang="0">
+                  <a:pos x="connsiteX4" y="connsiteY4"/>
+                </a:cxn>
+              </a:cxnLst>
+              <a:rect l="l" t="t" r="r" b="b"/>
+              <a:pathLst>
+                <a:path w="2421092" h="597432">
+                  <a:moveTo>
+                    <a:pt x="381076" y="597432"/>
+                  </a:moveTo>
+                  <a:cubicBezTo>
+                    <a:pt x="142316" y="461288"/>
+                    <a:pt x="-96444" y="325144"/>
+                    <a:pt x="39700" y="225576"/>
+                  </a:cubicBezTo>
+                  <a:cubicBezTo>
+                    <a:pt x="175844" y="126008"/>
+                    <a:pt x="806780" y="2056"/>
+                    <a:pt x="1197940" y="24"/>
+                  </a:cubicBezTo>
+                  <a:cubicBezTo>
+                    <a:pt x="1589100" y="-2008"/>
+                    <a:pt x="2255596" y="120928"/>
+                    <a:pt x="2386660" y="213384"/>
+                  </a:cubicBezTo>
+                  <a:cubicBezTo>
+                    <a:pt x="2517724" y="305840"/>
+                    <a:pt x="2251024" y="430300"/>
+                    <a:pt x="1984324" y="554760"/>
+                  </a:cubicBezTo>
+                </a:path>
+              </a:pathLst>
+            </a:custGeom>
+            <a:noFill/>
+            <a:ln>
+              <a:tailEnd type="stealth" w="sm" len="lg"/>
+            </a:ln>
+          </p:spPr>
+          <p:style>
+            <a:lnRef idx="2">
+              <a:schemeClr val="accent1">
+                <a:shade val="50000"/>
+              </a:schemeClr>
+            </a:lnRef>
+            <a:fillRef idx="1">
+              <a:schemeClr val="accent1"/>
+            </a:fillRef>
+            <a:effectRef idx="0">
+              <a:schemeClr val="accent1"/>
+            </a:effectRef>
+            <a:fontRef idx="minor">
+              <a:schemeClr val="lt1"/>
+            </a:fontRef>
+          </p:style>
+          <p:txBody>
+            <a:bodyPr rtlCol="0" anchor="ctr"/>
+            <a:lstStyle/>
+            <a:p>
+              <a:pPr algn="ctr"/>
+              <a:endParaRPr lang="en-US"/>
+            </a:p>
+          </p:txBody>
+        </p:sp>
+        <p:sp>
+          <p:nvSpPr>
+            <p:cNvPr id="72" name="Content Placeholder 2"/>
+            <p:cNvSpPr txBox="1">
+              <a:spLocks/>
+            </p:cNvSpPr>
+            <p:nvPr/>
+          </p:nvSpPr>
+          <p:spPr>
+            <a:xfrm>
+              <a:off x="4457708" y="5477946"/>
+              <a:ext cx="816616" cy="163986"/>
+            </a:xfrm>
+            <a:prstGeom prst="rect">
+              <a:avLst/>
+            </a:prstGeom>
+            <a:solidFill>
+              <a:schemeClr val="bg1"/>
+            </a:solidFill>
+          </p:spPr>
+          <p:txBody>
+            <a:bodyPr anchor="ctr"/>
+            <a:lstStyle>
+              <a:lvl1pPr marL="342900" indent="-342900" algn="l" defTabSz="914400" rtl="0" eaLnBrk="1" latinLnBrk="0" hangingPunct="1">
+                <a:spcBef>
+                  <a:spcPct val="20000"/>
+                </a:spcBef>
+                <a:buFont typeface="Arial" pitchFamily="34" charset="0"/>
+                <a:buChar char="•"/>
+                <a:defRPr sz="3200" kern="1200">
+                  <a:solidFill>
+                    <a:schemeClr val="tx1"/>
+                  </a:solidFill>
+                  <a:latin typeface="+mn-lt"/>
+                  <a:ea typeface="+mn-ea"/>
+                  <a:cs typeface="+mn-cs"/>
+                </a:defRPr>
+              </a:lvl1pPr>
+              <a:lvl2pPr marL="742950" indent="-285750" algn="l" defTabSz="914400" rtl="0" eaLnBrk="1" latinLnBrk="0" hangingPunct="1">
+                <a:spcBef>
+                  <a:spcPct val="20000"/>
+                </a:spcBef>
+                <a:buFont typeface="Arial" pitchFamily="34" charset="0"/>
+                <a:buChar char="–"/>
+                <a:defRPr sz="2800" kern="1200">
+                  <a:solidFill>
+                    <a:schemeClr val="tx1"/>
+                  </a:solidFill>
+                  <a:latin typeface="+mn-lt"/>
+                  <a:ea typeface="+mn-ea"/>
+                  <a:cs typeface="+mn-cs"/>
+                </a:defRPr>
+              </a:lvl2pPr>
+              <a:lvl3pPr marL="1143000" indent="-228600" algn="l" defTabSz="914400" rtl="0" eaLnBrk="1" latinLnBrk="0" hangingPunct="1">
+                <a:spcBef>
+                  <a:spcPct val="20000"/>
+                </a:spcBef>
+                <a:buFont typeface="Arial" pitchFamily="34" charset="0"/>
+                <a:buChar char="•"/>
+                <a:defRPr sz="2400" kern="1200">
+                  <a:solidFill>
+                    <a:schemeClr val="tx1"/>
+                  </a:solidFill>
+                  <a:latin typeface="+mn-lt"/>
+                  <a:ea typeface="+mn-ea"/>
+                  <a:cs typeface="+mn-cs"/>
+                </a:defRPr>
+              </a:lvl3pPr>
+              <a:lvl4pPr marL="1600200" indent="-228600" algn="l" defTabSz="914400" rtl="0" eaLnBrk="1" latinLnBrk="0" hangingPunct="1">
+                <a:spcBef>
+                  <a:spcPct val="20000"/>
+                </a:spcBef>
+                <a:buFont typeface="Arial" pitchFamily="34" charset="0"/>
+                <a:buChar char="–"/>
+                <a:defRPr sz="2000" kern="1200">
+                  <a:solidFill>
+                    <a:schemeClr val="tx1"/>
+                  </a:solidFill>
+                  <a:latin typeface="+mn-lt"/>
+                  <a:ea typeface="+mn-ea"/>
+                  <a:cs typeface="+mn-cs"/>
+                </a:defRPr>
+              </a:lvl4pPr>
+              <a:lvl5pPr marL="2057400" indent="-228600" algn="l" defTabSz="914400" rtl="0" eaLnBrk="1" latinLnBrk="0" hangingPunct="1">
+                <a:spcBef>
+                  <a:spcPct val="20000"/>
+                </a:spcBef>
+                <a:buFont typeface="Arial" pitchFamily="34" charset="0"/>
+                <a:buChar char="»"/>
+                <a:defRPr sz="2000" kern="1200">
+                  <a:solidFill>
+                    <a:schemeClr val="tx1"/>
+                  </a:solidFill>
+                  <a:latin typeface="+mn-lt"/>
+                  <a:ea typeface="+mn-ea"/>
+                  <a:cs typeface="+mn-cs"/>
+                </a:defRPr>
+              </a:lvl5pPr>
+              <a:lvl6pPr marL="2514600" indent="-228600" algn="l" defTabSz="914400" rtl="0" eaLnBrk="1" latinLnBrk="0" hangingPunct="1">
+                <a:spcBef>
+                  <a:spcPct val="20000"/>
+                </a:spcBef>
+                <a:buFont typeface="Arial" pitchFamily="34" charset="0"/>
+                <a:buChar char="•"/>
+                <a:defRPr sz="2000" kern="1200">
+                  <a:solidFill>
+                    <a:schemeClr val="tx1"/>
+                  </a:solidFill>
+                  <a:latin typeface="+mn-lt"/>
+                  <a:ea typeface="+mn-ea"/>
+                  <a:cs typeface="+mn-cs"/>
+                </a:defRPr>
+              </a:lvl6pPr>
+              <a:lvl7pPr marL="2971800" indent="-228600" algn="l" defTabSz="914400" rtl="0" eaLnBrk="1" latinLnBrk="0" hangingPunct="1">
+                <a:spcBef>
+                  <a:spcPct val="20000"/>
+                </a:spcBef>
+                <a:buFont typeface="Arial" pitchFamily="34" charset="0"/>
+                <a:buChar char="•"/>
+                <a:defRPr sz="2000" kern="1200">
+                  <a:solidFill>
+                    <a:schemeClr val="tx1"/>
+                  </a:solidFill>
+                  <a:latin typeface="+mn-lt"/>
+                  <a:ea typeface="+mn-ea"/>
+                  <a:cs typeface="+mn-cs"/>
+                </a:defRPr>
+              </a:lvl7pPr>
+              <a:lvl8pPr marL="3429000" indent="-228600" algn="l" defTabSz="914400" rtl="0" eaLnBrk="1" latinLnBrk="0" hangingPunct="1">
+                <a:spcBef>
+                  <a:spcPct val="20000"/>
+                </a:spcBef>
+                <a:buFont typeface="Arial" pitchFamily="34" charset="0"/>
+                <a:buChar char="•"/>
+                <a:defRPr sz="2000" kern="1200">
+                  <a:solidFill>
+                    <a:schemeClr val="tx1"/>
+                  </a:solidFill>
+                  <a:latin typeface="+mn-lt"/>
+                  <a:ea typeface="+mn-ea"/>
+                  <a:cs typeface="+mn-cs"/>
+                </a:defRPr>
+              </a:lvl8pPr>
+              <a:lvl9pPr marL="3886200" indent="-228600" algn="l" defTabSz="914400" rtl="0" eaLnBrk="1" latinLnBrk="0" hangingPunct="1">
+                <a:spcBef>
+                  <a:spcPct val="20000"/>
+                </a:spcBef>
+                <a:buFont typeface="Arial" pitchFamily="34" charset="0"/>
+                <a:buChar char="•"/>
+                <a:defRPr sz="2000" kern="1200">
+                  <a:solidFill>
+                    <a:schemeClr val="tx1"/>
+                  </a:solidFill>
+                  <a:latin typeface="+mn-lt"/>
+                  <a:ea typeface="+mn-ea"/>
+                  <a:cs typeface="+mn-cs"/>
+                </a:defRPr>
+              </a:lvl9pPr>
+            </a:lstStyle>
+            <a:p>
+              <a:pPr marL="0" indent="0">
+                <a:buFont typeface="Arial" pitchFamily="34" charset="0"/>
+                <a:buNone/>
+              </a:pPr>
+              <a:r>
+                <a:rPr lang="en-GB" sz="1000" dirty="0" smtClean="0">
+                  <a:latin typeface="Arial" panose="020B0604020202020204" pitchFamily="34" charset="0"/>
+                  <a:cs typeface="Arial" panose="020B0604020202020204" pitchFamily="34" charset="0"/>
+                </a:rPr>
+                <a:t>Transition</a:t>
+              </a:r>
+              <a:endParaRPr lang="en-US" sz="1000" dirty="0">
+                <a:latin typeface="Arial" panose="020B0604020202020204" pitchFamily="34" charset="0"/>
+                <a:cs typeface="Arial" panose="020B0604020202020204" pitchFamily="34" charset="0"/>
+              </a:endParaRPr>
+            </a:p>
+          </p:txBody>
+        </p:sp>
+        <p:grpSp>
+          <p:nvGrpSpPr>
+            <p:cNvPr id="73" name="Group 72"/>
+            <p:cNvGrpSpPr/>
+            <p:nvPr/>
+          </p:nvGrpSpPr>
+          <p:grpSpPr>
+            <a:xfrm>
+              <a:off x="1726480" y="2925213"/>
+              <a:ext cx="3691859" cy="738077"/>
+              <a:chOff x="1186933" y="2903477"/>
+              <a:chExt cx="7704858" cy="1681934"/>
+            </a:xfrm>
+          </p:grpSpPr>
+          <p:pic>
+            <p:nvPicPr>
+              <p:cNvPr id="74" name="Picture 73"/>
+              <p:cNvPicPr>
+                <a:picLocks noChangeAspect="1"/>
+              </p:cNvPicPr>
+              <p:nvPr/>
+            </p:nvPicPr>
+            <p:blipFill rotWithShape="1">
+              <a:blip r:embed="rId16">
+                <a:extLst>
+                  <a:ext uri="{28A0092B-C50C-407E-A947-70E740481C1C}">
+                    <a14:useLocalDpi xmlns:a14="http://schemas.microsoft.com/office/drawing/2010/main" val="0"/>
+                  </a:ext>
+                </a:extLst>
+              </a:blip>
+              <a:srcRect l="17012" t="28353" r="14941" b="14940"/>
+              <a:stretch/>
+            </p:blipFill>
+            <p:spPr>
+              <a:xfrm>
+                <a:off x="6065319" y="3281073"/>
+                <a:ext cx="1765893" cy="672129"/>
+              </a:xfrm>
+              <a:prstGeom prst="rect">
+                <a:avLst/>
+              </a:prstGeom>
+            </p:spPr>
+          </p:pic>
+          <p:pic>
+            <p:nvPicPr>
+              <p:cNvPr id="75" name="Picture 74"/>
+              <p:cNvPicPr>
+                <a:picLocks noChangeAspect="1"/>
+              </p:cNvPicPr>
+              <p:nvPr/>
+            </p:nvPicPr>
+            <p:blipFill rotWithShape="1">
+              <a:blip r:embed="rId17" cstate="print">
+                <a:extLst>
+                  <a:ext uri="{28A0092B-C50C-407E-A947-70E740481C1C}">
+                    <a14:useLocalDpi xmlns:a14="http://schemas.microsoft.com/office/drawing/2010/main" val="0"/>
+                  </a:ext>
+                </a:extLst>
+              </a:blip>
+              <a:srcRect l="17012" t="28353" r="14941" b="14940"/>
+              <a:stretch/>
+            </p:blipFill>
+            <p:spPr>
+              <a:xfrm>
+                <a:off x="6948267" y="3281071"/>
+                <a:ext cx="882945" cy="672129"/>
+              </a:xfrm>
+              <a:prstGeom prst="rect">
+                <a:avLst/>
+              </a:prstGeom>
+            </p:spPr>
+          </p:pic>
+          <p:pic>
+            <p:nvPicPr>
+              <p:cNvPr id="76" name="Picture 75"/>
+              <p:cNvPicPr>
+                <a:picLocks noChangeAspect="1"/>
+              </p:cNvPicPr>
+              <p:nvPr/>
+            </p:nvPicPr>
+            <p:blipFill>
+              <a:blip r:embed="rId18">
+                <a:extLst>
+                  <a:ext uri="{28A0092B-C50C-407E-A947-70E740481C1C}">
+                    <a14:useLocalDpi xmlns:a14="http://schemas.microsoft.com/office/drawing/2010/main" val="0"/>
+                  </a:ext>
+                </a:extLst>
+              </a:blip>
+              <a:stretch>
+                <a:fillRect/>
+              </a:stretch>
+            </p:blipFill>
+            <p:spPr>
+              <a:xfrm>
+                <a:off x="1186933" y="2903477"/>
+                <a:ext cx="7704858" cy="1681934"/>
+              </a:xfrm>
+              <a:prstGeom prst="rect">
+                <a:avLst/>
+              </a:prstGeom>
+            </p:spPr>
+          </p:pic>
+          <p:sp>
+            <p:nvSpPr>
+              <p:cNvPr id="77" name="Freeform 76"/>
+              <p:cNvSpPr/>
+              <p:nvPr/>
+            </p:nvSpPr>
+            <p:spPr>
+              <a:xfrm>
+                <a:off x="1791479" y="3281688"/>
+                <a:ext cx="1856791" cy="1197004"/>
+              </a:xfrm>
+              <a:custGeom>
+                <a:avLst/>
+                <a:gdLst>
+                  <a:gd name="connsiteX0" fmla="*/ 0 w 1856791"/>
+                  <a:gd name="connsiteY0" fmla="*/ 1197005 h 1197005"/>
+                  <a:gd name="connsiteX1" fmla="*/ 307910 w 1856791"/>
+                  <a:gd name="connsiteY1" fmla="*/ 1085038 h 1197005"/>
+                  <a:gd name="connsiteX2" fmla="*/ 457200 w 1856791"/>
+                  <a:gd name="connsiteY2" fmla="*/ 907756 h 1197005"/>
+                  <a:gd name="connsiteX3" fmla="*/ 587828 w 1856791"/>
+                  <a:gd name="connsiteY3" fmla="*/ 637168 h 1197005"/>
+                  <a:gd name="connsiteX4" fmla="*/ 709126 w 1856791"/>
+                  <a:gd name="connsiteY4" fmla="*/ 357250 h 1197005"/>
+                  <a:gd name="connsiteX5" fmla="*/ 830424 w 1856791"/>
+                  <a:gd name="connsiteY5" fmla="*/ 68001 h 1197005"/>
+                  <a:gd name="connsiteX6" fmla="*/ 914400 w 1856791"/>
+                  <a:gd name="connsiteY6" fmla="*/ 21348 h 1197005"/>
+                  <a:gd name="connsiteX7" fmla="*/ 970383 w 1856791"/>
+                  <a:gd name="connsiteY7" fmla="*/ 2687 h 1197005"/>
+                  <a:gd name="connsiteX8" fmla="*/ 1073020 w 1856791"/>
+                  <a:gd name="connsiteY8" fmla="*/ 77331 h 1197005"/>
+                  <a:gd name="connsiteX9" fmla="*/ 1250302 w 1856791"/>
+                  <a:gd name="connsiteY9" fmla="*/ 431895 h 1197005"/>
+                  <a:gd name="connsiteX10" fmla="*/ 1436914 w 1856791"/>
+                  <a:gd name="connsiteY10" fmla="*/ 833111 h 1197005"/>
+                  <a:gd name="connsiteX11" fmla="*/ 1707502 w 1856791"/>
+                  <a:gd name="connsiteY11" fmla="*/ 1122360 h 1197005"/>
+                  <a:gd name="connsiteX12" fmla="*/ 1856791 w 1856791"/>
+                  <a:gd name="connsiteY12" fmla="*/ 1159682 h 1197005"/>
+                </a:gdLst>
+                <a:ahLst/>
+                <a:cxnLst>
+                  <a:cxn ang="0">
+                    <a:pos x="connsiteX0" y="connsiteY0"/>
+                  </a:cxn>
+                  <a:cxn ang="0">
+                    <a:pos x="connsiteX1" y="connsiteY1"/>
+                  </a:cxn>
+                  <a:cxn ang="0">
+                    <a:pos x="connsiteX2" y="connsiteY2"/>
+                  </a:cxn>
+                  <a:cxn ang="0">
+                    <a:pos x="connsiteX3" y="connsiteY3"/>
+                  </a:cxn>
+                  <a:cxn ang="0">
+                    <a:pos x="connsiteX4" y="connsiteY4"/>
+                  </a:cxn>
+                  <a:cxn ang="0">
+                    <a:pos x="connsiteX5" y="connsiteY5"/>
+                  </a:cxn>
+                  <a:cxn ang="0">
+                    <a:pos x="connsiteX6" y="connsiteY6"/>
+                  </a:cxn>
+                  <a:cxn ang="0">
+                    <a:pos x="connsiteX7" y="connsiteY7"/>
+                  </a:cxn>
+                  <a:cxn ang="0">
+                    <a:pos x="connsiteX8" y="connsiteY8"/>
+                  </a:cxn>
+                  <a:cxn ang="0">
+                    <a:pos x="connsiteX9" y="connsiteY9"/>
+                  </a:cxn>
+                  <a:cxn ang="0">
+                    <a:pos x="connsiteX10" y="connsiteY10"/>
+                  </a:cxn>
+                  <a:cxn ang="0">
+                    <a:pos x="connsiteX11" y="connsiteY11"/>
+                  </a:cxn>
+                  <a:cxn ang="0">
+                    <a:pos x="connsiteX12" y="connsiteY12"/>
+                  </a:cxn>
+                </a:cxnLst>
+                <a:rect l="l" t="t" r="r" b="b"/>
+                <a:pathLst>
+                  <a:path w="1856791" h="1197005">
+                    <a:moveTo>
+                      <a:pt x="0" y="1197005"/>
+                    </a:moveTo>
+                    <a:cubicBezTo>
+                      <a:pt x="115855" y="1165125"/>
+                      <a:pt x="231710" y="1133246"/>
+                      <a:pt x="307910" y="1085038"/>
+                    </a:cubicBezTo>
+                    <a:cubicBezTo>
+                      <a:pt x="384110" y="1036830"/>
+                      <a:pt x="410547" y="982401"/>
+                      <a:pt x="457200" y="907756"/>
+                    </a:cubicBezTo>
+                    <a:cubicBezTo>
+                      <a:pt x="503853" y="833111"/>
+                      <a:pt x="545840" y="728919"/>
+                      <a:pt x="587828" y="637168"/>
+                    </a:cubicBezTo>
+                    <a:cubicBezTo>
+                      <a:pt x="629816" y="545417"/>
+                      <a:pt x="668693" y="452111"/>
+                      <a:pt x="709126" y="357250"/>
+                    </a:cubicBezTo>
+                    <a:cubicBezTo>
+                      <a:pt x="749559" y="262389"/>
+                      <a:pt x="796212" y="123985"/>
+                      <a:pt x="830424" y="68001"/>
+                    </a:cubicBezTo>
+                    <a:cubicBezTo>
+                      <a:pt x="864636" y="12017"/>
+                      <a:pt x="891074" y="32234"/>
+                      <a:pt x="914400" y="21348"/>
+                    </a:cubicBezTo>
+                    <a:cubicBezTo>
+                      <a:pt x="937726" y="10462"/>
+                      <a:pt x="943946" y="-6643"/>
+                      <a:pt x="970383" y="2687"/>
+                    </a:cubicBezTo>
+                    <a:cubicBezTo>
+                      <a:pt x="996820" y="12017"/>
+                      <a:pt x="1026367" y="5796"/>
+                      <a:pt x="1073020" y="77331"/>
+                    </a:cubicBezTo>
+                    <a:cubicBezTo>
+                      <a:pt x="1119673" y="148866"/>
+                      <a:pt x="1189653" y="305932"/>
+                      <a:pt x="1250302" y="431895"/>
+                    </a:cubicBezTo>
+                    <a:cubicBezTo>
+                      <a:pt x="1310951" y="557858"/>
+                      <a:pt x="1360714" y="718034"/>
+                      <a:pt x="1436914" y="833111"/>
+                    </a:cubicBezTo>
+                    <a:cubicBezTo>
+                      <a:pt x="1513114" y="948188"/>
+                      <a:pt x="1637523" y="1067931"/>
+                      <a:pt x="1707502" y="1122360"/>
+                    </a:cubicBezTo>
+                    <a:cubicBezTo>
+                      <a:pt x="1777482" y="1176788"/>
+                      <a:pt x="1817136" y="1168235"/>
+                      <a:pt x="1856791" y="1159682"/>
+                    </a:cubicBezTo>
+                  </a:path>
+                </a:pathLst>
+              </a:custGeom>
+              <a:noFill/>
+              <a:ln>
+                <a:solidFill>
+                  <a:schemeClr val="tx1"/>
+                </a:solidFill>
+                <a:prstDash val="sysDot"/>
+              </a:ln>
+            </p:spPr>
+            <p:style>
+              <a:lnRef idx="2">
+                <a:schemeClr val="accent1">
+                  <a:shade val="50000"/>
+                </a:schemeClr>
+              </a:lnRef>
+              <a:fillRef idx="1">
+                <a:schemeClr val="accent1"/>
+              </a:fillRef>
+              <a:effectRef idx="0">
+                <a:schemeClr val="accent1"/>
+              </a:effectRef>
+              <a:fontRef idx="minor">
+                <a:schemeClr val="lt1"/>
+              </a:fontRef>
+            </p:style>
+            <p:txBody>
+              <a:bodyPr rtlCol="0" anchor="ctr"/>
+              <a:lstStyle/>
+              <a:p>
+                <a:pPr algn="ctr"/>
+                <a:endParaRPr lang="en-US"/>
+              </a:p>
+            </p:txBody>
+          </p:sp>
+          <p:sp>
+            <p:nvSpPr>
+              <p:cNvPr id="78" name="Freeform 77"/>
+              <p:cNvSpPr/>
+              <p:nvPr/>
+            </p:nvSpPr>
+            <p:spPr>
+              <a:xfrm>
+                <a:off x="2476977" y="3584774"/>
+                <a:ext cx="3653064" cy="902653"/>
+              </a:xfrm>
+              <a:custGeom>
+                <a:avLst/>
+                <a:gdLst>
+                  <a:gd name="connsiteX0" fmla="*/ 0 w 1856791"/>
+                  <a:gd name="connsiteY0" fmla="*/ 1197005 h 1197005"/>
+                  <a:gd name="connsiteX1" fmla="*/ 307910 w 1856791"/>
+                  <a:gd name="connsiteY1" fmla="*/ 1085038 h 1197005"/>
+                  <a:gd name="connsiteX2" fmla="*/ 457200 w 1856791"/>
+                  <a:gd name="connsiteY2" fmla="*/ 907756 h 1197005"/>
+                  <a:gd name="connsiteX3" fmla="*/ 587828 w 1856791"/>
+                  <a:gd name="connsiteY3" fmla="*/ 637168 h 1197005"/>
+                  <a:gd name="connsiteX4" fmla="*/ 709126 w 1856791"/>
+                  <a:gd name="connsiteY4" fmla="*/ 357250 h 1197005"/>
+                  <a:gd name="connsiteX5" fmla="*/ 830424 w 1856791"/>
+                  <a:gd name="connsiteY5" fmla="*/ 68001 h 1197005"/>
+                  <a:gd name="connsiteX6" fmla="*/ 914400 w 1856791"/>
+                  <a:gd name="connsiteY6" fmla="*/ 21348 h 1197005"/>
+                  <a:gd name="connsiteX7" fmla="*/ 970383 w 1856791"/>
+                  <a:gd name="connsiteY7" fmla="*/ 2687 h 1197005"/>
+                  <a:gd name="connsiteX8" fmla="*/ 1073020 w 1856791"/>
+                  <a:gd name="connsiteY8" fmla="*/ 77331 h 1197005"/>
+                  <a:gd name="connsiteX9" fmla="*/ 1250302 w 1856791"/>
+                  <a:gd name="connsiteY9" fmla="*/ 431895 h 1197005"/>
+                  <a:gd name="connsiteX10" fmla="*/ 1436914 w 1856791"/>
+                  <a:gd name="connsiteY10" fmla="*/ 833111 h 1197005"/>
+                  <a:gd name="connsiteX11" fmla="*/ 1707502 w 1856791"/>
+                  <a:gd name="connsiteY11" fmla="*/ 1122360 h 1197005"/>
+                  <a:gd name="connsiteX12" fmla="*/ 1856791 w 1856791"/>
+                  <a:gd name="connsiteY12" fmla="*/ 1159682 h 1197005"/>
+                </a:gdLst>
+                <a:ahLst/>
+                <a:cxnLst>
+                  <a:cxn ang="0">
+                    <a:pos x="connsiteX0" y="connsiteY0"/>
+                  </a:cxn>
+                  <a:cxn ang="0">
+                    <a:pos x="connsiteX1" y="connsiteY1"/>
+                  </a:cxn>
+                  <a:cxn ang="0">
+                    <a:pos x="connsiteX2" y="connsiteY2"/>
+                  </a:cxn>
+                  <a:cxn ang="0">
+                    <a:pos x="connsiteX3" y="connsiteY3"/>
+                  </a:cxn>
+                  <a:cxn ang="0">
+                    <a:pos x="connsiteX4" y="connsiteY4"/>
+                  </a:cxn>
+                  <a:cxn ang="0">
+                    <a:pos x="connsiteX5" y="connsiteY5"/>
+                  </a:cxn>
+                  <a:cxn ang="0">
+                    <a:pos x="connsiteX6" y="connsiteY6"/>
+                  </a:cxn>
+                  <a:cxn ang="0">
+                    <a:pos x="connsiteX7" y="connsiteY7"/>
+                  </a:cxn>
+                  <a:cxn ang="0">
+                    <a:pos x="connsiteX8" y="connsiteY8"/>
+                  </a:cxn>
+                  <a:cxn ang="0">
+                    <a:pos x="connsiteX9" y="connsiteY9"/>
+                  </a:cxn>
+                  <a:cxn ang="0">
+                    <a:pos x="connsiteX10" y="connsiteY10"/>
+                  </a:cxn>
+                  <a:cxn ang="0">
+                    <a:pos x="connsiteX11" y="connsiteY11"/>
+                  </a:cxn>
+                  <a:cxn ang="0">
+                    <a:pos x="connsiteX12" y="connsiteY12"/>
+                  </a:cxn>
+                </a:cxnLst>
+                <a:rect l="l" t="t" r="r" b="b"/>
+                <a:pathLst>
+                  <a:path w="1856791" h="1197005">
+                    <a:moveTo>
+                      <a:pt x="0" y="1197005"/>
+                    </a:moveTo>
+                    <a:cubicBezTo>
+                      <a:pt x="115855" y="1165125"/>
+                      <a:pt x="231710" y="1133246"/>
+                      <a:pt x="307910" y="1085038"/>
+                    </a:cubicBezTo>
+                    <a:cubicBezTo>
+                      <a:pt x="384110" y="1036830"/>
+                      <a:pt x="410547" y="982401"/>
+                      <a:pt x="457200" y="907756"/>
+                    </a:cubicBezTo>
+                    <a:cubicBezTo>
+                      <a:pt x="503853" y="833111"/>
+                      <a:pt x="545840" y="728919"/>
+                      <a:pt x="587828" y="637168"/>
+                    </a:cubicBezTo>
+                    <a:cubicBezTo>
+                      <a:pt x="629816" y="545417"/>
+                      <a:pt x="668693" y="452111"/>
+                      <a:pt x="709126" y="357250"/>
+                    </a:cubicBezTo>
+                    <a:cubicBezTo>
+                      <a:pt x="749559" y="262389"/>
+                      <a:pt x="796212" y="123985"/>
+                      <a:pt x="830424" y="68001"/>
+                    </a:cubicBezTo>
+                    <a:cubicBezTo>
+                      <a:pt x="864636" y="12017"/>
+                      <a:pt x="891074" y="32234"/>
+                      <a:pt x="914400" y="21348"/>
+                    </a:cubicBezTo>
+                    <a:cubicBezTo>
+                      <a:pt x="937726" y="10462"/>
+                      <a:pt x="943946" y="-6643"/>
+                      <a:pt x="970383" y="2687"/>
+                    </a:cubicBezTo>
+                    <a:cubicBezTo>
+                      <a:pt x="996820" y="12017"/>
+                      <a:pt x="1026367" y="5796"/>
+                      <a:pt x="1073020" y="77331"/>
+                    </a:cubicBezTo>
+                    <a:cubicBezTo>
+                      <a:pt x="1119673" y="148866"/>
+                      <a:pt x="1189653" y="305932"/>
+                      <a:pt x="1250302" y="431895"/>
+                    </a:cubicBezTo>
+                    <a:cubicBezTo>
+                      <a:pt x="1310951" y="557858"/>
+                      <a:pt x="1360714" y="718034"/>
+                      <a:pt x="1436914" y="833111"/>
+                    </a:cubicBezTo>
+                    <a:cubicBezTo>
+                      <a:pt x="1513114" y="948188"/>
+                      <a:pt x="1637523" y="1067931"/>
+                      <a:pt x="1707502" y="1122360"/>
+                    </a:cubicBezTo>
+                    <a:cubicBezTo>
+                      <a:pt x="1777482" y="1176788"/>
+                      <a:pt x="1817136" y="1168235"/>
+                      <a:pt x="1856791" y="1159682"/>
+                    </a:cubicBezTo>
+                  </a:path>
+                </a:pathLst>
+              </a:custGeom>
+              <a:noFill/>
+              <a:ln>
+                <a:solidFill>
+                  <a:schemeClr val="tx1"/>
+                </a:solidFill>
+                <a:prstDash val="sysDot"/>
+              </a:ln>
+            </p:spPr>
+            <p:style>
+              <a:lnRef idx="2">
+                <a:schemeClr val="accent1">
+                  <a:shade val="50000"/>
+                </a:schemeClr>
+              </a:lnRef>
+              <a:fillRef idx="1">
+                <a:schemeClr val="accent1"/>
+              </a:fillRef>
+              <a:effectRef idx="0">
+                <a:schemeClr val="accent1"/>
+              </a:effectRef>
+              <a:fontRef idx="minor">
+                <a:schemeClr val="lt1"/>
+              </a:fontRef>
+            </p:style>
+            <p:txBody>
+              <a:bodyPr rtlCol="0" anchor="ctr"/>
+              <a:lstStyle/>
+              <a:p>
+                <a:pPr algn="ctr"/>
+                <a:endParaRPr lang="en-US"/>
+              </a:p>
+            </p:txBody>
+          </p:sp>
+          <p:sp>
+            <p:nvSpPr>
+              <p:cNvPr id="79" name="Freeform 78"/>
+              <p:cNvSpPr/>
+              <p:nvPr/>
+            </p:nvSpPr>
+            <p:spPr>
+              <a:xfrm>
+                <a:off x="4674666" y="3652413"/>
+                <a:ext cx="3653064" cy="813684"/>
+              </a:xfrm>
+              <a:custGeom>
+                <a:avLst/>
+                <a:gdLst>
+                  <a:gd name="connsiteX0" fmla="*/ 0 w 1856791"/>
+                  <a:gd name="connsiteY0" fmla="*/ 1197005 h 1197005"/>
+                  <a:gd name="connsiteX1" fmla="*/ 307910 w 1856791"/>
+                  <a:gd name="connsiteY1" fmla="*/ 1085038 h 1197005"/>
+                  <a:gd name="connsiteX2" fmla="*/ 457200 w 1856791"/>
+                  <a:gd name="connsiteY2" fmla="*/ 907756 h 1197005"/>
+                  <a:gd name="connsiteX3" fmla="*/ 587828 w 1856791"/>
+                  <a:gd name="connsiteY3" fmla="*/ 637168 h 1197005"/>
+                  <a:gd name="connsiteX4" fmla="*/ 709126 w 1856791"/>
+                  <a:gd name="connsiteY4" fmla="*/ 357250 h 1197005"/>
+                  <a:gd name="connsiteX5" fmla="*/ 830424 w 1856791"/>
+                  <a:gd name="connsiteY5" fmla="*/ 68001 h 1197005"/>
+                  <a:gd name="connsiteX6" fmla="*/ 914400 w 1856791"/>
+                  <a:gd name="connsiteY6" fmla="*/ 21348 h 1197005"/>
+                  <a:gd name="connsiteX7" fmla="*/ 970383 w 1856791"/>
+                  <a:gd name="connsiteY7" fmla="*/ 2687 h 1197005"/>
+                  <a:gd name="connsiteX8" fmla="*/ 1073020 w 1856791"/>
+                  <a:gd name="connsiteY8" fmla="*/ 77331 h 1197005"/>
+                  <a:gd name="connsiteX9" fmla="*/ 1250302 w 1856791"/>
+                  <a:gd name="connsiteY9" fmla="*/ 431895 h 1197005"/>
+                  <a:gd name="connsiteX10" fmla="*/ 1436914 w 1856791"/>
+                  <a:gd name="connsiteY10" fmla="*/ 833111 h 1197005"/>
+                  <a:gd name="connsiteX11" fmla="*/ 1707502 w 1856791"/>
+                  <a:gd name="connsiteY11" fmla="*/ 1122360 h 1197005"/>
+                  <a:gd name="connsiteX12" fmla="*/ 1856791 w 1856791"/>
+                  <a:gd name="connsiteY12" fmla="*/ 1159682 h 1197005"/>
+                </a:gdLst>
+                <a:ahLst/>
+                <a:cxnLst>
+                  <a:cxn ang="0">
+                    <a:pos x="connsiteX0" y="connsiteY0"/>
+                  </a:cxn>
+                  <a:cxn ang="0">
+                    <a:pos x="connsiteX1" y="connsiteY1"/>
+                  </a:cxn>
+                  <a:cxn ang="0">
+                    <a:pos x="connsiteX2" y="connsiteY2"/>
+                  </a:cxn>
+                  <a:cxn ang="0">
+                    <a:pos x="connsiteX3" y="connsiteY3"/>
+                  </a:cxn>
+                  <a:cxn ang="0">
+                    <a:pos x="connsiteX4" y="connsiteY4"/>
+                  </a:cxn>
+                  <a:cxn ang="0">
+                    <a:pos x="connsiteX5" y="connsiteY5"/>
+                  </a:cxn>
+                  <a:cxn ang="0">
+                    <a:pos x="connsiteX6" y="connsiteY6"/>
+                  </a:cxn>
+                  <a:cxn ang="0">
+                    <a:pos x="connsiteX7" y="connsiteY7"/>
+                  </a:cxn>
+                  <a:cxn ang="0">
+                    <a:pos x="connsiteX8" y="connsiteY8"/>
+                  </a:cxn>
+                  <a:cxn ang="0">
+                    <a:pos x="connsiteX9" y="connsiteY9"/>
+                  </a:cxn>
+                  <a:cxn ang="0">
+                    <a:pos x="connsiteX10" y="connsiteY10"/>
+                  </a:cxn>
+                  <a:cxn ang="0">
+                    <a:pos x="connsiteX11" y="connsiteY11"/>
+                  </a:cxn>
+                  <a:cxn ang="0">
+                    <a:pos x="connsiteX12" y="connsiteY12"/>
+                  </a:cxn>
+                </a:cxnLst>
+                <a:rect l="l" t="t" r="r" b="b"/>
+                <a:pathLst>
+                  <a:path w="1856791" h="1197005">
+                    <a:moveTo>
+                      <a:pt x="0" y="1197005"/>
+                    </a:moveTo>
+                    <a:cubicBezTo>
+                      <a:pt x="115855" y="1165125"/>
+                      <a:pt x="231710" y="1133246"/>
+                      <a:pt x="307910" y="1085038"/>
+                    </a:cubicBezTo>
+                    <a:cubicBezTo>
+                      <a:pt x="384110" y="1036830"/>
+                      <a:pt x="410547" y="982401"/>
+                      <a:pt x="457200" y="907756"/>
+                    </a:cubicBezTo>
+                    <a:cubicBezTo>
+                      <a:pt x="503853" y="833111"/>
+                      <a:pt x="545840" y="728919"/>
+                      <a:pt x="587828" y="637168"/>
+                    </a:cubicBezTo>
+                    <a:cubicBezTo>
+                      <a:pt x="629816" y="545417"/>
+                      <a:pt x="668693" y="452111"/>
+                      <a:pt x="709126" y="357250"/>
+                    </a:cubicBezTo>
+                    <a:cubicBezTo>
+                      <a:pt x="749559" y="262389"/>
+                      <a:pt x="796212" y="123985"/>
+                      <a:pt x="830424" y="68001"/>
+                    </a:cubicBezTo>
+                    <a:cubicBezTo>
+                      <a:pt x="864636" y="12017"/>
+                      <a:pt x="891074" y="32234"/>
+                      <a:pt x="914400" y="21348"/>
+                    </a:cubicBezTo>
+                    <a:cubicBezTo>
+                      <a:pt x="937726" y="10462"/>
+                      <a:pt x="943946" y="-6643"/>
+                      <a:pt x="970383" y="2687"/>
+                    </a:cubicBezTo>
+                    <a:cubicBezTo>
+                      <a:pt x="996820" y="12017"/>
+                      <a:pt x="1026367" y="5796"/>
+                      <a:pt x="1073020" y="77331"/>
+                    </a:cubicBezTo>
+                    <a:cubicBezTo>
+                      <a:pt x="1119673" y="148866"/>
+                      <a:pt x="1189653" y="305932"/>
+                      <a:pt x="1250302" y="431895"/>
+                    </a:cubicBezTo>
+                    <a:cubicBezTo>
+                      <a:pt x="1310951" y="557858"/>
+                      <a:pt x="1360714" y="718034"/>
+                      <a:pt x="1436914" y="833111"/>
+                    </a:cubicBezTo>
+                    <a:cubicBezTo>
+                      <a:pt x="1513114" y="948188"/>
+                      <a:pt x="1637523" y="1067931"/>
+                      <a:pt x="1707502" y="1122360"/>
+                    </a:cubicBezTo>
+                    <a:cubicBezTo>
+                      <a:pt x="1777482" y="1176788"/>
+                      <a:pt x="1817136" y="1168235"/>
+                      <a:pt x="1856791" y="1159682"/>
+                    </a:cubicBezTo>
+                  </a:path>
+                </a:pathLst>
+              </a:custGeom>
+              <a:noFill/>
+              <a:ln>
+                <a:solidFill>
+                  <a:schemeClr val="tx1"/>
+                </a:solidFill>
+                <a:prstDash val="sysDot"/>
+              </a:ln>
+            </p:spPr>
+            <p:style>
+              <a:lnRef idx="2">
+                <a:schemeClr val="accent1">
+                  <a:shade val="50000"/>
+                </a:schemeClr>
+              </a:lnRef>
+              <a:fillRef idx="1">
+                <a:schemeClr val="accent1"/>
+              </a:fillRef>
+              <a:effectRef idx="0">
+                <a:schemeClr val="accent1"/>
+              </a:effectRef>
+              <a:fontRef idx="minor">
+                <a:schemeClr val="lt1"/>
+              </a:fontRef>
+            </p:style>
+            <p:txBody>
+              <a:bodyPr rtlCol="0" anchor="ctr"/>
+              <a:lstStyle/>
+              <a:p>
+                <a:pPr algn="ctr"/>
+                <a:endParaRPr lang="en-US"/>
+              </a:p>
+            </p:txBody>
+          </p:sp>
+          <p:sp>
+            <p:nvSpPr>
+              <p:cNvPr id="80" name="Freeform 79"/>
+              <p:cNvSpPr/>
+              <p:nvPr/>
+            </p:nvSpPr>
+            <p:spPr>
+              <a:xfrm>
+                <a:off x="6884902" y="3820701"/>
+                <a:ext cx="1389269" cy="645394"/>
+              </a:xfrm>
+              <a:custGeom>
+                <a:avLst/>
+                <a:gdLst>
+                  <a:gd name="connsiteX0" fmla="*/ 0 w 1856791"/>
+                  <a:gd name="connsiteY0" fmla="*/ 1197005 h 1197005"/>
+                  <a:gd name="connsiteX1" fmla="*/ 307910 w 1856791"/>
+                  <a:gd name="connsiteY1" fmla="*/ 1085038 h 1197005"/>
+                  <a:gd name="connsiteX2" fmla="*/ 457200 w 1856791"/>
+                  <a:gd name="connsiteY2" fmla="*/ 907756 h 1197005"/>
+                  <a:gd name="connsiteX3" fmla="*/ 587828 w 1856791"/>
+                  <a:gd name="connsiteY3" fmla="*/ 637168 h 1197005"/>
+                  <a:gd name="connsiteX4" fmla="*/ 709126 w 1856791"/>
+                  <a:gd name="connsiteY4" fmla="*/ 357250 h 1197005"/>
+                  <a:gd name="connsiteX5" fmla="*/ 830424 w 1856791"/>
+                  <a:gd name="connsiteY5" fmla="*/ 68001 h 1197005"/>
+                  <a:gd name="connsiteX6" fmla="*/ 914400 w 1856791"/>
+                  <a:gd name="connsiteY6" fmla="*/ 21348 h 1197005"/>
+                  <a:gd name="connsiteX7" fmla="*/ 970383 w 1856791"/>
+                  <a:gd name="connsiteY7" fmla="*/ 2687 h 1197005"/>
+                  <a:gd name="connsiteX8" fmla="*/ 1073020 w 1856791"/>
+                  <a:gd name="connsiteY8" fmla="*/ 77331 h 1197005"/>
+                  <a:gd name="connsiteX9" fmla="*/ 1250302 w 1856791"/>
+                  <a:gd name="connsiteY9" fmla="*/ 431895 h 1197005"/>
+                  <a:gd name="connsiteX10" fmla="*/ 1436914 w 1856791"/>
+                  <a:gd name="connsiteY10" fmla="*/ 833111 h 1197005"/>
+                  <a:gd name="connsiteX11" fmla="*/ 1707502 w 1856791"/>
+                  <a:gd name="connsiteY11" fmla="*/ 1122360 h 1197005"/>
+                  <a:gd name="connsiteX12" fmla="*/ 1856791 w 1856791"/>
+                  <a:gd name="connsiteY12" fmla="*/ 1159682 h 1197005"/>
+                </a:gdLst>
+                <a:ahLst/>
+                <a:cxnLst>
+                  <a:cxn ang="0">
+                    <a:pos x="connsiteX0" y="connsiteY0"/>
+                  </a:cxn>
+                  <a:cxn ang="0">
+                    <a:pos x="connsiteX1" y="connsiteY1"/>
+                  </a:cxn>
+                  <a:cxn ang="0">
+                    <a:pos x="connsiteX2" y="connsiteY2"/>
+                  </a:cxn>
+                  <a:cxn ang="0">
+                    <a:pos x="connsiteX3" y="connsiteY3"/>
+                  </a:cxn>
+                  <a:cxn ang="0">
+                    <a:pos x="connsiteX4" y="connsiteY4"/>
+                  </a:cxn>
+                  <a:cxn ang="0">
+                    <a:pos x="connsiteX5" y="connsiteY5"/>
+                  </a:cxn>
+                  <a:cxn ang="0">
+                    <a:pos x="connsiteX6" y="connsiteY6"/>
+                  </a:cxn>
+                  <a:cxn ang="0">
+                    <a:pos x="connsiteX7" y="connsiteY7"/>
+                  </a:cxn>
+                  <a:cxn ang="0">
+                    <a:pos x="connsiteX8" y="connsiteY8"/>
+                  </a:cxn>
+                  <a:cxn ang="0">
+                    <a:pos x="connsiteX9" y="connsiteY9"/>
+                  </a:cxn>
+                  <a:cxn ang="0">
+                    <a:pos x="connsiteX10" y="connsiteY10"/>
+                  </a:cxn>
+                  <a:cxn ang="0">
+                    <a:pos x="connsiteX11" y="connsiteY11"/>
+                  </a:cxn>
+                  <a:cxn ang="0">
+                    <a:pos x="connsiteX12" y="connsiteY12"/>
+                  </a:cxn>
+                </a:cxnLst>
+                <a:rect l="l" t="t" r="r" b="b"/>
+                <a:pathLst>
+                  <a:path w="1856791" h="1197005">
+                    <a:moveTo>
+                      <a:pt x="0" y="1197005"/>
+                    </a:moveTo>
+                    <a:cubicBezTo>
+                      <a:pt x="115855" y="1165125"/>
+                      <a:pt x="231710" y="1133246"/>
+                      <a:pt x="307910" y="1085038"/>
+                    </a:cubicBezTo>
+                    <a:cubicBezTo>
+                      <a:pt x="384110" y="1036830"/>
+                      <a:pt x="410547" y="982401"/>
+                      <a:pt x="457200" y="907756"/>
+                    </a:cubicBezTo>
+                    <a:cubicBezTo>
+                      <a:pt x="503853" y="833111"/>
+                      <a:pt x="545840" y="728919"/>
+                      <a:pt x="587828" y="637168"/>
+                    </a:cubicBezTo>
+                    <a:cubicBezTo>
+                      <a:pt x="629816" y="545417"/>
+                      <a:pt x="668693" y="452111"/>
+                      <a:pt x="709126" y="357250"/>
+                    </a:cubicBezTo>
+                    <a:cubicBezTo>
+                      <a:pt x="749559" y="262389"/>
+                      <a:pt x="796212" y="123985"/>
+                      <a:pt x="830424" y="68001"/>
+                    </a:cubicBezTo>
+                    <a:cubicBezTo>
+                      <a:pt x="864636" y="12017"/>
+                      <a:pt x="891074" y="32234"/>
+                      <a:pt x="914400" y="21348"/>
+                    </a:cubicBezTo>
+                    <a:cubicBezTo>
+                      <a:pt x="937726" y="10462"/>
+                      <a:pt x="943946" y="-6643"/>
+                      <a:pt x="970383" y="2687"/>
+                    </a:cubicBezTo>
+                    <a:cubicBezTo>
+                      <a:pt x="996820" y="12017"/>
+                      <a:pt x="1026367" y="5796"/>
+                      <a:pt x="1073020" y="77331"/>
+                    </a:cubicBezTo>
+                    <a:cubicBezTo>
+                      <a:pt x="1119673" y="148866"/>
+                      <a:pt x="1189653" y="305932"/>
+                      <a:pt x="1250302" y="431895"/>
+                    </a:cubicBezTo>
+                    <a:cubicBezTo>
+                      <a:pt x="1310951" y="557858"/>
+                      <a:pt x="1360714" y="718034"/>
+                      <a:pt x="1436914" y="833111"/>
+                    </a:cubicBezTo>
+                    <a:cubicBezTo>
+                      <a:pt x="1513114" y="948188"/>
+                      <a:pt x="1637523" y="1067931"/>
+                      <a:pt x="1707502" y="1122360"/>
+                    </a:cubicBezTo>
+                    <a:cubicBezTo>
+                      <a:pt x="1777482" y="1176788"/>
+                      <a:pt x="1817136" y="1168235"/>
+                      <a:pt x="1856791" y="1159682"/>
+                    </a:cubicBezTo>
+                  </a:path>
+                </a:pathLst>
+              </a:custGeom>
+              <a:noFill/>
+              <a:ln>
+                <a:solidFill>
+                  <a:schemeClr val="tx1"/>
+                </a:solidFill>
+                <a:prstDash val="sysDot"/>
+              </a:ln>
+            </p:spPr>
+            <p:style>
+              <a:lnRef idx="2">
+                <a:schemeClr val="accent1">
+                  <a:shade val="50000"/>
+                </a:schemeClr>
+              </a:lnRef>
+              <a:fillRef idx="1">
+                <a:schemeClr val="accent1"/>
+              </a:fillRef>
+              <a:effectRef idx="0">
+                <a:schemeClr val="accent1"/>
+              </a:effectRef>
+              <a:fontRef idx="minor">
+                <a:schemeClr val="lt1"/>
+              </a:fontRef>
+            </p:style>
+            <p:txBody>
+              <a:bodyPr rtlCol="0" anchor="ctr"/>
+              <a:lstStyle/>
+              <a:p>
+                <a:pPr algn="ctr"/>
+                <a:endParaRPr lang="en-US"/>
+              </a:p>
+            </p:txBody>
+          </p:sp>
+        </p:grpSp>
+        <p:cxnSp>
+          <p:nvCxnSpPr>
+            <p:cNvPr id="81" name="Straight Connector 80"/>
+            <p:cNvCxnSpPr>
+              <a:stCxn id="77" idx="7"/>
+              <a:endCxn id="32" idx="0"/>
+            </p:cNvCxnSpPr>
+            <p:nvPr/>
+          </p:nvCxnSpPr>
+          <p:spPr>
+            <a:xfrm flipH="1">
+              <a:off x="2480832" y="3092362"/>
+              <a:ext cx="291" cy="736898"/>
+            </a:xfrm>
+            <a:prstGeom prst="line">
+              <a:avLst/>
+            </a:prstGeom>
+            <a:ln w="28575">
+              <a:solidFill>
+                <a:schemeClr val="tx1"/>
+              </a:solidFill>
+            </a:ln>
+          </p:spPr>
+          <p:style>
+            <a:lnRef idx="1">
+              <a:schemeClr val="accent1"/>
+            </a:lnRef>
+            <a:fillRef idx="0">
+              <a:schemeClr val="accent1"/>
+            </a:fillRef>
+            <a:effectRef idx="0">
+              <a:schemeClr val="accent1"/>
+            </a:effectRef>
+            <a:fontRef idx="minor">
+              <a:schemeClr val="tx1"/>
+            </a:fontRef>
+          </p:style>
+        </p:cxnSp>
+        <p:cxnSp>
+          <p:nvCxnSpPr>
+            <p:cNvPr id="82" name="Straight Connector 81"/>
+            <p:cNvCxnSpPr>
+              <a:stCxn id="78" idx="7"/>
+              <a:endCxn id="43" idx="0"/>
+            </p:cNvCxnSpPr>
+            <p:nvPr/>
+          </p:nvCxnSpPr>
+          <p:spPr>
+            <a:xfrm flipH="1">
+              <a:off x="3258060" y="3225074"/>
+              <a:ext cx="1340" cy="622022"/>
+            </a:xfrm>
+            <a:prstGeom prst="line">
+              <a:avLst/>
+            </a:prstGeom>
+            <a:ln w="28575">
+              <a:solidFill>
+                <a:schemeClr val="tx1"/>
+              </a:solidFill>
+            </a:ln>
+          </p:spPr>
+          <p:style>
+            <a:lnRef idx="1">
+              <a:schemeClr val="accent1"/>
+            </a:lnRef>
+            <a:fillRef idx="0">
+              <a:schemeClr val="accent1"/>
+            </a:fillRef>
+            <a:effectRef idx="0">
+              <a:schemeClr val="accent1"/>
+            </a:effectRef>
+            <a:fontRef idx="minor">
+              <a:schemeClr val="tx1"/>
+            </a:fontRef>
+          </p:style>
+        </p:cxnSp>
+        <p:cxnSp>
+          <p:nvCxnSpPr>
+            <p:cNvPr id="83" name="Straight Connector 82"/>
+            <p:cNvCxnSpPr>
+              <a:stCxn id="79" idx="7"/>
+              <a:endCxn id="45" idx="0"/>
+            </p:cNvCxnSpPr>
+            <p:nvPr/>
+          </p:nvCxnSpPr>
+          <p:spPr>
+            <a:xfrm>
+              <a:off x="4312445" y="3254668"/>
+              <a:ext cx="12868" cy="592727"/>
+            </a:xfrm>
+            <a:prstGeom prst="line">
+              <a:avLst/>
+            </a:prstGeom>
+            <a:ln w="28575">
+              <a:solidFill>
+                <a:schemeClr val="tx1"/>
+              </a:solidFill>
+            </a:ln>
+          </p:spPr>
+          <p:style>
+            <a:lnRef idx="1">
+              <a:schemeClr val="accent1"/>
+            </a:lnRef>
+            <a:fillRef idx="0">
+              <a:schemeClr val="accent1"/>
+            </a:fillRef>
+            <a:effectRef idx="0">
+              <a:schemeClr val="accent1"/>
+            </a:effectRef>
+            <a:fontRef idx="minor">
+              <a:schemeClr val="tx1"/>
+            </a:fontRef>
+          </p:style>
+        </p:cxnSp>
+        <p:cxnSp>
+          <p:nvCxnSpPr>
+            <p:cNvPr id="84" name="Straight Connector 83"/>
+            <p:cNvCxnSpPr>
+              <a:stCxn id="80" idx="7"/>
+              <a:endCxn id="46" idx="0"/>
+            </p:cNvCxnSpPr>
+            <p:nvPr/>
+          </p:nvCxnSpPr>
+          <p:spPr>
+            <a:xfrm>
+              <a:off x="4804613" y="3328352"/>
+              <a:ext cx="1528" cy="512354"/>
+            </a:xfrm>
+            <a:prstGeom prst="line">
+              <a:avLst/>
+            </a:prstGeom>
+            <a:ln w="28575">
+              <a:solidFill>
+                <a:schemeClr val="tx1"/>
+              </a:solidFill>
+            </a:ln>
+          </p:spPr>
+          <p:style>
+            <a:lnRef idx="1">
+              <a:schemeClr val="accent1"/>
+            </a:lnRef>
+            <a:fillRef idx="0">
+              <a:schemeClr val="accent1"/>
+            </a:fillRef>
+            <a:effectRef idx="0">
+              <a:schemeClr val="accent1"/>
+            </a:effectRef>
+            <a:fontRef idx="minor">
+              <a:schemeClr val="tx1"/>
+            </a:fontRef>
+          </p:style>
+        </p:cxnSp>
+        <p:sp>
+          <p:nvSpPr>
+            <p:cNvPr id="85" name="Content Placeholder 2"/>
+            <p:cNvSpPr txBox="1">
+              <a:spLocks/>
+            </p:cNvSpPr>
+            <p:nvPr/>
+          </p:nvSpPr>
+          <p:spPr>
+            <a:xfrm>
+              <a:off x="1115616" y="2852936"/>
+              <a:ext cx="1062364" cy="306298"/>
+            </a:xfrm>
+            <a:prstGeom prst="rect">
+              <a:avLst/>
+            </a:prstGeom>
+            <a:noFill/>
+          </p:spPr>
+          <p:txBody>
+            <a:bodyPr anchor="ctr"/>
+            <a:lstStyle>
+              <a:lvl1pPr marL="342900" indent="-342900" algn="l" defTabSz="914400" rtl="0" eaLnBrk="1" latinLnBrk="0" hangingPunct="1">
+                <a:spcBef>
+                  <a:spcPct val="20000"/>
+                </a:spcBef>
+                <a:buFont typeface="Arial" pitchFamily="34" charset="0"/>
+                <a:buChar char="•"/>
+                <a:defRPr sz="3200" kern="1200">
+                  <a:solidFill>
+                    <a:schemeClr val="tx1"/>
+                  </a:solidFill>
+                  <a:latin typeface="+mn-lt"/>
+                  <a:ea typeface="+mn-ea"/>
+                  <a:cs typeface="+mn-cs"/>
+                </a:defRPr>
+              </a:lvl1pPr>
+              <a:lvl2pPr marL="742950" indent="-285750" algn="l" defTabSz="914400" rtl="0" eaLnBrk="1" latinLnBrk="0" hangingPunct="1">
+                <a:spcBef>
+                  <a:spcPct val="20000"/>
+                </a:spcBef>
+                <a:buFont typeface="Arial" pitchFamily="34" charset="0"/>
+                <a:buChar char="–"/>
+                <a:defRPr sz="2800" kern="1200">
+                  <a:solidFill>
+                    <a:schemeClr val="tx1"/>
+                  </a:solidFill>
+                  <a:latin typeface="+mn-lt"/>
+                  <a:ea typeface="+mn-ea"/>
+                  <a:cs typeface="+mn-cs"/>
+                </a:defRPr>
+              </a:lvl2pPr>
+              <a:lvl3pPr marL="1143000" indent="-228600" algn="l" defTabSz="914400" rtl="0" eaLnBrk="1" latinLnBrk="0" hangingPunct="1">
+                <a:spcBef>
+                  <a:spcPct val="20000"/>
+                </a:spcBef>
+                <a:buFont typeface="Arial" pitchFamily="34" charset="0"/>
+                <a:buChar char="•"/>
+                <a:defRPr sz="2400" kern="1200">
+                  <a:solidFill>
+                    <a:schemeClr val="tx1"/>
+                  </a:solidFill>
+                  <a:latin typeface="+mn-lt"/>
+                  <a:ea typeface="+mn-ea"/>
+                  <a:cs typeface="+mn-cs"/>
+                </a:defRPr>
+              </a:lvl3pPr>
+              <a:lvl4pPr marL="1600200" indent="-228600" algn="l" defTabSz="914400" rtl="0" eaLnBrk="1" latinLnBrk="0" hangingPunct="1">
+                <a:spcBef>
+                  <a:spcPct val="20000"/>
+                </a:spcBef>
+                <a:buFont typeface="Arial" pitchFamily="34" charset="0"/>
+                <a:buChar char="–"/>
+                <a:defRPr sz="2000" kern="1200">
+                  <a:solidFill>
+                    <a:schemeClr val="tx1"/>
+                  </a:solidFill>
+                  <a:latin typeface="+mn-lt"/>
+                  <a:ea typeface="+mn-ea"/>
+                  <a:cs typeface="+mn-cs"/>
+                </a:defRPr>
+              </a:lvl4pPr>
+              <a:lvl5pPr marL="2057400" indent="-228600" algn="l" defTabSz="914400" rtl="0" eaLnBrk="1" latinLnBrk="0" hangingPunct="1">
+                <a:spcBef>
+                  <a:spcPct val="20000"/>
+                </a:spcBef>
+                <a:buFont typeface="Arial" pitchFamily="34" charset="0"/>
+                <a:buChar char="»"/>
+                <a:defRPr sz="2000" kern="1200">
+                  <a:solidFill>
+                    <a:schemeClr val="tx1"/>
+                  </a:solidFill>
+                  <a:latin typeface="+mn-lt"/>
+                  <a:ea typeface="+mn-ea"/>
+                  <a:cs typeface="+mn-cs"/>
+                </a:defRPr>
+              </a:lvl5pPr>
+              <a:lvl6pPr marL="2514600" indent="-228600" algn="l" defTabSz="914400" rtl="0" eaLnBrk="1" latinLnBrk="0" hangingPunct="1">
+                <a:spcBef>
+                  <a:spcPct val="20000"/>
+                </a:spcBef>
+                <a:buFont typeface="Arial" pitchFamily="34" charset="0"/>
+                <a:buChar char="•"/>
+                <a:defRPr sz="2000" kern="1200">
+                  <a:solidFill>
+                    <a:schemeClr val="tx1"/>
+                  </a:solidFill>
+                  <a:latin typeface="+mn-lt"/>
+                  <a:ea typeface="+mn-ea"/>
+                  <a:cs typeface="+mn-cs"/>
+                </a:defRPr>
+              </a:lvl6pPr>
+              <a:lvl7pPr marL="2971800" indent="-228600" algn="l" defTabSz="914400" rtl="0" eaLnBrk="1" latinLnBrk="0" hangingPunct="1">
+                <a:spcBef>
+                  <a:spcPct val="20000"/>
+                </a:spcBef>
+                <a:buFont typeface="Arial" pitchFamily="34" charset="0"/>
+                <a:buChar char="•"/>
+                <a:defRPr sz="2000" kern="1200">
+                  <a:solidFill>
+                    <a:schemeClr val="tx1"/>
+                  </a:solidFill>
+                  <a:latin typeface="+mn-lt"/>
+                  <a:ea typeface="+mn-ea"/>
+                  <a:cs typeface="+mn-cs"/>
+                </a:defRPr>
+              </a:lvl7pPr>
+              <a:lvl8pPr marL="3429000" indent="-228600" algn="l" defTabSz="914400" rtl="0" eaLnBrk="1" latinLnBrk="0" hangingPunct="1">
+                <a:spcBef>
+                  <a:spcPct val="20000"/>
+                </a:spcBef>
+                <a:buFont typeface="Arial" pitchFamily="34" charset="0"/>
+                <a:buChar char="•"/>
+                <a:defRPr sz="2000" kern="1200">
+                  <a:solidFill>
+                    <a:schemeClr val="tx1"/>
+                  </a:solidFill>
+                  <a:latin typeface="+mn-lt"/>
+                  <a:ea typeface="+mn-ea"/>
+                  <a:cs typeface="+mn-cs"/>
+                </a:defRPr>
+              </a:lvl8pPr>
+              <a:lvl9pPr marL="3886200" indent="-228600" algn="l" defTabSz="914400" rtl="0" eaLnBrk="1" latinLnBrk="0" hangingPunct="1">
+                <a:spcBef>
+                  <a:spcPct val="20000"/>
+                </a:spcBef>
+                <a:buFont typeface="Arial" pitchFamily="34" charset="0"/>
+                <a:buChar char="•"/>
+                <a:defRPr sz="2000" kern="1200">
+                  <a:solidFill>
+                    <a:schemeClr val="tx1"/>
+                  </a:solidFill>
+                  <a:latin typeface="+mn-lt"/>
+                  <a:ea typeface="+mn-ea"/>
+                  <a:cs typeface="+mn-cs"/>
+                </a:defRPr>
+              </a:lvl9pPr>
+            </a:lstStyle>
+            <a:p>
+              <a:pPr marL="0" indent="0">
+                <a:buFont typeface="Arial" pitchFamily="34" charset="0"/>
+                <a:buNone/>
+              </a:pPr>
+              <a:r>
+                <a:rPr lang="en-GB" sz="1100" dirty="0" smtClean="0">
+                  <a:latin typeface="Arial" panose="020B0604020202020204" pitchFamily="34" charset="0"/>
+                  <a:cs typeface="Arial" panose="020B0604020202020204" pitchFamily="34" charset="0"/>
+                </a:rPr>
+                <a:t>Behaviours</a:t>
+              </a:r>
+              <a:endParaRPr lang="en-US" sz="1100" dirty="0">
+                <a:latin typeface="Arial" panose="020B0604020202020204" pitchFamily="34" charset="0"/>
+                <a:cs typeface="Arial" panose="020B0604020202020204" pitchFamily="34" charset="0"/>
+              </a:endParaRPr>
+            </a:p>
+          </p:txBody>
+        </p:sp>
+        <p:cxnSp>
+          <p:nvCxnSpPr>
+            <p:cNvPr id="86" name="Straight Connector 85"/>
+            <p:cNvCxnSpPr/>
+            <p:nvPr/>
+          </p:nvCxnSpPr>
+          <p:spPr>
+            <a:xfrm>
+              <a:off x="1169868" y="3159234"/>
+              <a:ext cx="4320480" cy="0"/>
+            </a:xfrm>
+            <a:prstGeom prst="line">
+              <a:avLst/>
+            </a:prstGeom>
+            <a:ln w="19050">
+              <a:solidFill>
+                <a:schemeClr val="tx1"/>
+              </a:solidFill>
+              <a:prstDash val="sysDot"/>
+            </a:ln>
+          </p:spPr>
+          <p:style>
+            <a:lnRef idx="1">
+              <a:schemeClr val="accent1"/>
+            </a:lnRef>
+            <a:fillRef idx="0">
+              <a:schemeClr val="accent1"/>
+            </a:fillRef>
+            <a:effectRef idx="0">
+              <a:schemeClr val="accent1"/>
+            </a:effectRef>
+            <a:fontRef idx="minor">
+              <a:schemeClr val="tx1"/>
+            </a:fontRef>
+          </p:style>
+        </p:cxnSp>
       </p:grpSp>
     </p:spTree>
     <p:extLst>

</xml_diff>